<commit_message>
Final update before Directorial Review.
</commit_message>
<xml_diff>
--- a/Writeup/Presentation/Integrated Information Theory for Organisational Consciousness.pptx
+++ b/Writeup/Presentation/Integrated Information Theory for Organisational Consciousness.pptx
@@ -11511,7 +11511,128 @@
   <p:timing>
     <p:tnLst>
       <p:par>
-        <p:cTn id="1" dur="indefinite" restart="never" nodeType="tmRoot"/>
+        <p:cTn id="1" dur="indefinite" restart="never" nodeType="tmRoot">
+          <p:childTnLst>
+            <p:seq concurrent="1" nextAc="seek">
+              <p:cTn id="2" dur="indefinite" nodeType="mainSeq">
+                <p:childTnLst>
+                  <p:par>
+                    <p:cTn id="3" fill="hold">
+                      <p:stCondLst>
+                        <p:cond delay="indefinite"/>
+                      </p:stCondLst>
+                      <p:childTnLst>
+                        <p:par>
+                          <p:cTn id="4" fill="hold">
+                            <p:stCondLst>
+                              <p:cond delay="0"/>
+                            </p:stCondLst>
+                            <p:childTnLst>
+                              <p:par>
+                                <p:cTn id="5" presetID="1" presetClass="entr" presetSubtype="0" fill="hold" nodeType="clickEffect">
+                                  <p:stCondLst>
+                                    <p:cond delay="0"/>
+                                  </p:stCondLst>
+                                  <p:childTnLst>
+                                    <p:set>
+                                      <p:cBhvr>
+                                        <p:cTn id="6" dur="1" fill="hold">
+                                          <p:stCondLst>
+                                            <p:cond delay="0"/>
+                                          </p:stCondLst>
+                                        </p:cTn>
+                                        <p:tgtEl>
+                                          <p:spTgt spid="9">
+                                            <p:txEl>
+                                              <p:pRg st="2" end="2"/>
+                                            </p:txEl>
+                                          </p:spTgt>
+                                        </p:tgtEl>
+                                        <p:attrNameLst>
+                                          <p:attrName>style.visibility</p:attrName>
+                                        </p:attrNameLst>
+                                      </p:cBhvr>
+                                      <p:to>
+                                        <p:strVal val="visible"/>
+                                      </p:to>
+                                    </p:set>
+                                  </p:childTnLst>
+                                </p:cTn>
+                              </p:par>
+                            </p:childTnLst>
+                          </p:cTn>
+                        </p:par>
+                      </p:childTnLst>
+                    </p:cTn>
+                  </p:par>
+                  <p:par>
+                    <p:cTn id="7" fill="hold">
+                      <p:stCondLst>
+                        <p:cond delay="indefinite"/>
+                      </p:stCondLst>
+                      <p:childTnLst>
+                        <p:par>
+                          <p:cTn id="8" fill="hold">
+                            <p:stCondLst>
+                              <p:cond delay="0"/>
+                            </p:stCondLst>
+                            <p:childTnLst>
+                              <p:par>
+                                <p:cTn id="9" presetID="1" presetClass="entr" presetSubtype="0" fill="hold" nodeType="clickEffect">
+                                  <p:stCondLst>
+                                    <p:cond delay="0"/>
+                                  </p:stCondLst>
+                                  <p:childTnLst>
+                                    <p:set>
+                                      <p:cBhvr>
+                                        <p:cTn id="10" dur="1" fill="hold">
+                                          <p:stCondLst>
+                                            <p:cond delay="0"/>
+                                          </p:stCondLst>
+                                        </p:cTn>
+                                        <p:tgtEl>
+                                          <p:spTgt spid="9">
+                                            <p:txEl>
+                                              <p:pRg st="4" end="4"/>
+                                            </p:txEl>
+                                          </p:spTgt>
+                                        </p:tgtEl>
+                                        <p:attrNameLst>
+                                          <p:attrName>style.visibility</p:attrName>
+                                        </p:attrNameLst>
+                                      </p:cBhvr>
+                                      <p:to>
+                                        <p:strVal val="visible"/>
+                                      </p:to>
+                                    </p:set>
+                                  </p:childTnLst>
+                                </p:cTn>
+                              </p:par>
+                            </p:childTnLst>
+                          </p:cTn>
+                        </p:par>
+                      </p:childTnLst>
+                    </p:cTn>
+                  </p:par>
+                </p:childTnLst>
+              </p:cTn>
+              <p:prevCondLst>
+                <p:cond evt="onPrev" delay="0">
+                  <p:tgtEl>
+                    <p:sldTgt/>
+                  </p:tgtEl>
+                </p:cond>
+              </p:prevCondLst>
+              <p:nextCondLst>
+                <p:cond evt="onNext" delay="0">
+                  <p:tgtEl>
+                    <p:sldTgt/>
+                  </p:tgtEl>
+                </p:cond>
+              </p:nextCondLst>
+            </p:seq>
+          </p:childTnLst>
+        </p:cTn>
       </p:par>
     </p:tnLst>
   </p:timing>
@@ -11917,7 +12038,141 @@
   <p:timing>
     <p:tnLst>
       <p:par>
-        <p:cTn id="1" dur="indefinite" restart="never" nodeType="tmRoot"/>
+        <p:cTn id="1" dur="indefinite" restart="never" nodeType="tmRoot">
+          <p:childTnLst>
+            <p:seq concurrent="1" nextAc="seek">
+              <p:cTn id="2" dur="indefinite" nodeType="mainSeq">
+                <p:childTnLst>
+                  <p:par>
+                    <p:cTn id="3" fill="hold">
+                      <p:stCondLst>
+                        <p:cond delay="indefinite"/>
+                      </p:stCondLst>
+                      <p:childTnLst>
+                        <p:par>
+                          <p:cTn id="4" fill="hold">
+                            <p:stCondLst>
+                              <p:cond delay="0"/>
+                            </p:stCondLst>
+                            <p:childTnLst>
+                              <p:par>
+                                <p:cTn id="5" presetID="1" presetClass="entr" presetSubtype="0" fill="hold" nodeType="clickEffect">
+                                  <p:stCondLst>
+                                    <p:cond delay="0"/>
+                                  </p:stCondLst>
+                                  <p:childTnLst>
+                                    <p:set>
+                                      <p:cBhvr>
+                                        <p:cTn id="6" dur="1" fill="hold">
+                                          <p:stCondLst>
+                                            <p:cond delay="0"/>
+                                          </p:stCondLst>
+                                        </p:cTn>
+                                        <p:tgtEl>
+                                          <p:spTgt spid="9">
+                                            <p:txEl>
+                                              <p:pRg st="2" end="2"/>
+                                            </p:txEl>
+                                          </p:spTgt>
+                                        </p:tgtEl>
+                                        <p:attrNameLst>
+                                          <p:attrName>style.visibility</p:attrName>
+                                        </p:attrNameLst>
+                                      </p:cBhvr>
+                                      <p:to>
+                                        <p:strVal val="visible"/>
+                                      </p:to>
+                                    </p:set>
+                                  </p:childTnLst>
+                                </p:cTn>
+                              </p:par>
+                              <p:par>
+                                <p:cTn id="7" presetID="1" presetClass="entr" presetSubtype="0" fill="hold" nodeType="withEffect">
+                                  <p:stCondLst>
+                                    <p:cond delay="0"/>
+                                  </p:stCondLst>
+                                  <p:childTnLst>
+                                    <p:set>
+                                      <p:cBhvr>
+                                        <p:cTn id="8" dur="1" fill="hold">
+                                          <p:stCondLst>
+                                            <p:cond delay="0"/>
+                                          </p:stCondLst>
+                                        </p:cTn>
+                                        <p:tgtEl>
+                                          <p:spTgt spid="9">
+                                            <p:txEl>
+                                              <p:pRg st="3" end="3"/>
+                                            </p:txEl>
+                                          </p:spTgt>
+                                        </p:tgtEl>
+                                        <p:attrNameLst>
+                                          <p:attrName>style.visibility</p:attrName>
+                                        </p:attrNameLst>
+                                      </p:cBhvr>
+                                      <p:to>
+                                        <p:strVal val="visible"/>
+                                      </p:to>
+                                    </p:set>
+                                  </p:childTnLst>
+                                </p:cTn>
+                              </p:par>
+                              <p:par>
+                                <p:cTn id="9" presetID="1" presetClass="entr" presetSubtype="0" fill="hold" nodeType="withEffect">
+                                  <p:stCondLst>
+                                    <p:cond delay="0"/>
+                                  </p:stCondLst>
+                                  <p:childTnLst>
+                                    <p:set>
+                                      <p:cBhvr>
+                                        <p:cTn id="10" dur="1" fill="hold">
+                                          <p:stCondLst>
+                                            <p:cond delay="0"/>
+                                          </p:stCondLst>
+                                        </p:cTn>
+                                        <p:tgtEl>
+                                          <p:spTgt spid="9">
+                                            <p:txEl>
+                                              <p:pRg st="5" end="5"/>
+                                            </p:txEl>
+                                          </p:spTgt>
+                                        </p:tgtEl>
+                                        <p:attrNameLst>
+                                          <p:attrName>style.visibility</p:attrName>
+                                        </p:attrNameLst>
+                                      </p:cBhvr>
+                                      <p:to>
+                                        <p:strVal val="visible"/>
+                                      </p:to>
+                                    </p:set>
+                                  </p:childTnLst>
+                                </p:cTn>
+                              </p:par>
+                            </p:childTnLst>
+                          </p:cTn>
+                        </p:par>
+                      </p:childTnLst>
+                    </p:cTn>
+                  </p:par>
+                </p:childTnLst>
+              </p:cTn>
+              <p:prevCondLst>
+                <p:cond evt="onPrev" delay="0">
+                  <p:tgtEl>
+                    <p:sldTgt/>
+                  </p:tgtEl>
+                </p:cond>
+              </p:prevCondLst>
+              <p:nextCondLst>
+                <p:cond evt="onNext" delay="0">
+                  <p:tgtEl>
+                    <p:sldTgt/>
+                  </p:tgtEl>
+                </p:cond>
+              </p:nextCondLst>
+            </p:seq>
+          </p:childTnLst>
+        </p:cTn>
       </p:par>
     </p:tnLst>
   </p:timing>
@@ -15516,8 +15771,8 @@
           </p:sp>
         </mc:Fallback>
       </mc:AlternateContent>
-      <mc:AlternateContent xmlns:mc="http://schemas.openxmlformats.org/markup-compatibility/2006" xmlns:a14="http://schemas.microsoft.com/office/drawing/2010/main">
-        <mc:Choice Requires="a14">
+      <mc:AlternateContent xmlns:mc="http://schemas.openxmlformats.org/markup-compatibility/2006">
+        <mc:Choice xmlns:a14="http://schemas.microsoft.com/office/drawing/2010/main" Requires="a14">
           <p:sp>
             <p:nvSpPr>
               <p:cNvPr id="3" name="TextBox 2"/>
@@ -15527,7 +15782,7 @@
             <p:spPr>
               <a:xfrm>
                 <a:off x="1043608" y="980728"/>
-                <a:ext cx="7776864" cy="3140732"/>
+                <a:ext cx="7776864" cy="3725764"/>
               </a:xfrm>
               <a:prstGeom prst="rect">
                 <a:avLst/>
@@ -15559,13 +15814,13 @@
                   <a:buAutoNum type="arabicPeriod"/>
                 </a:pPr>
                 <a:r>
-                  <a:rPr lang="en-GB" dirty="0" smtClean="0"/>
+                  <a:rPr lang="en-GB" sz="2000" dirty="0" smtClean="0"/>
                   <a:t>If we have </a:t>
                 </a:r>
                 <a14:m>
                   <m:oMath xmlns:m="http://schemas.openxmlformats.org/officeDocument/2006/math">
                     <m:r>
-                      <a:rPr lang="en-GB" b="0" i="1" smtClean="0">
+                      <a:rPr lang="en-GB" sz="2000" b="0" i="1" smtClean="0">
                         <a:latin typeface="Cambria Math"/>
                       </a:rPr>
                       <m:t>𝑛</m:t>
@@ -15573,7 +15828,7 @@
                   </m:oMath>
                 </a14:m>
                 <a:r>
-                  <a:rPr lang="en-GB" dirty="0" smtClean="0"/>
+                  <a:rPr lang="en-GB" sz="2000" dirty="0" smtClean="0"/>
                   <a:t> nodes, it follows that there are </a:t>
                 </a:r>
                 <a14:m>
@@ -15581,14 +15836,14 @@
                     <m:sSup>
                       <m:sSupPr>
                         <m:ctrlPr>
-                          <a:rPr lang="en-GB" i="1" smtClean="0">
+                          <a:rPr lang="en-GB" sz="2000" i="1" smtClean="0">
                             <a:latin typeface="Cambria Math"/>
                           </a:rPr>
                         </m:ctrlPr>
                       </m:sSupPr>
                       <m:e>
                         <m:r>
-                          <a:rPr lang="en-GB" b="0" i="1" smtClean="0">
+                          <a:rPr lang="en-GB" sz="2000" b="0" i="1" smtClean="0">
                             <a:latin typeface="Cambria Math"/>
                           </a:rPr>
                           <m:t>2</m:t>
@@ -15596,7 +15851,7 @@
                       </m:e>
                       <m:sup>
                         <m:r>
-                          <a:rPr lang="en-GB" b="0" i="1" smtClean="0">
+                          <a:rPr lang="en-GB" sz="2000" b="0" i="1" smtClean="0">
                             <a:latin typeface="Cambria Math"/>
                           </a:rPr>
                           <m:t>𝑛</m:t>
@@ -15606,7 +15861,7 @@
                   </m:oMath>
                 </a14:m>
                 <a:r>
-                  <a:rPr lang="en-GB" dirty="0" smtClean="0"/>
+                  <a:rPr lang="en-GB" sz="2000" dirty="0" smtClean="0"/>
                   <a:t> states.</a:t>
                 </a:r>
               </a:p>
@@ -15616,19 +15871,19 @@
                   <a:buAutoNum type="arabicPeriod"/>
                 </a:pPr>
                 <a:r>
-                  <a:rPr lang="en-GB" dirty="0" smtClean="0"/>
+                  <a:rPr lang="en-GB" sz="2000" dirty="0" smtClean="0"/>
                   <a:t>Each computation of a Distance will take at least </a:t>
                 </a:r>
                 <a14:m>
                   <m:oMath xmlns:m="http://schemas.openxmlformats.org/officeDocument/2006/math">
                     <m:r>
-                      <a:rPr lang="en-GB" b="0" i="1" smtClean="0">
+                      <a:rPr lang="en-GB" sz="2000" b="0" i="1" smtClean="0">
                         <a:latin typeface="Cambria Math"/>
                       </a:rPr>
                       <m:t>𝑂</m:t>
                     </m:r>
                     <m:r>
-                      <a:rPr lang="en-GB" b="0" i="1" smtClean="0">
+                      <a:rPr lang="en-GB" sz="2000" b="0" i="1" smtClean="0">
                         <a:latin typeface="Cambria Math"/>
                       </a:rPr>
                       <m:t>(</m:t>
@@ -15636,14 +15891,14 @@
                     <m:sSup>
                       <m:sSupPr>
                         <m:ctrlPr>
-                          <a:rPr lang="en-GB" b="0" i="1" smtClean="0">
+                          <a:rPr lang="en-GB" sz="2000" b="0" i="1" smtClean="0">
                             <a:latin typeface="Cambria Math"/>
                           </a:rPr>
                         </m:ctrlPr>
                       </m:sSupPr>
                       <m:e>
                         <m:r>
-                          <a:rPr lang="en-GB" b="0" i="1" smtClean="0">
+                          <a:rPr lang="en-GB" sz="2000" b="0" i="1" smtClean="0">
                             <a:latin typeface="Cambria Math"/>
                           </a:rPr>
                           <m:t>2</m:t>
@@ -15651,7 +15906,7 @@
                       </m:e>
                       <m:sup>
                         <m:r>
-                          <a:rPr lang="en-GB" b="0" i="1" smtClean="0">
+                          <a:rPr lang="en-GB" sz="2000" b="0" i="1" smtClean="0">
                             <a:latin typeface="Cambria Math"/>
                           </a:rPr>
                           <m:t>𝑛</m:t>
@@ -15659,7 +15914,7 @@
                       </m:sup>
                     </m:sSup>
                     <m:r>
-                      <a:rPr lang="en-GB" b="0" i="1" smtClean="0">
+                      <a:rPr lang="en-GB" sz="2000" b="0" i="1" smtClean="0">
                         <a:latin typeface="Cambria Math"/>
                       </a:rPr>
                       <m:t>)</m:t>
@@ -15667,7 +15922,7 @@
                   </m:oMath>
                 </a14:m>
                 <a:r>
-                  <a:rPr lang="en-GB" dirty="0" smtClean="0"/>
+                  <a:rPr lang="en-GB" sz="2000" dirty="0" smtClean="0"/>
                   <a:t> calculations.</a:t>
                 </a:r>
               </a:p>
@@ -15677,7 +15932,7 @@
                   <a:buAutoNum type="arabicPeriod"/>
                 </a:pPr>
                 <a:r>
-                  <a:rPr lang="en-GB" dirty="0" smtClean="0"/>
+                  <a:rPr lang="en-GB" sz="2000" dirty="0" smtClean="0"/>
                   <a:t>Assuming no repetition, </a:t>
                 </a:r>
                 <a14:m>
@@ -15685,14 +15940,14 @@
                     <m:sSup>
                       <m:sSupPr>
                         <m:ctrlPr>
-                          <a:rPr lang="en-GB" i="1">
+                          <a:rPr lang="en-GB" sz="2000" i="1">
                             <a:latin typeface="Cambria Math"/>
                           </a:rPr>
                         </m:ctrlPr>
                       </m:sSupPr>
                       <m:e>
                         <m:r>
-                          <a:rPr lang="en-GB" i="1">
+                          <a:rPr lang="en-GB" sz="2000" i="1">
                             <a:latin typeface="Cambria Math"/>
                           </a:rPr>
                           <m:t>𝜑</m:t>
@@ -15700,13 +15955,13 @@
                       </m:e>
                       <m:sup>
                         <m:r>
-                          <a:rPr lang="en-GB" i="1">
+                          <a:rPr lang="en-GB" sz="2000" i="1">
                             <a:latin typeface="Cambria Math"/>
                           </a:rPr>
                           <m:t>𝑀</m:t>
                         </m:r>
                         <m:r>
-                          <a:rPr lang="en-GB" b="0" i="1" smtClean="0">
+                          <a:rPr lang="en-GB" sz="2000" b="0" i="1" smtClean="0">
                             <a:latin typeface="Cambria Math"/>
                           </a:rPr>
                           <m:t>𝐴𝑋</m:t>
@@ -15716,13 +15971,13 @@
                   </m:oMath>
                 </a14:m>
                 <a:r>
-                  <a:rPr lang="en-GB" dirty="0" smtClean="0"/>
+                  <a:rPr lang="en-GB" sz="2000" dirty="0" smtClean="0"/>
                   <a:t> will comparing all possible pairs of elements from the power set. Thus </a:t>
                 </a:r>
                 <a14:m>
                   <m:oMath xmlns:m="http://schemas.openxmlformats.org/officeDocument/2006/math">
                     <m:r>
-                      <a:rPr lang="en-GB" b="0" i="1" smtClean="0">
+                      <a:rPr lang="en-GB" sz="2000" b="0" i="1" smtClean="0">
                         <a:latin typeface="Cambria Math"/>
                       </a:rPr>
                       <m:t>𝑂</m:t>
@@ -15730,7 +15985,7 @@
                     <m:d>
                       <m:dPr>
                         <m:ctrlPr>
-                          <a:rPr lang="en-GB" b="0" i="1" smtClean="0">
+                          <a:rPr lang="en-GB" sz="2000" b="0" i="1" smtClean="0">
                             <a:latin typeface="Cambria Math"/>
                           </a:rPr>
                         </m:ctrlPr>
@@ -15739,14 +15994,14 @@
                         <m:sSup>
                           <m:sSupPr>
                             <m:ctrlPr>
-                              <a:rPr lang="en-GB" b="0" i="1" smtClean="0">
+                              <a:rPr lang="en-GB" sz="2000" b="0" i="1" smtClean="0">
                                 <a:latin typeface="Cambria Math"/>
                               </a:rPr>
                             </m:ctrlPr>
                           </m:sSupPr>
                           <m:e>
                             <m:r>
-                              <a:rPr lang="en-GB" b="0" i="1" smtClean="0">
+                              <a:rPr lang="en-GB" sz="2000" b="0" i="1" smtClean="0">
                                 <a:latin typeface="Cambria Math"/>
                               </a:rPr>
                               <m:t>2</m:t>
@@ -15754,13 +16009,13 @@
                           </m:e>
                           <m:sup>
                             <m:r>
-                              <a:rPr lang="en-GB" b="0" i="1" smtClean="0">
+                              <a:rPr lang="en-GB" sz="2000" b="0" i="1" smtClean="0">
                                 <a:latin typeface="Cambria Math"/>
                               </a:rPr>
                               <m:t>2</m:t>
                             </m:r>
                             <m:r>
-                              <a:rPr lang="en-GB" b="0" i="1" smtClean="0">
+                              <a:rPr lang="en-GB" sz="2000" b="0" i="1" smtClean="0">
                                 <a:latin typeface="Cambria Math"/>
                               </a:rPr>
                               <m:t>𝑛</m:t>
@@ -15772,7 +16027,7 @@
                   </m:oMath>
                 </a14:m>
                 <a:r>
-                  <a:rPr lang="en-GB" dirty="0" smtClean="0"/>
+                  <a:rPr lang="en-GB" sz="2000" dirty="0" smtClean="0"/>
                   <a:t> such comparisons are required, each of which involves computing a distance.</a:t>
                 </a:r>
               </a:p>
@@ -15782,7 +16037,7 @@
                   <a:buAutoNum type="arabicPeriod"/>
                 </a:pPr>
                 <a:r>
-                  <a:rPr lang="en-GB" dirty="0" smtClean="0"/>
+                  <a:rPr lang="en-GB" sz="2000" dirty="0" smtClean="0"/>
                   <a:t> </a:t>
                 </a:r>
                 <a14:m>
@@ -15790,14 +16045,14 @@
                     <m:sSup>
                       <m:sSupPr>
                         <m:ctrlPr>
-                          <a:rPr lang="en-GB" i="1">
+                          <a:rPr lang="en-GB" sz="2000" i="1">
                             <a:latin typeface="Cambria Math"/>
                           </a:rPr>
                         </m:ctrlPr>
                       </m:sSupPr>
                       <m:e>
                         <m:r>
-                          <a:rPr lang="en-GB" i="1">
+                          <a:rPr lang="en-GB" sz="2000" i="1">
                             <a:latin typeface="Cambria Math"/>
                           </a:rPr>
                           <m:t>𝜑</m:t>
@@ -15805,7 +16060,7 @@
                       </m:e>
                       <m:sup>
                         <m:r>
-                          <a:rPr lang="en-GB" i="1">
+                          <a:rPr lang="en-GB" sz="2000" i="1">
                             <a:latin typeface="Cambria Math"/>
                           </a:rPr>
                           <m:t>𝑀𝐴𝑋</m:t>
@@ -15815,7 +16070,7 @@
                   </m:oMath>
                 </a14:m>
                 <a:r>
-                  <a:rPr lang="en-GB" dirty="0" smtClean="0"/>
+                  <a:rPr lang="en-GB" sz="2000" dirty="0" smtClean="0"/>
                   <a:t> needs to be computed for each element of the power set in order to compute </a:t>
                 </a:r>
                 <a14:m>
@@ -15824,7 +16079,7 @@
                       <m:rPr>
                         <m:sty m:val="p"/>
                       </m:rPr>
-                      <a:rPr lang="en-GB" b="0" i="0" smtClean="0">
+                      <a:rPr lang="en-GB" sz="2000" b="0" i="0" smtClean="0">
                         <a:latin typeface="Cambria Math"/>
                       </a:rPr>
                       <m:t>Φ</m:t>
@@ -15832,19 +16087,19 @@
                   </m:oMath>
                 </a14:m>
                 <a:r>
-                  <a:rPr lang="en-GB" dirty="0" smtClean="0"/>
+                  <a:rPr lang="en-GB" sz="2000" dirty="0" smtClean="0"/>
                   <a:t>. Hence another </a:t>
                 </a:r>
                 <a14:m>
                   <m:oMath xmlns:m="http://schemas.openxmlformats.org/officeDocument/2006/math">
                     <m:r>
-                      <a:rPr lang="en-GB" i="1">
+                      <a:rPr lang="en-GB" sz="2000" i="1">
                         <a:latin typeface="Cambria Math"/>
                       </a:rPr>
                       <m:t>𝑂</m:t>
                     </m:r>
                     <m:r>
-                      <a:rPr lang="en-GB" i="1">
+                      <a:rPr lang="en-GB" sz="2000" i="1">
                         <a:latin typeface="Cambria Math"/>
                       </a:rPr>
                       <m:t>(</m:t>
@@ -15852,14 +16107,14 @@
                     <m:sSup>
                       <m:sSupPr>
                         <m:ctrlPr>
-                          <a:rPr lang="en-GB" i="1">
+                          <a:rPr lang="en-GB" sz="2000" i="1">
                             <a:latin typeface="Cambria Math"/>
                           </a:rPr>
                         </m:ctrlPr>
                       </m:sSupPr>
                       <m:e>
                         <m:r>
-                          <a:rPr lang="en-GB" i="1">
+                          <a:rPr lang="en-GB" sz="2000" i="1">
                             <a:latin typeface="Cambria Math"/>
                           </a:rPr>
                           <m:t>2</m:t>
@@ -15867,7 +16122,7 @@
                       </m:e>
                       <m:sup>
                         <m:r>
-                          <a:rPr lang="en-GB" i="1">
+                          <a:rPr lang="en-GB" sz="2000" i="1">
                             <a:latin typeface="Cambria Math"/>
                           </a:rPr>
                           <m:t>𝑛</m:t>
@@ -15875,7 +16130,7 @@
                       </m:sup>
                     </m:sSup>
                     <m:r>
-                      <a:rPr lang="en-GB" i="1">
+                      <a:rPr lang="en-GB" sz="2000" i="1">
                         <a:latin typeface="Cambria Math"/>
                       </a:rPr>
                       <m:t>)</m:t>
@@ -15883,7 +16138,7 @@
                   </m:oMath>
                 </a14:m>
                 <a:r>
-                  <a:rPr lang="en-GB" dirty="0" smtClean="0"/>
+                  <a:rPr lang="en-GB" sz="2000" dirty="0" smtClean="0"/>
                   <a:t> are required.</a:t>
                 </a:r>
               </a:p>
@@ -15893,7 +16148,7 @@
                   <a:buAutoNum type="arabicPeriod"/>
                 </a:pPr>
                 <a:r>
-                  <a:rPr lang="en-GB" dirty="0" smtClean="0"/>
+                  <a:rPr lang="en-GB" sz="2000" dirty="0" smtClean="0"/>
                   <a:t>To identify a complex, we need to compute </a:t>
                 </a:r>
                 <a14:m>
@@ -15902,7 +16157,7 @@
                       <m:rPr>
                         <m:sty m:val="p"/>
                       </m:rPr>
-                      <a:rPr lang="en-GB">
+                      <a:rPr lang="en-GB" sz="2000">
                         <a:latin typeface="Cambria Math"/>
                       </a:rPr>
                       <m:t>Φ</m:t>
@@ -15910,13 +16165,13 @@
                   </m:oMath>
                 </a14:m>
                 <a:r>
-                  <a:rPr lang="en-GB" dirty="0" smtClean="0"/>
+                  <a:rPr lang="en-GB" sz="2000" dirty="0" smtClean="0"/>
                   <a:t> for all possible 1 directional partitions. This will require at least </a:t>
                 </a:r>
                 <a14:m>
                   <m:oMath xmlns:m="http://schemas.openxmlformats.org/officeDocument/2006/math">
                     <m:r>
-                      <a:rPr lang="en-GB" i="1">
+                      <a:rPr lang="en-GB" sz="2000" i="1">
                         <a:latin typeface="Cambria Math"/>
                       </a:rPr>
                       <m:t>𝑂</m:t>
@@ -15924,7 +16179,7 @@
                     <m:d>
                       <m:dPr>
                         <m:ctrlPr>
-                          <a:rPr lang="en-GB" i="1">
+                          <a:rPr lang="en-GB" sz="2000" i="1">
                             <a:latin typeface="Cambria Math"/>
                           </a:rPr>
                         </m:ctrlPr>
@@ -15933,14 +16188,14 @@
                         <m:sSup>
                           <m:sSupPr>
                             <m:ctrlPr>
-                              <a:rPr lang="en-GB" i="1">
+                              <a:rPr lang="en-GB" sz="2000" i="1">
                                 <a:latin typeface="Cambria Math"/>
                               </a:rPr>
                             </m:ctrlPr>
                           </m:sSupPr>
                           <m:e>
                             <m:r>
-                              <a:rPr lang="en-GB" i="1">
+                              <a:rPr lang="en-GB" sz="2000" i="1">
                                 <a:latin typeface="Cambria Math"/>
                               </a:rPr>
                               <m:t>2</m:t>
@@ -15948,13 +16203,13 @@
                           </m:e>
                           <m:sup>
                             <m:r>
-                              <a:rPr lang="en-GB" i="1">
+                              <a:rPr lang="en-GB" sz="2000" i="1">
                                 <a:latin typeface="Cambria Math"/>
                               </a:rPr>
                               <m:t>2</m:t>
                             </m:r>
                             <m:r>
-                              <a:rPr lang="en-GB" i="1">
+                              <a:rPr lang="en-GB" sz="2000" i="1">
                                 <a:latin typeface="Cambria Math"/>
                               </a:rPr>
                               <m:t>𝑛</m:t>
@@ -15966,11 +16221,11 @@
                   </m:oMath>
                 </a14:m>
                 <a:r>
-                  <a:rPr lang="en-GB" dirty="0"/>
+                  <a:rPr lang="en-GB" sz="2000" dirty="0"/>
                   <a:t> </a:t>
                 </a:r>
                 <a:r>
-                  <a:rPr lang="en-GB" dirty="0" smtClean="0"/>
+                  <a:rPr lang="en-GB" sz="2000" dirty="0" smtClean="0"/>
                   <a:t>calculations of </a:t>
                 </a:r>
                 <a14:m>
@@ -15979,25 +16234,25 @@
                       <m:rPr>
                         <m:sty m:val="p"/>
                       </m:rPr>
-                      <a:rPr lang="en-GB">
+                      <a:rPr lang="en-GB" sz="2000">
                         <a:latin typeface="Cambria Math"/>
                       </a:rPr>
                       <m:t>Φ</m:t>
                     </m:r>
                     <m:r>
-                      <a:rPr lang="en-GB" b="0" i="0" smtClean="0">
+                      <a:rPr lang="en-GB" sz="2000" b="0" i="0" smtClean="0">
                         <a:latin typeface="Cambria Math"/>
                       </a:rPr>
                       <m:t>.</m:t>
                     </m:r>
                   </m:oMath>
                 </a14:m>
-                <a:endParaRPr lang="en-GB" dirty="0"/>
+                <a:endParaRPr lang="en-GB" sz="2000" dirty="0"/>
               </a:p>
             </p:txBody>
           </p:sp>
         </mc:Choice>
-        <mc:Fallback xmlns="">
+        <mc:Fallback>
           <p:sp>
             <p:nvSpPr>
               <p:cNvPr id="3" name="TextBox 2"/>
@@ -16009,7 +16264,7 @@
             <p:spPr>
               <a:xfrm>
                 <a:off x="1043608" y="980728"/>
-                <a:ext cx="7776864" cy="3140732"/>
+                <a:ext cx="7776864" cy="3725764"/>
               </a:xfrm>
               <a:prstGeom prst="rect">
                 <a:avLst/>
@@ -16017,7 +16272,7 @@
               <a:blipFill rotWithShape="1">
                 <a:blip r:embed="rId3"/>
                 <a:stretch>
-                  <a:fillRect l="-627" b="-2330"/>
+                  <a:fillRect l="-784"/>
                 </a:stretch>
               </a:blipFill>
             </p:spPr>
@@ -16036,8 +16291,8 @@
           </p:sp>
         </mc:Fallback>
       </mc:AlternateContent>
-      <mc:AlternateContent xmlns:mc="http://schemas.openxmlformats.org/markup-compatibility/2006" xmlns:a14="http://schemas.microsoft.com/office/drawing/2010/main">
-        <mc:Choice Requires="a14">
+      <mc:AlternateContent xmlns:mc="http://schemas.openxmlformats.org/markup-compatibility/2006">
+        <mc:Choice xmlns:a14="http://schemas.microsoft.com/office/drawing/2010/main" Requires="a14">
           <p:sp>
             <p:nvSpPr>
               <p:cNvPr id="4" name="TextBox 3"/>
@@ -16046,8 +16301,8 @@
             </p:nvSpPr>
             <p:spPr>
               <a:xfrm>
-                <a:off x="1547664" y="4728988"/>
-                <a:ext cx="6336704" cy="439736"/>
+                <a:off x="1547664" y="5013176"/>
+                <a:ext cx="6624736" cy="509178"/>
               </a:xfrm>
               <a:prstGeom prst="rect">
                 <a:avLst/>
@@ -16061,13 +16316,13 @@
               <a:lstStyle/>
               <a:p>
                 <a:r>
-                  <a:rPr lang="en-GB" sz="2000" b="1" dirty="0" smtClean="0"/>
+                  <a:rPr lang="en-GB" sz="2400" b="1" dirty="0" smtClean="0"/>
                   <a:t>Hence we estimate </a:t>
                 </a:r>
                 <a14:m>
                   <m:oMath xmlns:m="http://schemas.openxmlformats.org/officeDocument/2006/math">
                     <m:r>
-                      <a:rPr lang="en-GB" sz="2000" b="1" i="1">
+                      <a:rPr lang="en-GB" sz="2400" b="1" i="1">
                         <a:latin typeface="Cambria Math"/>
                       </a:rPr>
                       <m:t>𝚽</m:t>
@@ -16075,13 +16330,13 @@
                   </m:oMath>
                 </a14:m>
                 <a:r>
-                  <a:rPr lang="en-GB" sz="2000" b="1" dirty="0" smtClean="0"/>
+                  <a:rPr lang="en-GB" sz="2400" b="1" dirty="0" smtClean="0"/>
                   <a:t> scales with at least  </a:t>
                 </a:r>
                 <a14:m>
                   <m:oMath xmlns:m="http://schemas.openxmlformats.org/officeDocument/2006/math">
                     <m:r>
-                      <a:rPr lang="en-GB" sz="2000" b="1" i="1" smtClean="0">
+                      <a:rPr lang="en-GB" sz="2400" b="1" i="1" smtClean="0">
                         <a:latin typeface="Cambria Math"/>
                       </a:rPr>
                       <m:t>𝑶</m:t>
@@ -16089,7 +16344,7 @@
                     <m:d>
                       <m:dPr>
                         <m:ctrlPr>
-                          <a:rPr lang="en-GB" sz="2000" b="1" i="1" smtClean="0">
+                          <a:rPr lang="en-GB" sz="2400" b="1" i="1" smtClean="0">
                             <a:latin typeface="Cambria Math"/>
                           </a:rPr>
                         </m:ctrlPr>
@@ -16098,14 +16353,14 @@
                         <m:sSup>
                           <m:sSupPr>
                             <m:ctrlPr>
-                              <a:rPr lang="en-GB" sz="2000" b="1" i="1">
+                              <a:rPr lang="en-GB" sz="2400" b="1" i="1">
                                 <a:latin typeface="Cambria Math"/>
                               </a:rPr>
                             </m:ctrlPr>
                           </m:sSupPr>
                           <m:e>
                             <m:r>
-                              <a:rPr lang="en-GB" sz="2000" b="1" i="1">
+                              <a:rPr lang="en-GB" sz="2400" b="1" i="1">
                                 <a:latin typeface="Cambria Math"/>
                               </a:rPr>
                               <m:t>𝟐</m:t>
@@ -16113,13 +16368,13 @@
                           </m:e>
                           <m:sup>
                             <m:r>
-                              <a:rPr lang="en-GB" sz="2000" b="1" i="1">
+                              <a:rPr lang="en-GB" sz="2400" b="1" i="1">
                                 <a:latin typeface="Cambria Math"/>
                               </a:rPr>
                               <m:t>𝟔</m:t>
                             </m:r>
                             <m:r>
-                              <a:rPr lang="en-GB" sz="2000" b="1" i="1">
+                              <a:rPr lang="en-GB" sz="2400" b="1" i="1">
                                 <a:latin typeface="Cambria Math"/>
                               </a:rPr>
                               <m:t>𝒏</m:t>
@@ -16131,15 +16386,15 @@
                   </m:oMath>
                 </a14:m>
                 <a:r>
-                  <a:rPr lang="en-GB" sz="2000" b="1" dirty="0" smtClean="0"/>
+                  <a:rPr lang="en-GB" sz="2400" b="1" dirty="0" smtClean="0"/>
                   <a:t>.</a:t>
                 </a:r>
-                <a:endParaRPr lang="en-GB" sz="2000" b="1" dirty="0"/>
+                <a:endParaRPr lang="en-GB" sz="2400" b="1" dirty="0"/>
               </a:p>
             </p:txBody>
           </p:sp>
         </mc:Choice>
-        <mc:Fallback xmlns="">
+        <mc:Fallback>
           <p:sp>
             <p:nvSpPr>
               <p:cNvPr id="4" name="TextBox 3"/>
@@ -16150,8 +16405,8 @@
             </p:nvSpPr>
             <p:spPr>
               <a:xfrm>
-                <a:off x="1547664" y="4728988"/>
-                <a:ext cx="6336704" cy="439736"/>
+                <a:off x="1547664" y="5013176"/>
+                <a:ext cx="6624736" cy="509178"/>
               </a:xfrm>
               <a:prstGeom prst="rect">
                 <a:avLst/>
@@ -16159,7 +16414,7 @@
               <a:blipFill rotWithShape="1">
                 <a:blip r:embed="rId4"/>
                 <a:stretch>
-                  <a:fillRect l="-1059" t="-1389" b="-20833"/>
+                  <a:fillRect l="-1472" t="-3571" r="-368" b="-22619"/>
                 </a:stretch>
               </a:blipFill>
             </p:spPr>
@@ -16209,7 +16464,7 @@
                             </p:stCondLst>
                             <p:childTnLst>
                               <p:par>
-                                <p:cTn id="5" presetID="1" presetClass="entr" presetSubtype="0" fill="hold" grpId="0" nodeType="clickEffect">
+                                <p:cTn id="5" presetID="1" presetClass="entr" presetSubtype="0" fill="hold" nodeType="clickEffect">
                                   <p:stCondLst>
                                     <p:cond delay="0"/>
                                   </p:stCondLst>
@@ -16222,7 +16477,207 @@
                                           </p:stCondLst>
                                         </p:cTn>
                                         <p:tgtEl>
-                                          <p:spTgt spid="4"/>
+                                          <p:spTgt spid="3">
+                                            <p:txEl>
+                                              <p:pRg st="3" end="3"/>
+                                            </p:txEl>
+                                          </p:spTgt>
+                                        </p:tgtEl>
+                                        <p:attrNameLst>
+                                          <p:attrName>style.visibility</p:attrName>
+                                        </p:attrNameLst>
+                                      </p:cBhvr>
+                                      <p:to>
+                                        <p:strVal val="visible"/>
+                                      </p:to>
+                                    </p:set>
+                                  </p:childTnLst>
+                                </p:cTn>
+                              </p:par>
+                            </p:childTnLst>
+                          </p:cTn>
+                        </p:par>
+                      </p:childTnLst>
+                    </p:cTn>
+                  </p:par>
+                  <p:par>
+                    <p:cTn id="7" fill="hold">
+                      <p:stCondLst>
+                        <p:cond delay="indefinite"/>
+                      </p:stCondLst>
+                      <p:childTnLst>
+                        <p:par>
+                          <p:cTn id="8" fill="hold">
+                            <p:stCondLst>
+                              <p:cond delay="0"/>
+                            </p:stCondLst>
+                            <p:childTnLst>
+                              <p:par>
+                                <p:cTn id="9" presetID="1" presetClass="entr" presetSubtype="0" fill="hold" nodeType="clickEffect">
+                                  <p:stCondLst>
+                                    <p:cond delay="0"/>
+                                  </p:stCondLst>
+                                  <p:childTnLst>
+                                    <p:set>
+                                      <p:cBhvr>
+                                        <p:cTn id="10" dur="1" fill="hold">
+                                          <p:stCondLst>
+                                            <p:cond delay="0"/>
+                                          </p:stCondLst>
+                                        </p:cTn>
+                                        <p:tgtEl>
+                                          <p:spTgt spid="3">
+                                            <p:txEl>
+                                              <p:pRg st="4" end="4"/>
+                                            </p:txEl>
+                                          </p:spTgt>
+                                        </p:tgtEl>
+                                        <p:attrNameLst>
+                                          <p:attrName>style.visibility</p:attrName>
+                                        </p:attrNameLst>
+                                      </p:cBhvr>
+                                      <p:to>
+                                        <p:strVal val="visible"/>
+                                      </p:to>
+                                    </p:set>
+                                  </p:childTnLst>
+                                </p:cTn>
+                              </p:par>
+                            </p:childTnLst>
+                          </p:cTn>
+                        </p:par>
+                      </p:childTnLst>
+                    </p:cTn>
+                  </p:par>
+                  <p:par>
+                    <p:cTn id="11" fill="hold">
+                      <p:stCondLst>
+                        <p:cond delay="indefinite"/>
+                      </p:stCondLst>
+                      <p:childTnLst>
+                        <p:par>
+                          <p:cTn id="12" fill="hold">
+                            <p:stCondLst>
+                              <p:cond delay="0"/>
+                            </p:stCondLst>
+                            <p:childTnLst>
+                              <p:par>
+                                <p:cTn id="13" presetID="1" presetClass="entr" presetSubtype="0" fill="hold" nodeType="clickEffect">
+                                  <p:stCondLst>
+                                    <p:cond delay="0"/>
+                                  </p:stCondLst>
+                                  <p:childTnLst>
+                                    <p:set>
+                                      <p:cBhvr>
+                                        <p:cTn id="14" dur="1" fill="hold">
+                                          <p:stCondLst>
+                                            <p:cond delay="0"/>
+                                          </p:stCondLst>
+                                        </p:cTn>
+                                        <p:tgtEl>
+                                          <p:spTgt spid="3">
+                                            <p:txEl>
+                                              <p:pRg st="5" end="5"/>
+                                            </p:txEl>
+                                          </p:spTgt>
+                                        </p:tgtEl>
+                                        <p:attrNameLst>
+                                          <p:attrName>style.visibility</p:attrName>
+                                        </p:attrNameLst>
+                                      </p:cBhvr>
+                                      <p:to>
+                                        <p:strVal val="visible"/>
+                                      </p:to>
+                                    </p:set>
+                                  </p:childTnLst>
+                                </p:cTn>
+                              </p:par>
+                            </p:childTnLst>
+                          </p:cTn>
+                        </p:par>
+                      </p:childTnLst>
+                    </p:cTn>
+                  </p:par>
+                  <p:par>
+                    <p:cTn id="15" fill="hold">
+                      <p:stCondLst>
+                        <p:cond delay="indefinite"/>
+                      </p:stCondLst>
+                      <p:childTnLst>
+                        <p:par>
+                          <p:cTn id="16" fill="hold">
+                            <p:stCondLst>
+                              <p:cond delay="0"/>
+                            </p:stCondLst>
+                            <p:childTnLst>
+                              <p:par>
+                                <p:cTn id="17" presetID="1" presetClass="entr" presetSubtype="0" fill="hold" nodeType="clickEffect">
+                                  <p:stCondLst>
+                                    <p:cond delay="0"/>
+                                  </p:stCondLst>
+                                  <p:childTnLst>
+                                    <p:set>
+                                      <p:cBhvr>
+                                        <p:cTn id="18" dur="1" fill="hold">
+                                          <p:stCondLst>
+                                            <p:cond delay="0"/>
+                                          </p:stCondLst>
+                                        </p:cTn>
+                                        <p:tgtEl>
+                                          <p:spTgt spid="3">
+                                            <p:txEl>
+                                              <p:pRg st="6" end="6"/>
+                                            </p:txEl>
+                                          </p:spTgt>
+                                        </p:tgtEl>
+                                        <p:attrNameLst>
+                                          <p:attrName>style.visibility</p:attrName>
+                                        </p:attrNameLst>
+                                      </p:cBhvr>
+                                      <p:to>
+                                        <p:strVal val="visible"/>
+                                      </p:to>
+                                    </p:set>
+                                  </p:childTnLst>
+                                </p:cTn>
+                              </p:par>
+                            </p:childTnLst>
+                          </p:cTn>
+                        </p:par>
+                      </p:childTnLst>
+                    </p:cTn>
+                  </p:par>
+                  <p:par>
+                    <p:cTn id="19" fill="hold">
+                      <p:stCondLst>
+                        <p:cond delay="indefinite"/>
+                      </p:stCondLst>
+                      <p:childTnLst>
+                        <p:par>
+                          <p:cTn id="20" fill="hold">
+                            <p:stCondLst>
+                              <p:cond delay="0"/>
+                            </p:stCondLst>
+                            <p:childTnLst>
+                              <p:par>
+                                <p:cTn id="21" presetID="1" presetClass="entr" presetSubtype="0" fill="hold" nodeType="clickEffect">
+                                  <p:stCondLst>
+                                    <p:cond delay="0"/>
+                                  </p:stCondLst>
+                                  <p:childTnLst>
+                                    <p:set>
+                                      <p:cBhvr>
+                                        <p:cTn id="22" dur="1" fill="hold">
+                                          <p:stCondLst>
+                                            <p:cond delay="0"/>
+                                          </p:stCondLst>
+                                        </p:cTn>
+                                        <p:tgtEl>
+                                          <p:spTgt spid="4">
+                                            <p:txEl>
+                                              <p:pRg st="0" end="0"/>
+                                            </p:txEl>
+                                          </p:spTgt>
                                         </p:tgtEl>
                                         <p:attrNameLst>
                                           <p:attrName>style.visibility</p:attrName>
@@ -16262,9 +16717,6 @@
         </p:cTn>
       </p:par>
     </p:tnLst>
-    <p:bldLst>
-      <p:bldP spid="4" grpId="0"/>
-    </p:bldLst>
   </p:timing>
 </p:sld>
 </file>
@@ -19394,7 +19846,7 @@
         <p:spPr>
           <a:xfrm>
             <a:off x="1187624" y="4472157"/>
-            <a:ext cx="7776864" cy="2492990"/>
+            <a:ext cx="7776864" cy="1569660"/>
           </a:xfrm>
           <a:prstGeom prst="rect">
             <a:avLst/>
@@ -19465,28 +19917,11 @@
             </a:pPr>
             <a:r>
               <a:rPr lang="en-GB" sz="2000" dirty="0" smtClean="0"/>
-              <a:t>These two nodes turn on and off randomly, indicating random project arrival.</a:t>
+              <a:t>How </a:t>
             </a:r>
-            <a:endParaRPr lang="en-GB" sz="2000" dirty="0"/>
-          </a:p>
-          <a:p>
-            <a:pPr marL="285750" indent="-285750">
-              <a:buFont typeface="Arial" pitchFamily="34" charset="0"/>
-              <a:buChar char="•"/>
-            </a:pPr>
             <a:r>
               <a:rPr lang="en-GB" sz="2000" dirty="0" smtClean="0"/>
-              <a:t>Teams possess the skills that they are connected to.</a:t>
-            </a:r>
-          </a:p>
-          <a:p>
-            <a:pPr marL="285750" indent="-285750">
-              <a:buFont typeface="Arial" pitchFamily="34" charset="0"/>
-              <a:buChar char="•"/>
-            </a:pPr>
-            <a:r>
-              <a:rPr lang="en-GB" sz="2000" dirty="0" smtClean="0"/>
-              <a:t>How should teams A, B and C activate and deactivate?</a:t>
+              <a:t>should teams A, B and C activate and deactivate?</a:t>
             </a:r>
             <a:endParaRPr lang="en-GB" sz="2000" dirty="0"/>
           </a:p>
@@ -29988,1004 +30423,6 @@
         <mc:Choice xmlns:a14="http://schemas.microsoft.com/office/drawing/2010/main" Requires="a14">
           <p:sp>
             <p:nvSpPr>
-              <p:cNvPr id="32" name="TextBox 31"/>
-              <p:cNvSpPr txBox="1"/>
-              <p:nvPr/>
-            </p:nvSpPr>
-            <p:spPr>
-              <a:xfrm>
-                <a:off x="1115616" y="3575678"/>
-                <a:ext cx="7200800" cy="1639744"/>
-              </a:xfrm>
-              <a:prstGeom prst="rect">
-                <a:avLst/>
-              </a:prstGeom>
-              <a:noFill/>
-            </p:spPr>
-            <p:txBody>
-              <a:bodyPr wrap="square" rtlCol="0">
-                <a:spAutoFit/>
-              </a:bodyPr>
-              <a:lstStyle/>
-              <a:p>
-                <a:r>
-                  <a:rPr lang="en-GB" sz="2000" dirty="0" smtClean="0"/>
-                  <a:t>We can also compute repertoires for subsets of the system:</a:t>
-                </a:r>
-              </a:p>
-              <a:p>
-                <a:endParaRPr lang="en-GB" sz="2000" dirty="0"/>
-              </a:p>
-              <a:p>
-                <a14:m>
-                  <m:oMathPara xmlns:m="http://schemas.openxmlformats.org/officeDocument/2006/math">
-                    <m:oMathParaPr>
-                      <m:jc m:val="centerGroup"/>
-                    </m:oMathParaPr>
-                    <m:oMath xmlns:m="http://schemas.openxmlformats.org/officeDocument/2006/math">
-                      <m:r>
-                        <a:rPr lang="en-GB" sz="2000" i="1">
-                          <a:latin typeface="Cambria Math"/>
-                          <a:ea typeface="Cambria Math" pitchFamily="18" charset="0"/>
-                        </a:rPr>
-                        <m:t>𝑝</m:t>
-                      </m:r>
-                      <m:r>
-                        <a:rPr lang="en-GB" sz="2000" i="1">
-                          <a:latin typeface="Cambria Math"/>
-                          <a:ea typeface="Cambria Math" pitchFamily="18" charset="0"/>
-                        </a:rPr>
-                        <m:t>(</m:t>
-                      </m:r>
-                      <m:sSup>
-                        <m:sSupPr>
-                          <m:ctrlPr>
-                            <a:rPr lang="en-GB" sz="2000" i="1">
-                              <a:latin typeface="Cambria Math"/>
-                              <a:ea typeface="Cambria Math" pitchFamily="18" charset="0"/>
-                            </a:rPr>
-                          </m:ctrlPr>
-                        </m:sSupPr>
-                        <m:e>
-                          <m:r>
-                            <a:rPr lang="en-GB" sz="2000" b="0" i="1" smtClean="0">
-                              <a:latin typeface="Cambria Math"/>
-                              <a:ea typeface="Cambria Math" pitchFamily="18" charset="0"/>
-                            </a:rPr>
-                            <m:t>𝐴𝐵</m:t>
-                          </m:r>
-                        </m:e>
-                        <m:sup>
-                          <m:r>
-                            <a:rPr lang="en-GB" sz="2000" i="1">
-                              <a:latin typeface="Cambria Math"/>
-                              <a:ea typeface="Cambria Math" pitchFamily="18" charset="0"/>
-                            </a:rPr>
-                            <m:t>𝑓</m:t>
-                          </m:r>
-                        </m:sup>
-                      </m:sSup>
-                      <m:r>
-                        <a:rPr lang="en-GB" sz="2000" i="1">
-                          <a:latin typeface="Cambria Math"/>
-                          <a:ea typeface="Cambria Math" pitchFamily="18" charset="0"/>
-                        </a:rPr>
-                        <m:t>|</m:t>
-                      </m:r>
-                      <m:sSup>
-                        <m:sSupPr>
-                          <m:ctrlPr>
-                            <a:rPr lang="en-GB" sz="2000" i="1">
-                              <a:latin typeface="Cambria Math"/>
-                              <a:ea typeface="Cambria Math" pitchFamily="18" charset="0"/>
-                            </a:rPr>
-                          </m:ctrlPr>
-                        </m:sSupPr>
-                        <m:e>
-                          <m:r>
-                            <a:rPr lang="en-GB" sz="2000" b="0" i="1" smtClean="0">
-                              <a:latin typeface="Cambria Math"/>
-                              <a:ea typeface="Cambria Math" pitchFamily="18" charset="0"/>
-                            </a:rPr>
-                            <m:t>𝐵𝐶</m:t>
-                          </m:r>
-                        </m:e>
-                        <m:sup>
-                          <m:r>
-                            <a:rPr lang="en-GB" sz="2000" i="1">
-                              <a:latin typeface="Cambria Math"/>
-                              <a:ea typeface="Cambria Math" pitchFamily="18" charset="0"/>
-                            </a:rPr>
-                            <m:t>𝑐</m:t>
-                          </m:r>
-                        </m:sup>
-                      </m:sSup>
-                      <m:r>
-                        <a:rPr lang="en-GB" sz="2000" i="1">
-                          <a:latin typeface="Cambria Math"/>
-                          <a:ea typeface="Cambria Math" pitchFamily="18" charset="0"/>
-                        </a:rPr>
-                        <m:t>=</m:t>
-                      </m:r>
-                      <m:r>
-                        <a:rPr lang="en-GB" sz="2000" i="1">
-                          <a:latin typeface="Cambria Math"/>
-                          <a:ea typeface="Cambria Math" pitchFamily="18" charset="0"/>
-                        </a:rPr>
-                        <m:t>0</m:t>
-                      </m:r>
-                      <m:r>
-                        <a:rPr lang="en-GB" sz="2000" b="0" i="1" smtClean="0">
-                          <a:latin typeface="Cambria Math"/>
-                          <a:ea typeface="Cambria Math" pitchFamily="18" charset="0"/>
-                        </a:rPr>
-                        <m:t>1</m:t>
-                      </m:r>
-                      <m:r>
-                        <a:rPr lang="en-GB" sz="2000" i="1">
-                          <a:latin typeface="Cambria Math"/>
-                          <a:ea typeface="Cambria Math" pitchFamily="18" charset="0"/>
-                        </a:rPr>
-                        <m:t>)</m:t>
-                      </m:r>
-                    </m:oMath>
-                  </m:oMathPara>
-                </a14:m>
-                <a:endParaRPr lang="en-GB" sz="2000" i="1" dirty="0" smtClean="0">
-                  <a:latin typeface="Cambria Math" pitchFamily="18" charset="0"/>
-                  <a:ea typeface="Cambria Math" pitchFamily="18" charset="0"/>
-                </a:endParaRPr>
-              </a:p>
-              <a:p>
-                <a:endParaRPr lang="en-GB" sz="2000" i="1" dirty="0" smtClean="0">
-                  <a:latin typeface="Cambria Math"/>
-                  <a:ea typeface="Cambria Math" pitchFamily="18" charset="0"/>
-                </a:endParaRPr>
-              </a:p>
-              <a:p>
-                <a14:m>
-                  <m:oMathPara xmlns:m="http://schemas.openxmlformats.org/officeDocument/2006/math">
-                    <m:oMathParaPr>
-                      <m:jc m:val="centerGroup"/>
-                    </m:oMathParaPr>
-                    <m:oMath xmlns:m="http://schemas.openxmlformats.org/officeDocument/2006/math">
-                      <m:d>
-                        <m:dPr>
-                          <m:begChr m:val="["/>
-                          <m:endChr m:val="]"/>
-                          <m:ctrlPr>
-                            <a:rPr lang="en-GB" sz="2000" i="1">
-                              <a:latin typeface="Cambria Math"/>
-                              <a:ea typeface="Cambria Math" pitchFamily="18" charset="0"/>
-                            </a:rPr>
-                          </m:ctrlPr>
-                        </m:dPr>
-                        <m:e>
-                          <m:m>
-                            <m:mPr>
-                              <m:mcs>
-                                <m:mc>
-                                  <m:mcPr>
-                                    <m:count m:val="4"/>
-                                    <m:mcJc m:val="center"/>
-                                  </m:mcPr>
-                                </m:mc>
-                              </m:mcs>
-                              <m:ctrlPr>
-                                <a:rPr lang="en-GB" sz="2000" i="1">
-                                  <a:latin typeface="Cambria Math"/>
-                                  <a:ea typeface="Cambria Math" pitchFamily="18" charset="0"/>
-                                </a:rPr>
-                              </m:ctrlPr>
-                            </m:mPr>
-                            <m:mr>
-                              <m:e>
-                                <m:r>
-                                  <a:rPr lang="en-GB" sz="2000" i="1">
-                                    <a:latin typeface="Cambria Math"/>
-                                    <a:ea typeface="Cambria Math" pitchFamily="18" charset="0"/>
-                                  </a:rPr>
-                                  <m:t>0</m:t>
-                                </m:r>
-                              </m:e>
-                              <m:e>
-                                <m:r>
-                                  <a:rPr lang="en-GB" sz="2000" b="0" i="1" smtClean="0">
-                                    <a:latin typeface="Cambria Math"/>
-                                    <a:ea typeface="Cambria Math" pitchFamily="18" charset="0"/>
-                                  </a:rPr>
-                                  <m:t>0.5</m:t>
-                                </m:r>
-                              </m:e>
-                              <m:e>
-                                <m:r>
-                                  <a:rPr lang="en-GB" sz="2000" i="1">
-                                    <a:latin typeface="Cambria Math"/>
-                                    <a:ea typeface="Cambria Math" pitchFamily="18" charset="0"/>
-                                  </a:rPr>
-                                  <m:t>0</m:t>
-                                </m:r>
-                              </m:e>
-                              <m:e>
-                                <m:r>
-                                  <a:rPr lang="en-GB" sz="2000" i="1">
-                                    <a:latin typeface="Cambria Math"/>
-                                    <a:ea typeface="Cambria Math" pitchFamily="18" charset="0"/>
-                                  </a:rPr>
-                                  <m:t>0</m:t>
-                                </m:r>
-                                <m:r>
-                                  <a:rPr lang="en-GB" sz="2000" b="0" i="1" smtClean="0">
-                                    <a:latin typeface="Cambria Math"/>
-                                    <a:ea typeface="Cambria Math" pitchFamily="18" charset="0"/>
-                                  </a:rPr>
-                                  <m:t>.5</m:t>
-                                </m:r>
-                              </m:e>
-                            </m:mr>
-                          </m:m>
-                        </m:e>
-                      </m:d>
-                    </m:oMath>
-                  </m:oMathPara>
-                </a14:m>
-                <a:endParaRPr lang="en-GB" sz="2000" i="1" dirty="0">
-                  <a:latin typeface="Cambria Math" pitchFamily="18" charset="0"/>
-                  <a:ea typeface="Cambria Math" pitchFamily="18" charset="0"/>
-                </a:endParaRPr>
-              </a:p>
-            </p:txBody>
-          </p:sp>
-        </mc:Choice>
-        <mc:Fallback>
-          <p:sp>
-            <p:nvSpPr>
-              <p:cNvPr id="32" name="TextBox 31"/>
-              <p:cNvSpPr txBox="1">
-                <a:spLocks noRot="1" noChangeAspect="1" noMove="1" noResize="1" noEditPoints="1" noAdjustHandles="1" noChangeArrowheads="1" noChangeShapeType="1" noTextEdit="1"/>
-              </p:cNvSpPr>
-              <p:nvPr/>
-            </p:nvSpPr>
-            <p:spPr>
-              <a:xfrm>
-                <a:off x="1115616" y="3575678"/>
-                <a:ext cx="7200800" cy="1639744"/>
-              </a:xfrm>
-              <a:prstGeom prst="rect">
-                <a:avLst/>
-              </a:prstGeom>
-              <a:blipFill rotWithShape="1">
-                <a:blip r:embed="rId2"/>
-                <a:stretch>
-                  <a:fillRect l="-847" t="-1859"/>
-                </a:stretch>
-              </a:blipFill>
-            </p:spPr>
-            <p:txBody>
-              <a:bodyPr/>
-              <a:lstStyle/>
-              <a:p>
-                <a:r>
-                  <a:rPr lang="en-GB">
-                    <a:noFill/>
-                  </a:rPr>
-                  <a:t> </a:t>
-                </a:r>
-              </a:p>
-            </p:txBody>
-          </p:sp>
-        </mc:Fallback>
-      </mc:AlternateContent>
-      <p:sp>
-        <p:nvSpPr>
-          <p:cNvPr id="2" name="TextBox 1"/>
-          <p:cNvSpPr txBox="1"/>
-          <p:nvPr/>
-        </p:nvSpPr>
-        <p:spPr>
-          <a:xfrm>
-            <a:off x="836320" y="98490"/>
-            <a:ext cx="5463872" cy="646331"/>
-          </a:xfrm>
-          <a:prstGeom prst="rect">
-            <a:avLst/>
-          </a:prstGeom>
-          <a:noFill/>
-        </p:spPr>
-        <p:txBody>
-          <a:bodyPr wrap="square" rtlCol="0">
-            <a:spAutoFit/>
-          </a:bodyPr>
-          <a:lstStyle/>
-          <a:p>
-            <a:r>
-              <a:rPr lang="en-GB" sz="3600" dirty="0" smtClean="0"/>
-              <a:t>Notation</a:t>
-            </a:r>
-            <a:endParaRPr lang="en-GB" sz="3600" dirty="0"/>
-          </a:p>
-        </p:txBody>
-      </p:sp>
-      <mc:AlternateContent xmlns:mc="http://schemas.openxmlformats.org/markup-compatibility/2006">
-        <mc:Choice xmlns:a14="http://schemas.microsoft.com/office/drawing/2010/main" Requires="a14">
-          <p:sp>
-            <p:nvSpPr>
-              <p:cNvPr id="3" name="TextBox 2"/>
-              <p:cNvSpPr txBox="1"/>
-              <p:nvPr/>
-            </p:nvSpPr>
-            <p:spPr>
-              <a:xfrm>
-                <a:off x="971600" y="1412776"/>
-                <a:ext cx="2832057" cy="1827808"/>
-              </a:xfrm>
-              <a:prstGeom prst="rect">
-                <a:avLst/>
-              </a:prstGeom>
-              <a:noFill/>
-            </p:spPr>
-            <p:txBody>
-              <a:bodyPr wrap="none" rtlCol="0">
-                <a:spAutoFit/>
-              </a:bodyPr>
-              <a:lstStyle/>
-              <a:p>
-                <a:pPr marL="457200" indent="-457200">
-                  <a:buFont typeface="Arial" pitchFamily="34" charset="0"/>
-                  <a:buChar char="•"/>
-                </a:pPr>
-                <a14:m>
-                  <m:oMath xmlns:m="http://schemas.openxmlformats.org/officeDocument/2006/math">
-                    <m:r>
-                      <a:rPr lang="en-GB" sz="2800" b="0" i="1" smtClean="0">
-                        <a:latin typeface="Cambria Math"/>
-                        <a:ea typeface="Cambria Math" pitchFamily="18" charset="0"/>
-                      </a:rPr>
-                      <m:t>𝐺</m:t>
-                    </m:r>
-                    <m:r>
-                      <a:rPr lang="en-GB" sz="2800" b="0" i="1" smtClean="0">
-                        <a:latin typeface="Cambria Math"/>
-                        <a:ea typeface="Cambria Math" pitchFamily="18" charset="0"/>
-                      </a:rPr>
-                      <m:t>=</m:t>
-                    </m:r>
-                    <m:r>
-                      <a:rPr lang="en-GB" sz="2800" b="0" i="1" smtClean="0">
-                        <a:latin typeface="Cambria Math"/>
-                        <a:ea typeface="Cambria Math" pitchFamily="18" charset="0"/>
-                      </a:rPr>
-                      <m:t>𝐴𝐵𝐶</m:t>
-                    </m:r>
-                  </m:oMath>
-                </a14:m>
-                <a:endParaRPr lang="en-GB" sz="2800" i="1" dirty="0" smtClean="0">
-                  <a:latin typeface="Cambria Math" pitchFamily="18" charset="0"/>
-                  <a:ea typeface="Cambria Math" pitchFamily="18" charset="0"/>
-                </a:endParaRPr>
-              </a:p>
-              <a:p>
-                <a:pPr marL="457200" indent="-457200">
-                  <a:buFont typeface="Arial" pitchFamily="34" charset="0"/>
-                  <a:buChar char="•"/>
-                </a:pPr>
-                <a14:m>
-                  <m:oMath xmlns:m="http://schemas.openxmlformats.org/officeDocument/2006/math">
-                    <m:sSup>
-                      <m:sSupPr>
-                        <m:ctrlPr>
-                          <a:rPr lang="en-GB" sz="2800" i="1" smtClean="0">
-                            <a:latin typeface="Cambria Math"/>
-                            <a:ea typeface="Cambria Math" pitchFamily="18" charset="0"/>
-                          </a:rPr>
-                        </m:ctrlPr>
-                      </m:sSupPr>
-                      <m:e>
-                        <m:r>
-                          <a:rPr lang="en-GB" sz="2800" b="0" i="1" smtClean="0">
-                            <a:latin typeface="Cambria Math"/>
-                            <a:ea typeface="Cambria Math" pitchFamily="18" charset="0"/>
-                          </a:rPr>
-                          <m:t>𝐺</m:t>
-                        </m:r>
-                      </m:e>
-                      <m:sup>
-                        <m:r>
-                          <a:rPr lang="en-GB" sz="2800" b="0" i="1" smtClean="0">
-                            <a:latin typeface="Cambria Math"/>
-                            <a:ea typeface="Cambria Math" pitchFamily="18" charset="0"/>
-                          </a:rPr>
-                          <m:t>𝑐</m:t>
-                        </m:r>
-                      </m:sup>
-                    </m:sSup>
-                  </m:oMath>
-                </a14:m>
-                <a:r>
-                  <a:rPr lang="en-GB" sz="2800" i="1" dirty="0" smtClean="0">
-                    <a:latin typeface="Cambria Math" pitchFamily="18" charset="0"/>
-                    <a:ea typeface="Cambria Math" pitchFamily="18" charset="0"/>
-                  </a:rPr>
-                  <a:t>,</a:t>
-                </a:r>
-                <a:r>
-                  <a:rPr lang="en-GB" sz="2800" dirty="0">
-                    <a:ea typeface="Cambria Math" pitchFamily="18" charset="0"/>
-                  </a:rPr>
-                  <a:t> </a:t>
-                </a:r>
-                <a14:m>
-                  <m:oMath xmlns:m="http://schemas.openxmlformats.org/officeDocument/2006/math">
-                    <m:sSup>
-                      <m:sSupPr>
-                        <m:ctrlPr>
-                          <a:rPr lang="en-GB" sz="2800" i="1">
-                            <a:latin typeface="Cambria Math"/>
-                            <a:ea typeface="Cambria Math" pitchFamily="18" charset="0"/>
-                          </a:rPr>
-                        </m:ctrlPr>
-                      </m:sSupPr>
-                      <m:e>
-                        <m:r>
-                          <a:rPr lang="en-GB" sz="2800" i="1">
-                            <a:latin typeface="Cambria Math"/>
-                            <a:ea typeface="Cambria Math" pitchFamily="18" charset="0"/>
-                          </a:rPr>
-                          <m:t>𝐺</m:t>
-                        </m:r>
-                      </m:e>
-                      <m:sup>
-                        <m:r>
-                          <a:rPr lang="en-GB" sz="2800" b="0" i="1" smtClean="0">
-                            <a:latin typeface="Cambria Math"/>
-                            <a:ea typeface="Cambria Math" pitchFamily="18" charset="0"/>
-                          </a:rPr>
-                          <m:t>𝑝</m:t>
-                        </m:r>
-                      </m:sup>
-                    </m:sSup>
-                  </m:oMath>
-                </a14:m>
-                <a:r>
-                  <a:rPr lang="en-GB" sz="2800" i="1" dirty="0" smtClean="0">
-                    <a:latin typeface="Cambria Math" pitchFamily="18" charset="0"/>
-                    <a:ea typeface="Cambria Math" pitchFamily="18" charset="0"/>
-                  </a:rPr>
-                  <a:t>, </a:t>
-                </a:r>
-                <a14:m>
-                  <m:oMath xmlns:m="http://schemas.openxmlformats.org/officeDocument/2006/math">
-                    <m:sSup>
-                      <m:sSupPr>
-                        <m:ctrlPr>
-                          <a:rPr lang="en-GB" sz="2800" i="1">
-                            <a:latin typeface="Cambria Math"/>
-                            <a:ea typeface="Cambria Math" pitchFamily="18" charset="0"/>
-                          </a:rPr>
-                        </m:ctrlPr>
-                      </m:sSupPr>
-                      <m:e>
-                        <m:r>
-                          <a:rPr lang="en-GB" sz="2800" i="1">
-                            <a:latin typeface="Cambria Math"/>
-                            <a:ea typeface="Cambria Math" pitchFamily="18" charset="0"/>
-                          </a:rPr>
-                          <m:t>𝐺</m:t>
-                        </m:r>
-                      </m:e>
-                      <m:sup>
-                        <m:r>
-                          <a:rPr lang="en-GB" sz="2800" b="0" i="1" smtClean="0">
-                            <a:latin typeface="Cambria Math"/>
-                            <a:ea typeface="Cambria Math" pitchFamily="18" charset="0"/>
-                          </a:rPr>
-                          <m:t>𝑓</m:t>
-                        </m:r>
-                      </m:sup>
-                    </m:sSup>
-                  </m:oMath>
-                </a14:m>
-                <a:endParaRPr lang="en-GB" sz="2800" i="1" dirty="0" smtClean="0">
-                  <a:latin typeface="Cambria Math" pitchFamily="18" charset="0"/>
-                  <a:ea typeface="Cambria Math" pitchFamily="18" charset="0"/>
-                </a:endParaRPr>
-              </a:p>
-              <a:p>
-                <a:pPr marL="457200" indent="-457200">
-                  <a:buFont typeface="Arial" pitchFamily="34" charset="0"/>
-                  <a:buChar char="•"/>
-                </a:pPr>
-                <a14:m>
-                  <m:oMath xmlns:m="http://schemas.openxmlformats.org/officeDocument/2006/math">
-                    <m:r>
-                      <a:rPr lang="en-GB" sz="2800" b="0" i="1" smtClean="0">
-                        <a:latin typeface="Cambria Math"/>
-                        <a:ea typeface="Cambria Math" pitchFamily="18" charset="0"/>
-                      </a:rPr>
-                      <m:t>𝑝</m:t>
-                    </m:r>
-                    <m:r>
-                      <a:rPr lang="en-GB" sz="2800" b="0" i="1" smtClean="0">
-                        <a:latin typeface="Cambria Math"/>
-                        <a:ea typeface="Cambria Math" pitchFamily="18" charset="0"/>
-                      </a:rPr>
-                      <m:t>(</m:t>
-                    </m:r>
-                    <m:sSup>
-                      <m:sSupPr>
-                        <m:ctrlPr>
-                          <a:rPr lang="en-GB" sz="2800" i="1">
-                            <a:latin typeface="Cambria Math"/>
-                            <a:ea typeface="Cambria Math" pitchFamily="18" charset="0"/>
-                          </a:rPr>
-                        </m:ctrlPr>
-                      </m:sSupPr>
-                      <m:e>
-                        <m:r>
-                          <a:rPr lang="en-GB" sz="2800" i="1">
-                            <a:latin typeface="Cambria Math"/>
-                            <a:ea typeface="Cambria Math" pitchFamily="18" charset="0"/>
-                          </a:rPr>
-                          <m:t>𝐺</m:t>
-                        </m:r>
-                      </m:e>
-                      <m:sup>
-                        <m:r>
-                          <a:rPr lang="en-GB" sz="2800" i="1">
-                            <a:latin typeface="Cambria Math"/>
-                            <a:ea typeface="Cambria Math" pitchFamily="18" charset="0"/>
-                          </a:rPr>
-                          <m:t>𝑝</m:t>
-                        </m:r>
-                      </m:sup>
-                    </m:sSup>
-                    <m:r>
-                      <a:rPr lang="en-GB" sz="2800" b="0" i="1" smtClean="0">
-                        <a:latin typeface="Cambria Math"/>
-                        <a:ea typeface="Cambria Math" pitchFamily="18" charset="0"/>
-                      </a:rPr>
-                      <m:t>|</m:t>
-                    </m:r>
-                    <m:sSup>
-                      <m:sSupPr>
-                        <m:ctrlPr>
-                          <a:rPr lang="en-GB" sz="2800" i="1">
-                            <a:latin typeface="Cambria Math"/>
-                            <a:ea typeface="Cambria Math" pitchFamily="18" charset="0"/>
-                          </a:rPr>
-                        </m:ctrlPr>
-                      </m:sSupPr>
-                      <m:e>
-                        <m:r>
-                          <a:rPr lang="en-GB" sz="2800" i="1">
-                            <a:latin typeface="Cambria Math"/>
-                            <a:ea typeface="Cambria Math" pitchFamily="18" charset="0"/>
-                          </a:rPr>
-                          <m:t>𝐺</m:t>
-                        </m:r>
-                      </m:e>
-                      <m:sup>
-                        <m:r>
-                          <a:rPr lang="en-GB" sz="2800" i="1">
-                            <a:latin typeface="Cambria Math"/>
-                            <a:ea typeface="Cambria Math" pitchFamily="18" charset="0"/>
-                          </a:rPr>
-                          <m:t>𝑐</m:t>
-                        </m:r>
-                      </m:sup>
-                    </m:sSup>
-                    <m:r>
-                      <a:rPr lang="en-GB" sz="2800" b="0" i="1" smtClean="0">
-                        <a:latin typeface="Cambria Math"/>
-                        <a:ea typeface="Cambria Math" pitchFamily="18" charset="0"/>
-                      </a:rPr>
-                      <m:t>=</m:t>
-                    </m:r>
-                    <m:r>
-                      <a:rPr lang="en-GB" sz="2800" b="0" i="1" smtClean="0">
-                        <a:latin typeface="Cambria Math"/>
-                        <a:ea typeface="Cambria Math" pitchFamily="18" charset="0"/>
-                      </a:rPr>
-                      <m:t>𝑋</m:t>
-                    </m:r>
-                    <m:r>
-                      <a:rPr lang="en-GB" sz="2800" b="0" i="1" smtClean="0">
-                        <a:latin typeface="Cambria Math"/>
-                        <a:ea typeface="Cambria Math" pitchFamily="18" charset="0"/>
-                      </a:rPr>
-                      <m:t>)</m:t>
-                    </m:r>
-                  </m:oMath>
-                </a14:m>
-                <a:endParaRPr lang="en-GB" sz="2800" i="1" dirty="0" smtClean="0">
-                  <a:latin typeface="Cambria Math" pitchFamily="18" charset="0"/>
-                  <a:ea typeface="Cambria Math" pitchFamily="18" charset="0"/>
-                </a:endParaRPr>
-              </a:p>
-              <a:p>
-                <a:pPr marL="457200" indent="-457200">
-                  <a:buFont typeface="Arial" pitchFamily="34" charset="0"/>
-                  <a:buChar char="•"/>
-                </a:pPr>
-                <a:endParaRPr lang="en-GB" sz="2800" i="1" dirty="0">
-                  <a:latin typeface="Cambria Math" pitchFamily="18" charset="0"/>
-                  <a:ea typeface="Cambria Math" pitchFamily="18" charset="0"/>
-                </a:endParaRPr>
-              </a:p>
-            </p:txBody>
-          </p:sp>
-        </mc:Choice>
-        <mc:Fallback>
-          <p:sp>
-            <p:nvSpPr>
-              <p:cNvPr id="3" name="TextBox 2"/>
-              <p:cNvSpPr txBox="1">
-                <a:spLocks noRot="1" noChangeAspect="1" noMove="1" noResize="1" noEditPoints="1" noAdjustHandles="1" noChangeArrowheads="1" noChangeShapeType="1" noTextEdit="1"/>
-              </p:cNvSpPr>
-              <p:nvPr/>
-            </p:nvSpPr>
-            <p:spPr>
-              <a:xfrm>
-                <a:off x="971600" y="1412776"/>
-                <a:ext cx="2832057" cy="1827808"/>
-              </a:xfrm>
-              <a:prstGeom prst="rect">
-                <a:avLst/>
-              </a:prstGeom>
-              <a:blipFill rotWithShape="1">
-                <a:blip r:embed="rId3"/>
-                <a:stretch>
-                  <a:fillRect/>
-                </a:stretch>
-              </a:blipFill>
-            </p:spPr>
-            <p:txBody>
-              <a:bodyPr/>
-              <a:lstStyle/>
-              <a:p>
-                <a:r>
-                  <a:rPr lang="en-GB">
-                    <a:noFill/>
-                  </a:rPr>
-                  <a:t> </a:t>
-                </a:r>
-              </a:p>
-            </p:txBody>
-          </p:sp>
-        </mc:Fallback>
-      </mc:AlternateContent>
-      <p:sp>
-        <p:nvSpPr>
-          <p:cNvPr id="7" name="Oval 6"/>
-          <p:cNvSpPr/>
-          <p:nvPr/>
-        </p:nvSpPr>
-        <p:spPr>
-          <a:xfrm>
-            <a:off x="6849010" y="1052736"/>
-            <a:ext cx="687917" cy="648072"/>
-          </a:xfrm>
-          <a:prstGeom prst="ellipse">
-            <a:avLst/>
-          </a:prstGeom>
-          <a:solidFill>
-            <a:srgbClr val="FFC000"/>
-          </a:solidFill>
-          <a:ln>
-            <a:solidFill>
-              <a:schemeClr val="tx1"/>
-            </a:solidFill>
-          </a:ln>
-        </p:spPr>
-        <p:style>
-          <a:lnRef idx="2">
-            <a:schemeClr val="accent1">
-              <a:shade val="50000"/>
-            </a:schemeClr>
-          </a:lnRef>
-          <a:fillRef idx="1">
-            <a:schemeClr val="accent1"/>
-          </a:fillRef>
-          <a:effectRef idx="0">
-            <a:schemeClr val="accent1"/>
-          </a:effectRef>
-          <a:fontRef idx="minor">
-            <a:schemeClr val="lt1"/>
-          </a:fontRef>
-        </p:style>
-        <p:txBody>
-          <a:bodyPr rtlCol="0" anchor="ctr"/>
-          <a:lstStyle/>
-          <a:p>
-            <a:pPr algn="ctr"/>
-            <a:r>
-              <a:rPr lang="en-GB" sz="1400" dirty="0" smtClean="0">
-                <a:solidFill>
-                  <a:schemeClr val="tx1"/>
-                </a:solidFill>
-              </a:rPr>
-              <a:t>A</a:t>
-            </a:r>
-          </a:p>
-          <a:p>
-            <a:pPr algn="ctr"/>
-            <a:r>
-              <a:rPr lang="en-GB" sz="1400" dirty="0" smtClean="0">
-                <a:solidFill>
-                  <a:schemeClr val="tx1"/>
-                </a:solidFill>
-              </a:rPr>
-              <a:t>Or</a:t>
-            </a:r>
-            <a:endParaRPr lang="en-GB" sz="1400" dirty="0">
-              <a:solidFill>
-                <a:schemeClr val="tx1"/>
-              </a:solidFill>
-            </a:endParaRPr>
-          </a:p>
-        </p:txBody>
-      </p:sp>
-      <p:sp>
-        <p:nvSpPr>
-          <p:cNvPr id="8" name="Oval 7"/>
-          <p:cNvSpPr/>
-          <p:nvPr/>
-        </p:nvSpPr>
-        <p:spPr>
-          <a:xfrm>
-            <a:off x="7697079" y="2143757"/>
-            <a:ext cx="687917" cy="648072"/>
-          </a:xfrm>
-          <a:prstGeom prst="ellipse">
-            <a:avLst/>
-          </a:prstGeom>
-          <a:solidFill>
-            <a:schemeClr val="accent3">
-              <a:lumMod val="60000"/>
-              <a:lumOff val="40000"/>
-            </a:schemeClr>
-          </a:solidFill>
-          <a:ln>
-            <a:solidFill>
-              <a:schemeClr val="tx1"/>
-            </a:solidFill>
-          </a:ln>
-        </p:spPr>
-        <p:style>
-          <a:lnRef idx="2">
-            <a:schemeClr val="accent1">
-              <a:shade val="50000"/>
-            </a:schemeClr>
-          </a:lnRef>
-          <a:fillRef idx="1">
-            <a:schemeClr val="accent1"/>
-          </a:fillRef>
-          <a:effectRef idx="0">
-            <a:schemeClr val="accent1"/>
-          </a:effectRef>
-          <a:fontRef idx="minor">
-            <a:schemeClr val="lt1"/>
-          </a:fontRef>
-        </p:style>
-        <p:txBody>
-          <a:bodyPr rtlCol="0" anchor="ctr"/>
-          <a:lstStyle/>
-          <a:p>
-            <a:pPr algn="ctr"/>
-            <a:r>
-              <a:rPr lang="en-GB" sz="1400" dirty="0" smtClean="0">
-                <a:solidFill>
-                  <a:schemeClr val="tx1"/>
-                </a:solidFill>
-              </a:rPr>
-              <a:t>C</a:t>
-            </a:r>
-          </a:p>
-          <a:p>
-            <a:pPr algn="ctr"/>
-            <a:r>
-              <a:rPr lang="en-GB" sz="1400" dirty="0" smtClean="0">
-                <a:solidFill>
-                  <a:schemeClr val="tx1"/>
-                </a:solidFill>
-              </a:rPr>
-              <a:t>XOR</a:t>
-            </a:r>
-            <a:endParaRPr lang="en-GB" sz="1400" dirty="0">
-              <a:solidFill>
-                <a:schemeClr val="tx1"/>
-              </a:solidFill>
-            </a:endParaRPr>
-          </a:p>
-        </p:txBody>
-      </p:sp>
-      <p:sp>
-        <p:nvSpPr>
-          <p:cNvPr id="9" name="Oval 8"/>
-          <p:cNvSpPr/>
-          <p:nvPr/>
-        </p:nvSpPr>
-        <p:spPr>
-          <a:xfrm>
-            <a:off x="5938866" y="2143757"/>
-            <a:ext cx="722652" cy="648072"/>
-          </a:xfrm>
-          <a:prstGeom prst="ellipse">
-            <a:avLst/>
-          </a:prstGeom>
-          <a:solidFill>
-            <a:schemeClr val="accent3">
-              <a:lumMod val="60000"/>
-              <a:lumOff val="40000"/>
-            </a:schemeClr>
-          </a:solidFill>
-          <a:ln>
-            <a:solidFill>
-              <a:schemeClr val="tx1"/>
-            </a:solidFill>
-          </a:ln>
-        </p:spPr>
-        <p:style>
-          <a:lnRef idx="2">
-            <a:schemeClr val="accent1">
-              <a:shade val="50000"/>
-            </a:schemeClr>
-          </a:lnRef>
-          <a:fillRef idx="1">
-            <a:schemeClr val="accent1"/>
-          </a:fillRef>
-          <a:effectRef idx="0">
-            <a:schemeClr val="accent1"/>
-          </a:effectRef>
-          <a:fontRef idx="minor">
-            <a:schemeClr val="lt1"/>
-          </a:fontRef>
-        </p:style>
-        <p:txBody>
-          <a:bodyPr rtlCol="0" anchor="ctr"/>
-          <a:lstStyle/>
-          <a:p>
-            <a:pPr algn="ctr"/>
-            <a:r>
-              <a:rPr lang="en-GB" sz="1400" dirty="0" smtClean="0">
-                <a:solidFill>
-                  <a:schemeClr val="tx1"/>
-                </a:solidFill>
-              </a:rPr>
-              <a:t>B AND</a:t>
-            </a:r>
-            <a:endParaRPr lang="en-GB" sz="1400" dirty="0">
-              <a:solidFill>
-                <a:schemeClr val="tx1"/>
-              </a:solidFill>
-            </a:endParaRPr>
-          </a:p>
-        </p:txBody>
-      </p:sp>
-      <p:cxnSp>
-        <p:nvCxnSpPr>
-          <p:cNvPr id="11" name="Straight Arrow Connector 10"/>
-          <p:cNvCxnSpPr>
-            <a:stCxn id="7" idx="3"/>
-            <a:endCxn id="9" idx="7"/>
-          </p:cNvCxnSpPr>
-          <p:nvPr/>
-        </p:nvCxnSpPr>
-        <p:spPr>
-          <a:xfrm flipH="1">
-            <a:off x="6555688" y="1605900"/>
-            <a:ext cx="394065" cy="632765"/>
-          </a:xfrm>
-          <a:prstGeom prst="straightConnector1">
-            <a:avLst/>
-          </a:prstGeom>
-          <a:ln w="25400">
-            <a:solidFill>
-              <a:schemeClr val="tx1"/>
-            </a:solidFill>
-            <a:headEnd type="arrow"/>
-            <a:tailEnd type="arrow"/>
-          </a:ln>
-        </p:spPr>
-        <p:style>
-          <a:lnRef idx="1">
-            <a:schemeClr val="accent1"/>
-          </a:lnRef>
-          <a:fillRef idx="0">
-            <a:schemeClr val="accent1"/>
-          </a:fillRef>
-          <a:effectRef idx="0">
-            <a:schemeClr val="accent1"/>
-          </a:effectRef>
-          <a:fontRef idx="minor">
-            <a:schemeClr val="tx1"/>
-          </a:fontRef>
-        </p:style>
-      </p:cxnSp>
-      <p:cxnSp>
-        <p:nvCxnSpPr>
-          <p:cNvPr id="12" name="Straight Arrow Connector 11"/>
-          <p:cNvCxnSpPr>
-            <a:stCxn id="7" idx="5"/>
-            <a:endCxn id="8" idx="1"/>
-          </p:cNvCxnSpPr>
-          <p:nvPr/>
-        </p:nvCxnSpPr>
-        <p:spPr>
-          <a:xfrm>
-            <a:off x="7436184" y="1605900"/>
-            <a:ext cx="361638" cy="632765"/>
-          </a:xfrm>
-          <a:prstGeom prst="straightConnector1">
-            <a:avLst/>
-          </a:prstGeom>
-          <a:ln w="25400">
-            <a:solidFill>
-              <a:schemeClr val="tx1"/>
-            </a:solidFill>
-            <a:headEnd type="arrow"/>
-            <a:tailEnd type="arrow"/>
-          </a:ln>
-        </p:spPr>
-        <p:style>
-          <a:lnRef idx="1">
-            <a:schemeClr val="accent1"/>
-          </a:lnRef>
-          <a:fillRef idx="0">
-            <a:schemeClr val="accent1"/>
-          </a:fillRef>
-          <a:effectRef idx="0">
-            <a:schemeClr val="accent1"/>
-          </a:effectRef>
-          <a:fontRef idx="minor">
-            <a:schemeClr val="tx1"/>
-          </a:fontRef>
-        </p:style>
-      </p:cxnSp>
-      <p:cxnSp>
-        <p:nvCxnSpPr>
-          <p:cNvPr id="13" name="Straight Arrow Connector 12"/>
-          <p:cNvCxnSpPr>
-            <a:stCxn id="9" idx="6"/>
-            <a:endCxn id="8" idx="2"/>
-          </p:cNvCxnSpPr>
-          <p:nvPr/>
-        </p:nvCxnSpPr>
-        <p:spPr>
-          <a:xfrm>
-            <a:off x="6661518" y="2467793"/>
-            <a:ext cx="1035561" cy="0"/>
-          </a:xfrm>
-          <a:prstGeom prst="straightConnector1">
-            <a:avLst/>
-          </a:prstGeom>
-          <a:ln w="25400">
-            <a:solidFill>
-              <a:schemeClr val="tx1"/>
-            </a:solidFill>
-            <a:headEnd type="arrow"/>
-            <a:tailEnd type="arrow"/>
-          </a:ln>
-        </p:spPr>
-        <p:style>
-          <a:lnRef idx="1">
-            <a:schemeClr val="accent1"/>
-          </a:lnRef>
-          <a:fillRef idx="0">
-            <a:schemeClr val="accent1"/>
-          </a:fillRef>
-          <a:effectRef idx="0">
-            <a:schemeClr val="accent1"/>
-          </a:effectRef>
-          <a:fontRef idx="minor">
-            <a:schemeClr val="tx1"/>
-          </a:fontRef>
-        </p:style>
-      </p:cxnSp>
-      <mc:AlternateContent xmlns:mc="http://schemas.openxmlformats.org/markup-compatibility/2006">
-        <mc:Choice xmlns:a14="http://schemas.microsoft.com/office/drawing/2010/main" Requires="a14">
-          <p:sp>
-            <p:nvSpPr>
               <p:cNvPr id="23" name="TextBox 22"/>
               <p:cNvSpPr txBox="1"/>
               <p:nvPr/>
@@ -31025,11 +30462,11 @@
                     </m:oMathParaPr>
                     <m:oMath xmlns:m="http://schemas.openxmlformats.org/officeDocument/2006/math">
                       <m:r>
-                        <a:rPr lang="en-GB" sz="2000" b="0" i="1" smtClean="0">
+                        <a:rPr lang="en-GB" sz="2000" b="1" i="1" smtClean="0">
                           <a:latin typeface="Cambria Math"/>
                           <a:ea typeface="Cambria Math" pitchFamily="18" charset="0"/>
                         </a:rPr>
-                        <m:t>𝑝</m:t>
+                        <m:t>𝒑</m:t>
                       </m:r>
                       <m:r>
                         <a:rPr lang="en-GB" sz="2000" i="1">
@@ -31431,7 +30868,7 @@
                 <a:avLst/>
               </a:prstGeom>
               <a:blipFill rotWithShape="1">
-                <a:blip r:embed="rId4"/>
+                <a:blip r:embed="rId2"/>
                 <a:stretch>
                   <a:fillRect l="-1133" t="-1190"/>
                 </a:stretch>
@@ -31452,6 +30889,1004 @@
           </p:sp>
         </mc:Fallback>
       </mc:AlternateContent>
+      <mc:AlternateContent xmlns:mc="http://schemas.openxmlformats.org/markup-compatibility/2006">
+        <mc:Choice xmlns:a14="http://schemas.microsoft.com/office/drawing/2010/main" Requires="a14">
+          <p:sp>
+            <p:nvSpPr>
+              <p:cNvPr id="32" name="TextBox 31"/>
+              <p:cNvSpPr txBox="1"/>
+              <p:nvPr/>
+            </p:nvSpPr>
+            <p:spPr>
+              <a:xfrm>
+                <a:off x="1115616" y="3575678"/>
+                <a:ext cx="7200800" cy="1639744"/>
+              </a:xfrm>
+              <a:prstGeom prst="rect">
+                <a:avLst/>
+              </a:prstGeom>
+              <a:noFill/>
+            </p:spPr>
+            <p:txBody>
+              <a:bodyPr wrap="square" rtlCol="0">
+                <a:spAutoFit/>
+              </a:bodyPr>
+              <a:lstStyle/>
+              <a:p>
+                <a:r>
+                  <a:rPr lang="en-GB" sz="2000" dirty="0" smtClean="0"/>
+                  <a:t>We can also compute repertoires for subsets of the system:</a:t>
+                </a:r>
+              </a:p>
+              <a:p>
+                <a:endParaRPr lang="en-GB" sz="2000" dirty="0"/>
+              </a:p>
+              <a:p>
+                <a14:m>
+                  <m:oMathPara xmlns:m="http://schemas.openxmlformats.org/officeDocument/2006/math">
+                    <m:oMathParaPr>
+                      <m:jc m:val="centerGroup"/>
+                    </m:oMathParaPr>
+                    <m:oMath xmlns:m="http://schemas.openxmlformats.org/officeDocument/2006/math">
+                      <m:r>
+                        <a:rPr lang="en-GB" sz="2000" b="1" i="1">
+                          <a:latin typeface="Cambria Math"/>
+                          <a:ea typeface="Cambria Math" pitchFamily="18" charset="0"/>
+                        </a:rPr>
+                        <m:t>𝒑</m:t>
+                      </m:r>
+                      <m:r>
+                        <a:rPr lang="en-GB" sz="2000" i="1">
+                          <a:latin typeface="Cambria Math"/>
+                          <a:ea typeface="Cambria Math" pitchFamily="18" charset="0"/>
+                        </a:rPr>
+                        <m:t>(</m:t>
+                      </m:r>
+                      <m:sSup>
+                        <m:sSupPr>
+                          <m:ctrlPr>
+                            <a:rPr lang="en-GB" sz="2000" i="1">
+                              <a:latin typeface="Cambria Math"/>
+                              <a:ea typeface="Cambria Math" pitchFamily="18" charset="0"/>
+                            </a:rPr>
+                          </m:ctrlPr>
+                        </m:sSupPr>
+                        <m:e>
+                          <m:r>
+                            <a:rPr lang="en-GB" sz="2000" b="0" i="1" smtClean="0">
+                              <a:latin typeface="Cambria Math"/>
+                              <a:ea typeface="Cambria Math" pitchFamily="18" charset="0"/>
+                            </a:rPr>
+                            <m:t>𝐴𝐵</m:t>
+                          </m:r>
+                        </m:e>
+                        <m:sup>
+                          <m:r>
+                            <a:rPr lang="en-GB" sz="2000" i="1">
+                              <a:latin typeface="Cambria Math"/>
+                              <a:ea typeface="Cambria Math" pitchFamily="18" charset="0"/>
+                            </a:rPr>
+                            <m:t>𝑓</m:t>
+                          </m:r>
+                        </m:sup>
+                      </m:sSup>
+                      <m:r>
+                        <a:rPr lang="en-GB" sz="2000" i="1">
+                          <a:latin typeface="Cambria Math"/>
+                          <a:ea typeface="Cambria Math" pitchFamily="18" charset="0"/>
+                        </a:rPr>
+                        <m:t>|</m:t>
+                      </m:r>
+                      <m:sSup>
+                        <m:sSupPr>
+                          <m:ctrlPr>
+                            <a:rPr lang="en-GB" sz="2000" i="1">
+                              <a:latin typeface="Cambria Math"/>
+                              <a:ea typeface="Cambria Math" pitchFamily="18" charset="0"/>
+                            </a:rPr>
+                          </m:ctrlPr>
+                        </m:sSupPr>
+                        <m:e>
+                          <m:r>
+                            <a:rPr lang="en-GB" sz="2000" b="0" i="1" smtClean="0">
+                              <a:latin typeface="Cambria Math"/>
+                              <a:ea typeface="Cambria Math" pitchFamily="18" charset="0"/>
+                            </a:rPr>
+                            <m:t>𝐵𝐶</m:t>
+                          </m:r>
+                        </m:e>
+                        <m:sup>
+                          <m:r>
+                            <a:rPr lang="en-GB" sz="2000" i="1">
+                              <a:latin typeface="Cambria Math"/>
+                              <a:ea typeface="Cambria Math" pitchFamily="18" charset="0"/>
+                            </a:rPr>
+                            <m:t>𝑐</m:t>
+                          </m:r>
+                        </m:sup>
+                      </m:sSup>
+                      <m:r>
+                        <a:rPr lang="en-GB" sz="2000" i="1">
+                          <a:latin typeface="Cambria Math"/>
+                          <a:ea typeface="Cambria Math" pitchFamily="18" charset="0"/>
+                        </a:rPr>
+                        <m:t>=</m:t>
+                      </m:r>
+                      <m:r>
+                        <a:rPr lang="en-GB" sz="2000" i="1">
+                          <a:latin typeface="Cambria Math"/>
+                          <a:ea typeface="Cambria Math" pitchFamily="18" charset="0"/>
+                        </a:rPr>
+                        <m:t>0</m:t>
+                      </m:r>
+                      <m:r>
+                        <a:rPr lang="en-GB" sz="2000" b="0" i="1" smtClean="0">
+                          <a:latin typeface="Cambria Math"/>
+                          <a:ea typeface="Cambria Math" pitchFamily="18" charset="0"/>
+                        </a:rPr>
+                        <m:t>1</m:t>
+                      </m:r>
+                      <m:r>
+                        <a:rPr lang="en-GB" sz="2000" i="1">
+                          <a:latin typeface="Cambria Math"/>
+                          <a:ea typeface="Cambria Math" pitchFamily="18" charset="0"/>
+                        </a:rPr>
+                        <m:t>)</m:t>
+                      </m:r>
+                    </m:oMath>
+                  </m:oMathPara>
+                </a14:m>
+                <a:endParaRPr lang="en-GB" sz="2000" i="1" dirty="0" smtClean="0">
+                  <a:latin typeface="Cambria Math" pitchFamily="18" charset="0"/>
+                  <a:ea typeface="Cambria Math" pitchFamily="18" charset="0"/>
+                </a:endParaRPr>
+              </a:p>
+              <a:p>
+                <a:endParaRPr lang="en-GB" sz="2000" i="1" dirty="0" smtClean="0">
+                  <a:latin typeface="Cambria Math"/>
+                  <a:ea typeface="Cambria Math" pitchFamily="18" charset="0"/>
+                </a:endParaRPr>
+              </a:p>
+              <a:p>
+                <a14:m>
+                  <m:oMathPara xmlns:m="http://schemas.openxmlformats.org/officeDocument/2006/math">
+                    <m:oMathParaPr>
+                      <m:jc m:val="centerGroup"/>
+                    </m:oMathParaPr>
+                    <m:oMath xmlns:m="http://schemas.openxmlformats.org/officeDocument/2006/math">
+                      <m:d>
+                        <m:dPr>
+                          <m:begChr m:val="["/>
+                          <m:endChr m:val="]"/>
+                          <m:ctrlPr>
+                            <a:rPr lang="en-GB" sz="2000" i="1">
+                              <a:latin typeface="Cambria Math"/>
+                              <a:ea typeface="Cambria Math" pitchFamily="18" charset="0"/>
+                            </a:rPr>
+                          </m:ctrlPr>
+                        </m:dPr>
+                        <m:e>
+                          <m:m>
+                            <m:mPr>
+                              <m:mcs>
+                                <m:mc>
+                                  <m:mcPr>
+                                    <m:count m:val="4"/>
+                                    <m:mcJc m:val="center"/>
+                                  </m:mcPr>
+                                </m:mc>
+                              </m:mcs>
+                              <m:ctrlPr>
+                                <a:rPr lang="en-GB" sz="2000" i="1">
+                                  <a:latin typeface="Cambria Math"/>
+                                  <a:ea typeface="Cambria Math" pitchFamily="18" charset="0"/>
+                                </a:rPr>
+                              </m:ctrlPr>
+                            </m:mPr>
+                            <m:mr>
+                              <m:e>
+                                <m:r>
+                                  <a:rPr lang="en-GB" sz="2000" i="1">
+                                    <a:latin typeface="Cambria Math"/>
+                                    <a:ea typeface="Cambria Math" pitchFamily="18" charset="0"/>
+                                  </a:rPr>
+                                  <m:t>0</m:t>
+                                </m:r>
+                              </m:e>
+                              <m:e>
+                                <m:r>
+                                  <a:rPr lang="en-GB" sz="2000" b="0" i="1" smtClean="0">
+                                    <a:latin typeface="Cambria Math"/>
+                                    <a:ea typeface="Cambria Math" pitchFamily="18" charset="0"/>
+                                  </a:rPr>
+                                  <m:t>0.5</m:t>
+                                </m:r>
+                              </m:e>
+                              <m:e>
+                                <m:r>
+                                  <a:rPr lang="en-GB" sz="2000" i="1">
+                                    <a:latin typeface="Cambria Math"/>
+                                    <a:ea typeface="Cambria Math" pitchFamily="18" charset="0"/>
+                                  </a:rPr>
+                                  <m:t>0</m:t>
+                                </m:r>
+                              </m:e>
+                              <m:e>
+                                <m:r>
+                                  <a:rPr lang="en-GB" sz="2000" i="1">
+                                    <a:latin typeface="Cambria Math"/>
+                                    <a:ea typeface="Cambria Math" pitchFamily="18" charset="0"/>
+                                  </a:rPr>
+                                  <m:t>0</m:t>
+                                </m:r>
+                                <m:r>
+                                  <a:rPr lang="en-GB" sz="2000" b="0" i="1" smtClean="0">
+                                    <a:latin typeface="Cambria Math"/>
+                                    <a:ea typeface="Cambria Math" pitchFamily="18" charset="0"/>
+                                  </a:rPr>
+                                  <m:t>.5</m:t>
+                                </m:r>
+                              </m:e>
+                            </m:mr>
+                          </m:m>
+                        </m:e>
+                      </m:d>
+                    </m:oMath>
+                  </m:oMathPara>
+                </a14:m>
+                <a:endParaRPr lang="en-GB" sz="2000" i="1" dirty="0">
+                  <a:latin typeface="Cambria Math" pitchFamily="18" charset="0"/>
+                  <a:ea typeface="Cambria Math" pitchFamily="18" charset="0"/>
+                </a:endParaRPr>
+              </a:p>
+            </p:txBody>
+          </p:sp>
+        </mc:Choice>
+        <mc:Fallback>
+          <p:sp>
+            <p:nvSpPr>
+              <p:cNvPr id="32" name="TextBox 31"/>
+              <p:cNvSpPr txBox="1">
+                <a:spLocks noRot="1" noChangeAspect="1" noMove="1" noResize="1" noEditPoints="1" noAdjustHandles="1" noChangeArrowheads="1" noChangeShapeType="1" noTextEdit="1"/>
+              </p:cNvSpPr>
+              <p:nvPr/>
+            </p:nvSpPr>
+            <p:spPr>
+              <a:xfrm>
+                <a:off x="1115616" y="3575678"/>
+                <a:ext cx="7200800" cy="1639744"/>
+              </a:xfrm>
+              <a:prstGeom prst="rect">
+                <a:avLst/>
+              </a:prstGeom>
+              <a:blipFill rotWithShape="1">
+                <a:blip r:embed="rId3"/>
+                <a:stretch>
+                  <a:fillRect l="-847" t="-1859"/>
+                </a:stretch>
+              </a:blipFill>
+            </p:spPr>
+            <p:txBody>
+              <a:bodyPr/>
+              <a:lstStyle/>
+              <a:p>
+                <a:r>
+                  <a:rPr lang="en-GB">
+                    <a:noFill/>
+                  </a:rPr>
+                  <a:t> </a:t>
+                </a:r>
+              </a:p>
+            </p:txBody>
+          </p:sp>
+        </mc:Fallback>
+      </mc:AlternateContent>
+      <p:sp>
+        <p:nvSpPr>
+          <p:cNvPr id="2" name="TextBox 1"/>
+          <p:cNvSpPr txBox="1"/>
+          <p:nvPr/>
+        </p:nvSpPr>
+        <p:spPr>
+          <a:xfrm>
+            <a:off x="836320" y="98490"/>
+            <a:ext cx="5463872" cy="646331"/>
+          </a:xfrm>
+          <a:prstGeom prst="rect">
+            <a:avLst/>
+          </a:prstGeom>
+          <a:noFill/>
+        </p:spPr>
+        <p:txBody>
+          <a:bodyPr wrap="square" rtlCol="0">
+            <a:spAutoFit/>
+          </a:bodyPr>
+          <a:lstStyle/>
+          <a:p>
+            <a:r>
+              <a:rPr lang="en-GB" sz="3600" dirty="0" smtClean="0"/>
+              <a:t>Notation</a:t>
+            </a:r>
+            <a:endParaRPr lang="en-GB" sz="3600" dirty="0"/>
+          </a:p>
+        </p:txBody>
+      </p:sp>
+      <mc:AlternateContent xmlns:mc="http://schemas.openxmlformats.org/markup-compatibility/2006">
+        <mc:Choice xmlns:a14="http://schemas.microsoft.com/office/drawing/2010/main" Requires="a14">
+          <p:sp>
+            <p:nvSpPr>
+              <p:cNvPr id="3" name="TextBox 2"/>
+              <p:cNvSpPr txBox="1"/>
+              <p:nvPr/>
+            </p:nvSpPr>
+            <p:spPr>
+              <a:xfrm>
+                <a:off x="971600" y="1412776"/>
+                <a:ext cx="2832057" cy="1827808"/>
+              </a:xfrm>
+              <a:prstGeom prst="rect">
+                <a:avLst/>
+              </a:prstGeom>
+              <a:noFill/>
+            </p:spPr>
+            <p:txBody>
+              <a:bodyPr wrap="none" rtlCol="0">
+                <a:spAutoFit/>
+              </a:bodyPr>
+              <a:lstStyle/>
+              <a:p>
+                <a:pPr marL="457200" indent="-457200">
+                  <a:buFont typeface="Arial" pitchFamily="34" charset="0"/>
+                  <a:buChar char="•"/>
+                </a:pPr>
+                <a14:m>
+                  <m:oMath xmlns:m="http://schemas.openxmlformats.org/officeDocument/2006/math">
+                    <m:r>
+                      <a:rPr lang="en-GB" sz="2800" b="0" i="1" smtClean="0">
+                        <a:latin typeface="Cambria Math"/>
+                        <a:ea typeface="Cambria Math" pitchFamily="18" charset="0"/>
+                      </a:rPr>
+                      <m:t>𝐺</m:t>
+                    </m:r>
+                    <m:r>
+                      <a:rPr lang="en-GB" sz="2800" b="0" i="1" smtClean="0">
+                        <a:latin typeface="Cambria Math"/>
+                        <a:ea typeface="Cambria Math" pitchFamily="18" charset="0"/>
+                      </a:rPr>
+                      <m:t>=</m:t>
+                    </m:r>
+                    <m:r>
+                      <a:rPr lang="en-GB" sz="2800" b="0" i="1" smtClean="0">
+                        <a:latin typeface="Cambria Math"/>
+                        <a:ea typeface="Cambria Math" pitchFamily="18" charset="0"/>
+                      </a:rPr>
+                      <m:t>𝐴𝐵𝐶</m:t>
+                    </m:r>
+                  </m:oMath>
+                </a14:m>
+                <a:endParaRPr lang="en-GB" sz="2800" i="1" dirty="0" smtClean="0">
+                  <a:latin typeface="Cambria Math" pitchFamily="18" charset="0"/>
+                  <a:ea typeface="Cambria Math" pitchFamily="18" charset="0"/>
+                </a:endParaRPr>
+              </a:p>
+              <a:p>
+                <a:pPr marL="457200" indent="-457200">
+                  <a:buFont typeface="Arial" pitchFamily="34" charset="0"/>
+                  <a:buChar char="•"/>
+                </a:pPr>
+                <a14:m>
+                  <m:oMath xmlns:m="http://schemas.openxmlformats.org/officeDocument/2006/math">
+                    <m:sSup>
+                      <m:sSupPr>
+                        <m:ctrlPr>
+                          <a:rPr lang="en-GB" sz="2800" i="1" smtClean="0">
+                            <a:latin typeface="Cambria Math"/>
+                            <a:ea typeface="Cambria Math" pitchFamily="18" charset="0"/>
+                          </a:rPr>
+                        </m:ctrlPr>
+                      </m:sSupPr>
+                      <m:e>
+                        <m:r>
+                          <a:rPr lang="en-GB" sz="2800" b="0" i="1" smtClean="0">
+                            <a:latin typeface="Cambria Math"/>
+                            <a:ea typeface="Cambria Math" pitchFamily="18" charset="0"/>
+                          </a:rPr>
+                          <m:t>𝐺</m:t>
+                        </m:r>
+                      </m:e>
+                      <m:sup>
+                        <m:r>
+                          <a:rPr lang="en-GB" sz="2800" b="0" i="1" smtClean="0">
+                            <a:latin typeface="Cambria Math"/>
+                            <a:ea typeface="Cambria Math" pitchFamily="18" charset="0"/>
+                          </a:rPr>
+                          <m:t>𝑐</m:t>
+                        </m:r>
+                      </m:sup>
+                    </m:sSup>
+                  </m:oMath>
+                </a14:m>
+                <a:r>
+                  <a:rPr lang="en-GB" sz="2800" i="1" dirty="0" smtClean="0">
+                    <a:latin typeface="Cambria Math" pitchFamily="18" charset="0"/>
+                    <a:ea typeface="Cambria Math" pitchFamily="18" charset="0"/>
+                  </a:rPr>
+                  <a:t>,</a:t>
+                </a:r>
+                <a:r>
+                  <a:rPr lang="en-GB" sz="2800" dirty="0">
+                    <a:ea typeface="Cambria Math" pitchFamily="18" charset="0"/>
+                  </a:rPr>
+                  <a:t> </a:t>
+                </a:r>
+                <a14:m>
+                  <m:oMath xmlns:m="http://schemas.openxmlformats.org/officeDocument/2006/math">
+                    <m:sSup>
+                      <m:sSupPr>
+                        <m:ctrlPr>
+                          <a:rPr lang="en-GB" sz="2800" i="1">
+                            <a:latin typeface="Cambria Math"/>
+                            <a:ea typeface="Cambria Math" pitchFamily="18" charset="0"/>
+                          </a:rPr>
+                        </m:ctrlPr>
+                      </m:sSupPr>
+                      <m:e>
+                        <m:r>
+                          <a:rPr lang="en-GB" sz="2800" i="1">
+                            <a:latin typeface="Cambria Math"/>
+                            <a:ea typeface="Cambria Math" pitchFamily="18" charset="0"/>
+                          </a:rPr>
+                          <m:t>𝐺</m:t>
+                        </m:r>
+                      </m:e>
+                      <m:sup>
+                        <m:r>
+                          <a:rPr lang="en-GB" sz="2800" b="0" i="1" smtClean="0">
+                            <a:latin typeface="Cambria Math"/>
+                            <a:ea typeface="Cambria Math" pitchFamily="18" charset="0"/>
+                          </a:rPr>
+                          <m:t>𝑝</m:t>
+                        </m:r>
+                      </m:sup>
+                    </m:sSup>
+                  </m:oMath>
+                </a14:m>
+                <a:r>
+                  <a:rPr lang="en-GB" sz="2800" i="1" dirty="0" smtClean="0">
+                    <a:latin typeface="Cambria Math" pitchFamily="18" charset="0"/>
+                    <a:ea typeface="Cambria Math" pitchFamily="18" charset="0"/>
+                  </a:rPr>
+                  <a:t>, </a:t>
+                </a:r>
+                <a14:m>
+                  <m:oMath xmlns:m="http://schemas.openxmlformats.org/officeDocument/2006/math">
+                    <m:sSup>
+                      <m:sSupPr>
+                        <m:ctrlPr>
+                          <a:rPr lang="en-GB" sz="2800" i="1">
+                            <a:latin typeface="Cambria Math"/>
+                            <a:ea typeface="Cambria Math" pitchFamily="18" charset="0"/>
+                          </a:rPr>
+                        </m:ctrlPr>
+                      </m:sSupPr>
+                      <m:e>
+                        <m:r>
+                          <a:rPr lang="en-GB" sz="2800" i="1">
+                            <a:latin typeface="Cambria Math"/>
+                            <a:ea typeface="Cambria Math" pitchFamily="18" charset="0"/>
+                          </a:rPr>
+                          <m:t>𝐺</m:t>
+                        </m:r>
+                      </m:e>
+                      <m:sup>
+                        <m:r>
+                          <a:rPr lang="en-GB" sz="2800" b="0" i="1" smtClean="0">
+                            <a:latin typeface="Cambria Math"/>
+                            <a:ea typeface="Cambria Math" pitchFamily="18" charset="0"/>
+                          </a:rPr>
+                          <m:t>𝑓</m:t>
+                        </m:r>
+                      </m:sup>
+                    </m:sSup>
+                  </m:oMath>
+                </a14:m>
+                <a:endParaRPr lang="en-GB" sz="2800" i="1" dirty="0" smtClean="0">
+                  <a:latin typeface="Cambria Math" pitchFamily="18" charset="0"/>
+                  <a:ea typeface="Cambria Math" pitchFamily="18" charset="0"/>
+                </a:endParaRPr>
+              </a:p>
+              <a:p>
+                <a:pPr marL="457200" indent="-457200">
+                  <a:buFont typeface="Arial" pitchFamily="34" charset="0"/>
+                  <a:buChar char="•"/>
+                </a:pPr>
+                <a14:m>
+                  <m:oMath xmlns:m="http://schemas.openxmlformats.org/officeDocument/2006/math">
+                    <m:r>
+                      <a:rPr lang="en-GB" sz="2800" b="1" i="1" smtClean="0">
+                        <a:latin typeface="Cambria Math"/>
+                        <a:ea typeface="Cambria Math" pitchFamily="18" charset="0"/>
+                      </a:rPr>
+                      <m:t>𝒑</m:t>
+                    </m:r>
+                    <m:r>
+                      <a:rPr lang="en-GB" sz="2800" b="0" i="1" smtClean="0">
+                        <a:latin typeface="Cambria Math"/>
+                        <a:ea typeface="Cambria Math" pitchFamily="18" charset="0"/>
+                      </a:rPr>
+                      <m:t>(</m:t>
+                    </m:r>
+                    <m:sSup>
+                      <m:sSupPr>
+                        <m:ctrlPr>
+                          <a:rPr lang="en-GB" sz="2800" i="1">
+                            <a:latin typeface="Cambria Math"/>
+                            <a:ea typeface="Cambria Math" pitchFamily="18" charset="0"/>
+                          </a:rPr>
+                        </m:ctrlPr>
+                      </m:sSupPr>
+                      <m:e>
+                        <m:r>
+                          <a:rPr lang="en-GB" sz="2800" i="1">
+                            <a:latin typeface="Cambria Math"/>
+                            <a:ea typeface="Cambria Math" pitchFamily="18" charset="0"/>
+                          </a:rPr>
+                          <m:t>𝐺</m:t>
+                        </m:r>
+                      </m:e>
+                      <m:sup>
+                        <m:r>
+                          <a:rPr lang="en-GB" sz="2800" i="1">
+                            <a:latin typeface="Cambria Math"/>
+                            <a:ea typeface="Cambria Math" pitchFamily="18" charset="0"/>
+                          </a:rPr>
+                          <m:t>𝑝</m:t>
+                        </m:r>
+                      </m:sup>
+                    </m:sSup>
+                    <m:r>
+                      <a:rPr lang="en-GB" sz="2800" b="0" i="1" smtClean="0">
+                        <a:latin typeface="Cambria Math"/>
+                        <a:ea typeface="Cambria Math" pitchFamily="18" charset="0"/>
+                      </a:rPr>
+                      <m:t>|</m:t>
+                    </m:r>
+                    <m:sSup>
+                      <m:sSupPr>
+                        <m:ctrlPr>
+                          <a:rPr lang="en-GB" sz="2800" i="1">
+                            <a:latin typeface="Cambria Math"/>
+                            <a:ea typeface="Cambria Math" pitchFamily="18" charset="0"/>
+                          </a:rPr>
+                        </m:ctrlPr>
+                      </m:sSupPr>
+                      <m:e>
+                        <m:r>
+                          <a:rPr lang="en-GB" sz="2800" i="1">
+                            <a:latin typeface="Cambria Math"/>
+                            <a:ea typeface="Cambria Math" pitchFamily="18" charset="0"/>
+                          </a:rPr>
+                          <m:t>𝐺</m:t>
+                        </m:r>
+                      </m:e>
+                      <m:sup>
+                        <m:r>
+                          <a:rPr lang="en-GB" sz="2800" i="1">
+                            <a:latin typeface="Cambria Math"/>
+                            <a:ea typeface="Cambria Math" pitchFamily="18" charset="0"/>
+                          </a:rPr>
+                          <m:t>𝑐</m:t>
+                        </m:r>
+                      </m:sup>
+                    </m:sSup>
+                    <m:r>
+                      <a:rPr lang="en-GB" sz="2800" b="0" i="1" smtClean="0">
+                        <a:latin typeface="Cambria Math"/>
+                        <a:ea typeface="Cambria Math" pitchFamily="18" charset="0"/>
+                      </a:rPr>
+                      <m:t>=</m:t>
+                    </m:r>
+                    <m:r>
+                      <a:rPr lang="en-GB" sz="2800" b="0" i="1" smtClean="0">
+                        <a:latin typeface="Cambria Math"/>
+                        <a:ea typeface="Cambria Math" pitchFamily="18" charset="0"/>
+                      </a:rPr>
+                      <m:t>𝑋</m:t>
+                    </m:r>
+                    <m:r>
+                      <a:rPr lang="en-GB" sz="2800" b="0" i="1" smtClean="0">
+                        <a:latin typeface="Cambria Math"/>
+                        <a:ea typeface="Cambria Math" pitchFamily="18" charset="0"/>
+                      </a:rPr>
+                      <m:t>)</m:t>
+                    </m:r>
+                  </m:oMath>
+                </a14:m>
+                <a:endParaRPr lang="en-GB" sz="2800" i="1" dirty="0" smtClean="0">
+                  <a:latin typeface="Cambria Math" pitchFamily="18" charset="0"/>
+                  <a:ea typeface="Cambria Math" pitchFamily="18" charset="0"/>
+                </a:endParaRPr>
+              </a:p>
+              <a:p>
+                <a:pPr marL="457200" indent="-457200">
+                  <a:buFont typeface="Arial" pitchFamily="34" charset="0"/>
+                  <a:buChar char="•"/>
+                </a:pPr>
+                <a:endParaRPr lang="en-GB" sz="2800" i="1" dirty="0">
+                  <a:latin typeface="Cambria Math" pitchFamily="18" charset="0"/>
+                  <a:ea typeface="Cambria Math" pitchFamily="18" charset="0"/>
+                </a:endParaRPr>
+              </a:p>
+            </p:txBody>
+          </p:sp>
+        </mc:Choice>
+        <mc:Fallback>
+          <p:sp>
+            <p:nvSpPr>
+              <p:cNvPr id="3" name="TextBox 2"/>
+              <p:cNvSpPr txBox="1">
+                <a:spLocks noRot="1" noChangeAspect="1" noMove="1" noResize="1" noEditPoints="1" noAdjustHandles="1" noChangeArrowheads="1" noChangeShapeType="1" noTextEdit="1"/>
+              </p:cNvSpPr>
+              <p:nvPr/>
+            </p:nvSpPr>
+            <p:spPr>
+              <a:xfrm>
+                <a:off x="971600" y="1412776"/>
+                <a:ext cx="2832057" cy="1827808"/>
+              </a:xfrm>
+              <a:prstGeom prst="rect">
+                <a:avLst/>
+              </a:prstGeom>
+              <a:blipFill rotWithShape="1">
+                <a:blip r:embed="rId4"/>
+                <a:stretch>
+                  <a:fillRect/>
+                </a:stretch>
+              </a:blipFill>
+            </p:spPr>
+            <p:txBody>
+              <a:bodyPr/>
+              <a:lstStyle/>
+              <a:p>
+                <a:r>
+                  <a:rPr lang="en-GB">
+                    <a:noFill/>
+                  </a:rPr>
+                  <a:t> </a:t>
+                </a:r>
+              </a:p>
+            </p:txBody>
+          </p:sp>
+        </mc:Fallback>
+      </mc:AlternateContent>
+      <p:sp>
+        <p:nvSpPr>
+          <p:cNvPr id="7" name="Oval 6"/>
+          <p:cNvSpPr/>
+          <p:nvPr/>
+        </p:nvSpPr>
+        <p:spPr>
+          <a:xfrm>
+            <a:off x="6849010" y="1052736"/>
+            <a:ext cx="687917" cy="648072"/>
+          </a:xfrm>
+          <a:prstGeom prst="ellipse">
+            <a:avLst/>
+          </a:prstGeom>
+          <a:solidFill>
+            <a:srgbClr val="FFC000"/>
+          </a:solidFill>
+          <a:ln>
+            <a:solidFill>
+              <a:schemeClr val="tx1"/>
+            </a:solidFill>
+          </a:ln>
+        </p:spPr>
+        <p:style>
+          <a:lnRef idx="2">
+            <a:schemeClr val="accent1">
+              <a:shade val="50000"/>
+            </a:schemeClr>
+          </a:lnRef>
+          <a:fillRef idx="1">
+            <a:schemeClr val="accent1"/>
+          </a:fillRef>
+          <a:effectRef idx="0">
+            <a:schemeClr val="accent1"/>
+          </a:effectRef>
+          <a:fontRef idx="minor">
+            <a:schemeClr val="lt1"/>
+          </a:fontRef>
+        </p:style>
+        <p:txBody>
+          <a:bodyPr rtlCol="0" anchor="ctr"/>
+          <a:lstStyle/>
+          <a:p>
+            <a:pPr algn="ctr"/>
+            <a:r>
+              <a:rPr lang="en-GB" sz="1400" dirty="0" smtClean="0">
+                <a:solidFill>
+                  <a:schemeClr val="tx1"/>
+                </a:solidFill>
+              </a:rPr>
+              <a:t>A</a:t>
+            </a:r>
+          </a:p>
+          <a:p>
+            <a:pPr algn="ctr"/>
+            <a:r>
+              <a:rPr lang="en-GB" sz="1400" dirty="0" smtClean="0">
+                <a:solidFill>
+                  <a:schemeClr val="tx1"/>
+                </a:solidFill>
+              </a:rPr>
+              <a:t>Or</a:t>
+            </a:r>
+            <a:endParaRPr lang="en-GB" sz="1400" dirty="0">
+              <a:solidFill>
+                <a:schemeClr val="tx1"/>
+              </a:solidFill>
+            </a:endParaRPr>
+          </a:p>
+        </p:txBody>
+      </p:sp>
+      <p:sp>
+        <p:nvSpPr>
+          <p:cNvPr id="8" name="Oval 7"/>
+          <p:cNvSpPr/>
+          <p:nvPr/>
+        </p:nvSpPr>
+        <p:spPr>
+          <a:xfrm>
+            <a:off x="7697079" y="2143757"/>
+            <a:ext cx="687917" cy="648072"/>
+          </a:xfrm>
+          <a:prstGeom prst="ellipse">
+            <a:avLst/>
+          </a:prstGeom>
+          <a:solidFill>
+            <a:schemeClr val="accent3">
+              <a:lumMod val="60000"/>
+              <a:lumOff val="40000"/>
+            </a:schemeClr>
+          </a:solidFill>
+          <a:ln>
+            <a:solidFill>
+              <a:schemeClr val="tx1"/>
+            </a:solidFill>
+          </a:ln>
+        </p:spPr>
+        <p:style>
+          <a:lnRef idx="2">
+            <a:schemeClr val="accent1">
+              <a:shade val="50000"/>
+            </a:schemeClr>
+          </a:lnRef>
+          <a:fillRef idx="1">
+            <a:schemeClr val="accent1"/>
+          </a:fillRef>
+          <a:effectRef idx="0">
+            <a:schemeClr val="accent1"/>
+          </a:effectRef>
+          <a:fontRef idx="minor">
+            <a:schemeClr val="lt1"/>
+          </a:fontRef>
+        </p:style>
+        <p:txBody>
+          <a:bodyPr rtlCol="0" anchor="ctr"/>
+          <a:lstStyle/>
+          <a:p>
+            <a:pPr algn="ctr"/>
+            <a:r>
+              <a:rPr lang="en-GB" sz="1400" dirty="0" smtClean="0">
+                <a:solidFill>
+                  <a:schemeClr val="tx1"/>
+                </a:solidFill>
+              </a:rPr>
+              <a:t>C</a:t>
+            </a:r>
+          </a:p>
+          <a:p>
+            <a:pPr algn="ctr"/>
+            <a:r>
+              <a:rPr lang="en-GB" sz="1400" dirty="0" smtClean="0">
+                <a:solidFill>
+                  <a:schemeClr val="tx1"/>
+                </a:solidFill>
+              </a:rPr>
+              <a:t>XOR</a:t>
+            </a:r>
+            <a:endParaRPr lang="en-GB" sz="1400" dirty="0">
+              <a:solidFill>
+                <a:schemeClr val="tx1"/>
+              </a:solidFill>
+            </a:endParaRPr>
+          </a:p>
+        </p:txBody>
+      </p:sp>
+      <p:sp>
+        <p:nvSpPr>
+          <p:cNvPr id="9" name="Oval 8"/>
+          <p:cNvSpPr/>
+          <p:nvPr/>
+        </p:nvSpPr>
+        <p:spPr>
+          <a:xfrm>
+            <a:off x="5938866" y="2143757"/>
+            <a:ext cx="722652" cy="648072"/>
+          </a:xfrm>
+          <a:prstGeom prst="ellipse">
+            <a:avLst/>
+          </a:prstGeom>
+          <a:solidFill>
+            <a:schemeClr val="accent3">
+              <a:lumMod val="60000"/>
+              <a:lumOff val="40000"/>
+            </a:schemeClr>
+          </a:solidFill>
+          <a:ln>
+            <a:solidFill>
+              <a:schemeClr val="tx1"/>
+            </a:solidFill>
+          </a:ln>
+        </p:spPr>
+        <p:style>
+          <a:lnRef idx="2">
+            <a:schemeClr val="accent1">
+              <a:shade val="50000"/>
+            </a:schemeClr>
+          </a:lnRef>
+          <a:fillRef idx="1">
+            <a:schemeClr val="accent1"/>
+          </a:fillRef>
+          <a:effectRef idx="0">
+            <a:schemeClr val="accent1"/>
+          </a:effectRef>
+          <a:fontRef idx="minor">
+            <a:schemeClr val="lt1"/>
+          </a:fontRef>
+        </p:style>
+        <p:txBody>
+          <a:bodyPr rtlCol="0" anchor="ctr"/>
+          <a:lstStyle/>
+          <a:p>
+            <a:pPr algn="ctr"/>
+            <a:r>
+              <a:rPr lang="en-GB" sz="1400" dirty="0" smtClean="0">
+                <a:solidFill>
+                  <a:schemeClr val="tx1"/>
+                </a:solidFill>
+              </a:rPr>
+              <a:t>B AND</a:t>
+            </a:r>
+            <a:endParaRPr lang="en-GB" sz="1400" dirty="0">
+              <a:solidFill>
+                <a:schemeClr val="tx1"/>
+              </a:solidFill>
+            </a:endParaRPr>
+          </a:p>
+        </p:txBody>
+      </p:sp>
+      <p:cxnSp>
+        <p:nvCxnSpPr>
+          <p:cNvPr id="11" name="Straight Arrow Connector 10"/>
+          <p:cNvCxnSpPr>
+            <a:stCxn id="7" idx="3"/>
+            <a:endCxn id="9" idx="7"/>
+          </p:cNvCxnSpPr>
+          <p:nvPr/>
+        </p:nvCxnSpPr>
+        <p:spPr>
+          <a:xfrm flipH="1">
+            <a:off x="6555688" y="1605900"/>
+            <a:ext cx="394065" cy="632765"/>
+          </a:xfrm>
+          <a:prstGeom prst="straightConnector1">
+            <a:avLst/>
+          </a:prstGeom>
+          <a:ln w="25400">
+            <a:solidFill>
+              <a:schemeClr val="tx1"/>
+            </a:solidFill>
+            <a:headEnd type="arrow"/>
+            <a:tailEnd type="arrow"/>
+          </a:ln>
+        </p:spPr>
+        <p:style>
+          <a:lnRef idx="1">
+            <a:schemeClr val="accent1"/>
+          </a:lnRef>
+          <a:fillRef idx="0">
+            <a:schemeClr val="accent1"/>
+          </a:fillRef>
+          <a:effectRef idx="0">
+            <a:schemeClr val="accent1"/>
+          </a:effectRef>
+          <a:fontRef idx="minor">
+            <a:schemeClr val="tx1"/>
+          </a:fontRef>
+        </p:style>
+      </p:cxnSp>
+      <p:cxnSp>
+        <p:nvCxnSpPr>
+          <p:cNvPr id="12" name="Straight Arrow Connector 11"/>
+          <p:cNvCxnSpPr>
+            <a:stCxn id="7" idx="5"/>
+            <a:endCxn id="8" idx="1"/>
+          </p:cNvCxnSpPr>
+          <p:nvPr/>
+        </p:nvCxnSpPr>
+        <p:spPr>
+          <a:xfrm>
+            <a:off x="7436184" y="1605900"/>
+            <a:ext cx="361638" cy="632765"/>
+          </a:xfrm>
+          <a:prstGeom prst="straightConnector1">
+            <a:avLst/>
+          </a:prstGeom>
+          <a:ln w="25400">
+            <a:solidFill>
+              <a:schemeClr val="tx1"/>
+            </a:solidFill>
+            <a:headEnd type="arrow"/>
+            <a:tailEnd type="arrow"/>
+          </a:ln>
+        </p:spPr>
+        <p:style>
+          <a:lnRef idx="1">
+            <a:schemeClr val="accent1"/>
+          </a:lnRef>
+          <a:fillRef idx="0">
+            <a:schemeClr val="accent1"/>
+          </a:fillRef>
+          <a:effectRef idx="0">
+            <a:schemeClr val="accent1"/>
+          </a:effectRef>
+          <a:fontRef idx="minor">
+            <a:schemeClr val="tx1"/>
+          </a:fontRef>
+        </p:style>
+      </p:cxnSp>
+      <p:cxnSp>
+        <p:nvCxnSpPr>
+          <p:cNvPr id="13" name="Straight Arrow Connector 12"/>
+          <p:cNvCxnSpPr>
+            <a:stCxn id="9" idx="6"/>
+            <a:endCxn id="8" idx="2"/>
+          </p:cNvCxnSpPr>
+          <p:nvPr/>
+        </p:nvCxnSpPr>
+        <p:spPr>
+          <a:xfrm>
+            <a:off x="6661518" y="2467793"/>
+            <a:ext cx="1035561" cy="0"/>
+          </a:xfrm>
+          <a:prstGeom prst="straightConnector1">
+            <a:avLst/>
+          </a:prstGeom>
+          <a:ln w="25400">
+            <a:solidFill>
+              <a:schemeClr val="tx1"/>
+            </a:solidFill>
+            <a:headEnd type="arrow"/>
+            <a:tailEnd type="arrow"/>
+          </a:ln>
+        </p:spPr>
+        <p:style>
+          <a:lnRef idx="1">
+            <a:schemeClr val="accent1"/>
+          </a:lnRef>
+          <a:fillRef idx="0">
+            <a:schemeClr val="accent1"/>
+          </a:fillRef>
+          <a:effectRef idx="0">
+            <a:schemeClr val="accent1"/>
+          </a:effectRef>
+          <a:fontRef idx="minor">
+            <a:schemeClr val="tx1"/>
+          </a:fontRef>
+        </p:style>
+      </p:cxnSp>
       <p:cxnSp>
         <p:nvCxnSpPr>
           <p:cNvPr id="25" name="Straight Arrow Connector 24"/>
@@ -31969,9 +32404,9 @@
       </p:par>
     </p:tnLst>
     <p:bldLst>
-      <p:bldP spid="32" grpId="0"/>
       <p:bldP spid="23" grpId="0"/>
       <p:bldP spid="23" grpId="1"/>
+      <p:bldP spid="32" grpId="0"/>
     </p:bldLst>
   </p:timing>
 </p:sld>
@@ -32073,10 +32508,10 @@
                         </m:sSupPr>
                         <m:e>
                           <m:r>
-                            <a:rPr lang="en-GB" sz="2000" b="0" i="1" dirty="0" smtClean="0">
+                            <a:rPr lang="en-GB" sz="2000" b="1" i="1" dirty="0" smtClean="0">
                               <a:latin typeface="Cambria Math"/>
                             </a:rPr>
-                            <m:t>𝑝</m:t>
+                            <m:t>𝒑</m:t>
                           </m:r>
                         </m:e>
                         <m:sup>
@@ -32135,10 +32570,10 @@
                         </m:sSupPr>
                         <m:e>
                           <m:r>
-                            <a:rPr lang="en-GB" sz="2000" b="0" i="1" dirty="0" smtClean="0">
+                            <a:rPr lang="en-GB" sz="2000" b="1" i="1" dirty="0" smtClean="0">
                               <a:latin typeface="Cambria Math"/>
                             </a:rPr>
-                            <m:t>𝑝</m:t>
+                            <m:t>𝒑</m:t>
                           </m:r>
                         </m:e>
                         <m:sup>
@@ -32211,10 +32646,10 @@
                         </m:sSupPr>
                         <m:e>
                           <m:r>
-                            <a:rPr lang="en-GB" sz="2000" b="0" i="1" smtClean="0">
+                            <a:rPr lang="en-GB" sz="2000" b="1" i="1" smtClean="0">
                               <a:latin typeface="Cambria Math"/>
                             </a:rPr>
-                            <m:t>𝑝</m:t>
+                            <m:t>𝒑</m:t>
                           </m:r>
                         </m:e>
                         <m:sup>
@@ -32414,7 +32849,7 @@
               <a:blipFill rotWithShape="1">
                 <a:blip r:embed="rId2"/>
                 <a:stretch>
-                  <a:fillRect l="-1154" t="-2930" b="-1465"/>
+                  <a:fillRect l="-1154" t="-2930" b="-1832"/>
                 </a:stretch>
               </a:blipFill>
             </p:spPr>
@@ -32484,10 +32919,10 @@
                         </m:sSupPr>
                         <m:e>
                           <m:r>
-                            <a:rPr lang="en-GB" sz="2000" i="1" dirty="0">
+                            <a:rPr lang="en-GB" sz="2000" b="1" i="1" dirty="0" smtClean="0">
                               <a:latin typeface="Cambria Math"/>
                             </a:rPr>
-                            <m:t>𝑝</m:t>
+                            <m:t>𝒑</m:t>
                           </m:r>
                         </m:e>
                         <m:sup>
@@ -32595,7 +33030,7 @@
                         <m:sup/>
                         <m:e>
                           <m:r>
-                            <a:rPr lang="en-GB" sz="2000" b="0" i="1" dirty="0" smtClean="0">
+                            <a:rPr lang="en-GB" sz="2000" i="1" dirty="0" smtClean="0">
                               <a:latin typeface="Cambria Math"/>
                             </a:rPr>
                             <m:t>𝑝</m:t>
@@ -32699,10 +33134,10 @@
                         </m:sSupPr>
                         <m:e>
                           <m:r>
-                            <a:rPr lang="en-GB" sz="2000" i="1" dirty="0">
+                            <a:rPr lang="en-GB" sz="2000" b="1" i="1" dirty="0" smtClean="0">
                               <a:latin typeface="Cambria Math"/>
                             </a:rPr>
-                            <m:t>𝑝</m:t>
+                            <m:t>𝒑</m:t>
                           </m:r>
                         </m:e>
                         <m:sup>
@@ -32799,6 +33234,7 @@
                           <m:nary>
                             <m:naryPr>
                               <m:chr m:val="∑"/>
+                              <m:subHide m:val="on"/>
                               <m:supHide m:val="on"/>
                               <m:ctrlPr>
                                 <a:rPr lang="en-GB" sz="2000" i="1">
@@ -32806,33 +33242,7 @@
                                 </a:rPr>
                               </m:ctrlPr>
                             </m:naryPr>
-                            <m:sub>
-                              <m:sSup>
-                                <m:sSupPr>
-                                  <m:ctrlPr>
-                                    <a:rPr lang="en-GB" sz="2000" i="1">
-                                      <a:latin typeface="Cambria Math"/>
-                                    </a:rPr>
-                                  </m:ctrlPr>
-                                </m:sSupPr>
-                                <m:e>
-                                  <m:r>
-                                    <a:rPr lang="en-GB" sz="2000" i="1">
-                                      <a:latin typeface="Cambria Math"/>
-                                    </a:rPr>
-                                    <m:t>𝐴𝐵𝐶</m:t>
-                                  </m:r>
-                                </m:e>
-                                <m:sup>
-                                  <m:r>
-                                    <a:rPr lang="en-GB" sz="2000" i="1">
-                                      <a:latin typeface="Cambria Math"/>
-                                    </a:rPr>
-                                    <m:t>𝑐</m:t>
-                                  </m:r>
-                                </m:sup>
-                              </m:sSup>
-                            </m:sub>
+                            <m:sub/>
                             <m:sup/>
                             <m:e>
                               <m:r>
@@ -32927,10 +33337,10 @@
                             </m:sSupPr>
                             <m:e>
                               <m:r>
-                                <a:rPr lang="en-GB" sz="2000" i="1" dirty="0">
+                                <a:rPr lang="en-GB" sz="2000" b="1" i="1" dirty="0">
                                   <a:latin typeface="Cambria Math"/>
                                 </a:rPr>
-                                <m:t>𝑝</m:t>
+                                <m:t>𝒑</m:t>
                               </m:r>
                             </m:e>
                             <m:sup>
@@ -34513,8 +34923,8 @@
           </a:p>
         </p:txBody>
       </p:sp>
-      <mc:AlternateContent xmlns:mc="http://schemas.openxmlformats.org/markup-compatibility/2006" xmlns:a14="http://schemas.microsoft.com/office/drawing/2010/main">
-        <mc:Choice Requires="a14">
+      <mc:AlternateContent xmlns:mc="http://schemas.openxmlformats.org/markup-compatibility/2006">
+        <mc:Choice xmlns:a14="http://schemas.microsoft.com/office/drawing/2010/main" Requires="a14">
           <p:sp>
             <p:nvSpPr>
               <p:cNvPr id="15" name="TextBox 14"/>
@@ -34620,10 +35030,10 @@
                         </m:dPr>
                         <m:e>
                           <m:r>
-                            <a:rPr lang="en-GB" sz="2800" i="1">
+                            <a:rPr lang="en-GB" sz="2800" b="1" i="1">
                               <a:latin typeface="Cambria Math"/>
                             </a:rPr>
-                            <m:t>𝑝</m:t>
+                            <m:t>𝒑</m:t>
                           </m:r>
                           <m:d>
                             <m:dPr>
@@ -34716,10 +35126,10 @@
                             </m:sSupPr>
                             <m:e>
                               <m:r>
-                                <a:rPr lang="en-GB" sz="2800" i="1">
+                                <a:rPr lang="en-GB" sz="2800" b="1" i="1">
                                   <a:latin typeface="Cambria Math"/>
                                 </a:rPr>
-                                <m:t>𝑝</m:t>
+                                <m:t>𝒑</m:t>
                               </m:r>
                             </m:e>
                             <m:sup>
@@ -34777,7 +35187,7 @@
             </p:txBody>
           </p:sp>
         </mc:Choice>
-        <mc:Fallback xmlns="">
+        <mc:Fallback>
           <p:sp>
             <p:nvSpPr>
               <p:cNvPr id="15" name="TextBox 14"/>
@@ -35977,8 +36387,8 @@
           </a:p>
         </p:txBody>
       </p:sp>
-      <mc:AlternateContent xmlns:mc="http://schemas.openxmlformats.org/markup-compatibility/2006" xmlns:a14="http://schemas.microsoft.com/office/drawing/2010/main">
-        <mc:Choice Requires="a14">
+      <mc:AlternateContent xmlns:mc="http://schemas.openxmlformats.org/markup-compatibility/2006">
+        <mc:Choice xmlns:a14="http://schemas.microsoft.com/office/drawing/2010/main" Requires="a14">
           <p:sp>
             <p:nvSpPr>
               <p:cNvPr id="34" name="TextBox 33"/>
@@ -35987,8 +36397,8 @@
             </p:nvSpPr>
             <p:spPr>
               <a:xfrm>
-                <a:off x="834995" y="4674094"/>
-                <a:ext cx="8309005" cy="552972"/>
+                <a:off x="683568" y="4674094"/>
+                <a:ext cx="8585107" cy="552972"/>
               </a:xfrm>
               <a:prstGeom prst="rect">
                 <a:avLst/>
@@ -36083,10 +36493,10 @@
                         </m:dPr>
                         <m:e>
                           <m:r>
-                            <a:rPr lang="en-GB" sz="2000" i="1">
+                            <a:rPr lang="en-GB" sz="2000" b="1" i="1">
                               <a:latin typeface="Cambria Math"/>
                             </a:rPr>
-                            <m:t>𝑝</m:t>
+                            <m:t>𝒑</m:t>
                           </m:r>
                           <m:d>
                             <m:dPr>
@@ -36170,10 +36580,10 @@
                             <m:t>,</m:t>
                           </m:r>
                           <m:r>
-                            <a:rPr lang="en-GB" sz="2000" i="1">
+                            <a:rPr lang="en-GB" sz="2000" b="1" i="1">
                               <a:latin typeface="Cambria Math"/>
                             </a:rPr>
-                            <m:t>𝑝</m:t>
+                            <m:t>𝒑</m:t>
                           </m:r>
                           <m:d>
                             <m:dPr>
@@ -36270,10 +36680,16 @@
                             </m:e>
                           </m:d>
                           <m:r>
-                            <a:rPr lang="en-GB" sz="2000" i="1">
+                            <a:rPr lang="en-GB" sz="2000" b="1" i="1" smtClean="0">
                               <a:latin typeface="Cambria Math"/>
                             </a:rPr>
-                            <m:t>𝑝</m:t>
+                            <m:t>∗</m:t>
+                          </m:r>
+                          <m:r>
+                            <a:rPr lang="en-GB" sz="2000" b="1" i="1">
+                              <a:latin typeface="Cambria Math"/>
+                            </a:rPr>
+                            <m:t>𝒑</m:t>
                           </m:r>
                           <m:d>
                             <m:dPr>
@@ -36415,7 +36831,7 @@
             </p:txBody>
           </p:sp>
         </mc:Choice>
-        <mc:Fallback xmlns="">
+        <mc:Fallback>
           <p:sp>
             <p:nvSpPr>
               <p:cNvPr id="34" name="TextBox 33"/>
@@ -36426,8 +36842,8 @@
             </p:nvSpPr>
             <p:spPr>
               <a:xfrm>
-                <a:off x="834995" y="4674094"/>
-                <a:ext cx="8309005" cy="552972"/>
+                <a:off x="683568" y="4674094"/>
+                <a:ext cx="8585107" cy="552972"/>
               </a:xfrm>
               <a:prstGeom prst="rect">
                 <a:avLst/>

</xml_diff>

<commit_message>
45 minute talk for BT. Needs to be cut down for final version.
</commit_message>
<xml_diff>
--- a/Writeup/Presentation/Integrated Information Theory for Organisational Consciousness.pptx
+++ b/Writeup/Presentation/Integrated Information Theory for Organisational Consciousness.pptx
@@ -7,7 +7,7 @@
     <p:sldMasterId id="2147483660" r:id="rId3"/>
   </p:sldMasterIdLst>
   <p:notesMasterIdLst>
-    <p:notesMasterId r:id="rId27"/>
+    <p:notesMasterId r:id="rId28"/>
   </p:notesMasterIdLst>
   <p:sldIdLst>
     <p:sldId id="270" r:id="rId4"/>
@@ -20,19 +20,20 @@
     <p:sldId id="279" r:id="rId11"/>
     <p:sldId id="300" r:id="rId12"/>
     <p:sldId id="301" r:id="rId13"/>
-    <p:sldId id="275" r:id="rId14"/>
-    <p:sldId id="311" r:id="rId15"/>
-    <p:sldId id="312" r:id="rId16"/>
-    <p:sldId id="313" r:id="rId17"/>
-    <p:sldId id="318" r:id="rId18"/>
-    <p:sldId id="319" r:id="rId19"/>
-    <p:sldId id="290" r:id="rId20"/>
-    <p:sldId id="320" r:id="rId21"/>
-    <p:sldId id="314" r:id="rId22"/>
-    <p:sldId id="321" r:id="rId23"/>
-    <p:sldId id="316" r:id="rId24"/>
-    <p:sldId id="317" r:id="rId25"/>
-    <p:sldId id="286" r:id="rId26"/>
+    <p:sldId id="326" r:id="rId14"/>
+    <p:sldId id="275" r:id="rId15"/>
+    <p:sldId id="311" r:id="rId16"/>
+    <p:sldId id="312" r:id="rId17"/>
+    <p:sldId id="313" r:id="rId18"/>
+    <p:sldId id="318" r:id="rId19"/>
+    <p:sldId id="319" r:id="rId20"/>
+    <p:sldId id="290" r:id="rId21"/>
+    <p:sldId id="321" r:id="rId22"/>
+    <p:sldId id="322" r:id="rId23"/>
+    <p:sldId id="324" r:id="rId24"/>
+    <p:sldId id="323" r:id="rId25"/>
+    <p:sldId id="325" r:id="rId26"/>
+    <p:sldId id="286" r:id="rId27"/>
   </p:sldIdLst>
   <p:sldSz cx="9144000" cy="6858000" type="screen4x3"/>
   <p:notesSz cx="6858000" cy="9144000"/>
@@ -134,9 +135,6 @@
   <p:extLst>
     <p:ext uri="{521415D9-36F7-43E2-AB2F-B90AF26B5E84}">
       <p14:sectionLst xmlns:p14="http://schemas.microsoft.com/office/powerpoint/2010/main">
-        <p14:section name="Default Section" id="{7DABBDF5-2FEB-437F-9E94-602D21DFE73A}">
-          <p14:sldIdLst/>
-        </p14:section>
         <p14:section name="Introduction" id="{2CF83C1A-4105-4924-91C4-5DC99B8D07E8}">
           <p14:sldIdLst>
             <p14:sldId id="270"/>
@@ -153,6 +151,7 @@
             <p14:sldId id="279"/>
             <p14:sldId id="300"/>
             <p14:sldId id="301"/>
+            <p14:sldId id="326"/>
           </p14:sldIdLst>
         </p14:section>
         <p14:section name="Description of Model" id="{5BEB889A-47EA-4F45-9C30-E10080A38036}">
@@ -164,15 +163,15 @@
             <p14:sldId id="318"/>
             <p14:sldId id="319"/>
             <p14:sldId id="290"/>
-            <p14:sldId id="320"/>
-            <p14:sldId id="314"/>
-            <p14:sldId id="321"/>
-            <p14:sldId id="316"/>
-            <p14:sldId id="317"/>
           </p14:sldIdLst>
         </p14:section>
         <p14:section name="Wrapping Up" id="{9ABF0CC0-041F-4748-B968-1FDA0EA570B7}">
           <p14:sldIdLst>
+            <p14:sldId id="321"/>
+            <p14:sldId id="322"/>
+            <p14:sldId id="324"/>
+            <p14:sldId id="323"/>
+            <p14:sldId id="325"/>
             <p14:sldId id="286"/>
           </p14:sldIdLst>
         </p14:section>
@@ -11968,8 +11967,8 @@
           </a:p>
         </p:txBody>
       </p:sp>
-      <mc:AlternateContent xmlns:mc="http://schemas.openxmlformats.org/markup-compatibility/2006" xmlns:a14="http://schemas.microsoft.com/office/drawing/2010/main">
-        <mc:Choice Requires="a14">
+      <mc:AlternateContent xmlns:mc="http://schemas.openxmlformats.org/markup-compatibility/2006">
+        <mc:Choice xmlns:a14="http://schemas.microsoft.com/office/drawing/2010/main" Requires="a14">
           <p:sp>
             <p:nvSpPr>
               <p:cNvPr id="9" name="TextBox 8"/>
@@ -12011,7 +12010,15 @@
                 </a14:m>
                 <a:r>
                   <a:rPr lang="en-GB" sz="2800" dirty="0" smtClean="0"/>
-                  <a:t> for a system of mechanisms, we need to find the MIP: the 1 directional partition that makes the most difference to the constellation. This distance is </a:t>
+                  <a:t> for a system of mechanisms, we need to find the MIP: the 1 directional partition that makes the </a:t>
+                </a:r>
+                <a:r>
+                  <a:rPr lang="en-GB" sz="2800" dirty="0" smtClean="0"/>
+                  <a:t>least difference </a:t>
+                </a:r>
+                <a:r>
+                  <a:rPr lang="en-GB" sz="2800" dirty="0" smtClean="0"/>
+                  <a:t>to the constellation. This distance is </a:t>
                 </a:r>
                 <a14:m>
                   <m:oMath xmlns:m="http://schemas.openxmlformats.org/officeDocument/2006/math">
@@ -12269,7 +12276,7 @@
             </p:txBody>
           </p:sp>
         </mc:Choice>
-        <mc:Fallback xmlns="">
+        <mc:Fallback>
           <p:sp>
             <p:nvSpPr>
               <p:cNvPr id="9" name="TextBox 8"/>
@@ -12289,7 +12296,7 @@
               <a:blipFill rotWithShape="1">
                 <a:blip r:embed="rId2"/>
                 <a:stretch>
-                  <a:fillRect l="-1661" t="-1194" r="-1978" b="-2918"/>
+                  <a:fillRect l="-1661" t="-1194" r="-1424" b="-2918"/>
                 </a:stretch>
               </a:blipFill>
             </p:spPr>
@@ -12463,6 +12470,682 @@
 </file>
 
 <file path=ppt/slides/slide11.xml><?xml version="1.0" encoding="utf-8"?>
+<p:sld xmlns:a="http://schemas.openxmlformats.org/drawingml/2006/main" xmlns:r="http://schemas.openxmlformats.org/officeDocument/2006/relationships" xmlns:p="http://schemas.openxmlformats.org/presentationml/2006/main">
+  <p:cSld>
+    <p:spTree>
+      <p:nvGrpSpPr>
+        <p:cNvPr id="1" name=""/>
+        <p:cNvGrpSpPr/>
+        <p:nvPr/>
+      </p:nvGrpSpPr>
+      <p:grpSpPr>
+        <a:xfrm>
+          <a:off x="0" y="0"/>
+          <a:ext cx="0" cy="0"/>
+          <a:chOff x="0" y="0"/>
+          <a:chExt cx="0" cy="0"/>
+        </a:xfrm>
+      </p:grpSpPr>
+      <mc:AlternateContent xmlns:mc="http://schemas.openxmlformats.org/markup-compatibility/2006">
+        <mc:Choice xmlns:a14="http://schemas.microsoft.com/office/drawing/2010/main" Requires="a14">
+          <p:sp>
+            <p:nvSpPr>
+              <p:cNvPr id="2" name="TextBox 1"/>
+              <p:cNvSpPr txBox="1"/>
+              <p:nvPr/>
+            </p:nvSpPr>
+            <p:spPr>
+              <a:xfrm>
+                <a:off x="836320" y="98490"/>
+                <a:ext cx="5463872" cy="646331"/>
+              </a:xfrm>
+              <a:prstGeom prst="rect">
+                <a:avLst/>
+              </a:prstGeom>
+              <a:noFill/>
+            </p:spPr>
+            <p:txBody>
+              <a:bodyPr wrap="square" rtlCol="0">
+                <a:spAutoFit/>
+              </a:bodyPr>
+              <a:lstStyle/>
+              <a:p>
+                <a:r>
+                  <a:rPr lang="en-GB" sz="3600" dirty="0" smtClean="0"/>
+                  <a:t>Properties of </a:t>
+                </a:r>
+                <a14:m>
+                  <m:oMath xmlns:m="http://schemas.openxmlformats.org/officeDocument/2006/math">
+                    <m:r>
+                      <m:rPr>
+                        <m:sty m:val="p"/>
+                      </m:rPr>
+                      <a:rPr lang="en-GB" sz="3600">
+                        <a:latin typeface="Cambria Math"/>
+                      </a:rPr>
+                      <m:t>Φ</m:t>
+                    </m:r>
+                  </m:oMath>
+                </a14:m>
+                <a:endParaRPr lang="en-GB" sz="3600" dirty="0"/>
+              </a:p>
+            </p:txBody>
+          </p:sp>
+        </mc:Choice>
+        <mc:Fallback>
+          <p:sp>
+            <p:nvSpPr>
+              <p:cNvPr id="2" name="TextBox 1"/>
+              <p:cNvSpPr txBox="1">
+                <a:spLocks noRot="1" noChangeAspect="1" noMove="1" noResize="1" noEditPoints="1" noAdjustHandles="1" noChangeArrowheads="1" noChangeShapeType="1" noTextEdit="1"/>
+              </p:cNvSpPr>
+              <p:nvPr/>
+            </p:nvSpPr>
+            <p:spPr>
+              <a:xfrm>
+                <a:off x="836320" y="98490"/>
+                <a:ext cx="5463872" cy="646331"/>
+              </a:xfrm>
+              <a:prstGeom prst="rect">
+                <a:avLst/>
+              </a:prstGeom>
+              <a:blipFill rotWithShape="1">
+                <a:blip r:embed="rId2"/>
+                <a:stretch>
+                  <a:fillRect l="-3348" t="-14151" b="-34906"/>
+                </a:stretch>
+              </a:blipFill>
+            </p:spPr>
+            <p:txBody>
+              <a:bodyPr/>
+              <a:lstStyle/>
+              <a:p>
+                <a:r>
+                  <a:rPr lang="en-GB">
+                    <a:noFill/>
+                  </a:rPr>
+                  <a:t> </a:t>
+                </a:r>
+              </a:p>
+            </p:txBody>
+          </p:sp>
+        </mc:Fallback>
+      </mc:AlternateContent>
+      <mc:AlternateContent xmlns:mc="http://schemas.openxmlformats.org/markup-compatibility/2006">
+        <mc:Choice xmlns:a14="http://schemas.microsoft.com/office/drawing/2010/main" Requires="a14">
+          <p:sp>
+            <p:nvSpPr>
+              <p:cNvPr id="3" name="TextBox 2"/>
+              <p:cNvSpPr txBox="1"/>
+              <p:nvPr/>
+            </p:nvSpPr>
+            <p:spPr>
+              <a:xfrm>
+                <a:off x="1115616" y="1145690"/>
+                <a:ext cx="7704856" cy="4678204"/>
+              </a:xfrm>
+              <a:prstGeom prst="rect">
+                <a:avLst/>
+              </a:prstGeom>
+              <a:noFill/>
+            </p:spPr>
+            <p:txBody>
+              <a:bodyPr wrap="square" rtlCol="0">
+                <a:spAutoFit/>
+              </a:bodyPr>
+              <a:lstStyle/>
+              <a:p>
+                <a:pPr marL="285750" indent="-285750">
+                  <a:buFont typeface="Arial" pitchFamily="34" charset="0"/>
+                  <a:buChar char="•"/>
+                </a:pPr>
+                <a:r>
+                  <a:rPr lang="en-GB" sz="2000" dirty="0" smtClean="0"/>
+                  <a:t>For </a:t>
+                </a:r>
+                <a14:m>
+                  <m:oMath xmlns:m="http://schemas.openxmlformats.org/officeDocument/2006/math">
+                    <m:r>
+                      <m:rPr>
+                        <m:sty m:val="p"/>
+                      </m:rPr>
+                      <a:rPr lang="en-GB" sz="2000">
+                        <a:latin typeface="Cambria Math"/>
+                      </a:rPr>
+                      <m:t>Φ</m:t>
+                    </m:r>
+                  </m:oMath>
+                </a14:m>
+                <a:r>
+                  <a:rPr lang="en-GB" sz="2000" dirty="0" smtClean="0"/>
+                  <a:t> to be non zero, the must exist a Hamiltonian cycle in the directed network. </a:t>
+                </a:r>
+              </a:p>
+              <a:p>
+                <a:pPr marL="285750" indent="-285750">
+                  <a:buFont typeface="Arial" pitchFamily="34" charset="0"/>
+                  <a:buChar char="•"/>
+                </a:pPr>
+                <a14:m>
+                  <m:oMath xmlns:m="http://schemas.openxmlformats.org/officeDocument/2006/math">
+                    <m:r>
+                      <m:rPr>
+                        <m:sty m:val="p"/>
+                      </m:rPr>
+                      <a:rPr lang="en-GB" sz="2000">
+                        <a:latin typeface="Cambria Math"/>
+                      </a:rPr>
+                      <m:t>Φ</m:t>
+                    </m:r>
+                  </m:oMath>
+                </a14:m>
+                <a:r>
+                  <a:rPr lang="en-GB" sz="2000" dirty="0" smtClean="0"/>
+                  <a:t> depends heavily on the state of the network, and not merely on the TPM. An example has been found for a 3 nodes system where </a:t>
+                </a:r>
+                <a14:m>
+                  <m:oMath xmlns:m="http://schemas.openxmlformats.org/officeDocument/2006/math">
+                    <m:r>
+                      <m:rPr>
+                        <m:sty m:val="p"/>
+                      </m:rPr>
+                      <a:rPr lang="en-GB" sz="2000">
+                        <a:latin typeface="Cambria Math"/>
+                      </a:rPr>
+                      <m:t>Φ</m:t>
+                    </m:r>
+                  </m:oMath>
+                </a14:m>
+                <a:r>
+                  <a:rPr lang="en-GB" sz="2000" dirty="0" smtClean="0"/>
+                  <a:t> given the state 011 is 1.5, while </a:t>
+                </a:r>
+                <a14:m>
+                  <m:oMath xmlns:m="http://schemas.openxmlformats.org/officeDocument/2006/math">
+                    <m:r>
+                      <m:rPr>
+                        <m:sty m:val="p"/>
+                      </m:rPr>
+                      <a:rPr lang="en-GB" sz="2000">
+                        <a:latin typeface="Cambria Math"/>
+                      </a:rPr>
+                      <m:t>Φ</m:t>
+                    </m:r>
+                  </m:oMath>
+                </a14:m>
+                <a:r>
+                  <a:rPr lang="en-GB" sz="2000" dirty="0" smtClean="0"/>
+                  <a:t> given 111 is 0.05. Hence, </a:t>
+                </a:r>
+                <a14:m>
+                  <m:oMath xmlns:m="http://schemas.openxmlformats.org/officeDocument/2006/math">
+                    <m:r>
+                      <m:rPr>
+                        <m:sty m:val="p"/>
+                      </m:rPr>
+                      <a:rPr lang="en-GB" sz="2000">
+                        <a:latin typeface="Cambria Math"/>
+                      </a:rPr>
+                      <m:t>Φ</m:t>
+                    </m:r>
+                  </m:oMath>
+                </a14:m>
+                <a:r>
+                  <a:rPr lang="en-GB" sz="2000" dirty="0" smtClean="0"/>
+                  <a:t> does not tolerate measurement error.</a:t>
+                </a:r>
+              </a:p>
+              <a:p>
+                <a:pPr marL="285750" indent="-285750">
+                  <a:buFont typeface="Arial" pitchFamily="34" charset="0"/>
+                  <a:buChar char="•"/>
+                </a:pPr>
+                <a:r>
+                  <a:rPr lang="en-GB" sz="2000" dirty="0" smtClean="0"/>
+                  <a:t>That the system remains stationary does not imply small </a:t>
+                </a:r>
+                <a14:m>
+                  <m:oMath xmlns:m="http://schemas.openxmlformats.org/officeDocument/2006/math">
+                    <m:r>
+                      <m:rPr>
+                        <m:sty m:val="p"/>
+                      </m:rPr>
+                      <a:rPr lang="en-GB" sz="2000">
+                        <a:latin typeface="Cambria Math"/>
+                      </a:rPr>
+                      <m:t>Φ</m:t>
+                    </m:r>
+                  </m:oMath>
+                </a14:m>
+                <a:r>
+                  <a:rPr lang="en-GB" sz="2000" dirty="0" smtClean="0"/>
+                  <a:t>. In fact examples can be found where the reverse is true.</a:t>
+                </a:r>
+              </a:p>
+              <a:p>
+                <a:pPr marL="285750" indent="-285750">
+                  <a:buFont typeface="Arial" pitchFamily="34" charset="0"/>
+                  <a:buChar char="•"/>
+                </a:pPr>
+                <a14:m>
+                  <m:oMath xmlns:m="http://schemas.openxmlformats.org/officeDocument/2006/math">
+                    <m:r>
+                      <m:rPr>
+                        <m:sty m:val="p"/>
+                      </m:rPr>
+                      <a:rPr lang="en-GB" sz="2000">
+                        <a:latin typeface="Cambria Math"/>
+                      </a:rPr>
+                      <m:t>Φ</m:t>
+                    </m:r>
+                  </m:oMath>
+                </a14:m>
+                <a:r>
+                  <a:rPr lang="en-GB" sz="2000" dirty="0"/>
+                  <a:t> tends to be larger when the TPM merely permutes the states of the system. i.e. when every state can be transitioned to.</a:t>
+                </a:r>
+              </a:p>
+              <a:p>
+                <a:pPr marL="285750" indent="-285750">
+                  <a:buFont typeface="Arial" pitchFamily="34" charset="0"/>
+                  <a:buChar char="•"/>
+                </a:pPr>
+                <a:r>
+                  <a:rPr lang="en-GB" sz="2000" dirty="0" smtClean="0"/>
+                  <a:t>The systems resulting in the largest values of </a:t>
+                </a:r>
+                <a14:m>
+                  <m:oMath xmlns:m="http://schemas.openxmlformats.org/officeDocument/2006/math">
+                    <m:r>
+                      <m:rPr>
+                        <m:sty m:val="p"/>
+                      </m:rPr>
+                      <a:rPr lang="en-GB" sz="2000">
+                        <a:latin typeface="Cambria Math"/>
+                      </a:rPr>
+                      <m:t>Φ</m:t>
+                    </m:r>
+                  </m:oMath>
+                </a14:m>
+                <a:r>
+                  <a:rPr lang="en-GB" sz="2000" dirty="0" smtClean="0"/>
+                  <a:t> that have been found tend to </a:t>
+                </a:r>
+                <a:r>
+                  <a:rPr lang="en-GB" sz="2000" dirty="0"/>
+                  <a:t>be </a:t>
+                </a:r>
+                <a:r>
+                  <a:rPr lang="en-GB" sz="2000" dirty="0" smtClean="0"/>
+                  <a:t>deterministic.</a:t>
+                </a:r>
+              </a:p>
+              <a:p>
+                <a:pPr marL="285750" indent="-285750">
+                  <a:buFont typeface="Arial" pitchFamily="34" charset="0"/>
+                  <a:buChar char="•"/>
+                </a:pPr>
+                <a:r>
+                  <a:rPr lang="en-GB" sz="2000" dirty="0" smtClean="0"/>
+                  <a:t>The structure of the state transition space is inadequate for computing </a:t>
+                </a:r>
+                <a14:m>
+                  <m:oMath xmlns:m="http://schemas.openxmlformats.org/officeDocument/2006/math">
+                    <m:r>
+                      <m:rPr>
+                        <m:sty m:val="p"/>
+                      </m:rPr>
+                      <a:rPr lang="en-GB" sz="2000">
+                        <a:latin typeface="Cambria Math"/>
+                      </a:rPr>
+                      <m:t>Φ</m:t>
+                    </m:r>
+                  </m:oMath>
+                </a14:m>
+                <a:r>
+                  <a:rPr lang="en-GB" sz="2000" dirty="0" smtClean="0"/>
+                  <a:t>.</a:t>
+                </a:r>
+                <a:endParaRPr lang="en-GB" sz="2000" dirty="0"/>
+              </a:p>
+              <a:p>
+                <a:pPr marL="285750" indent="-285750">
+                  <a:buFont typeface="Arial" pitchFamily="34" charset="0"/>
+                  <a:buChar char="•"/>
+                </a:pPr>
+                <a:endParaRPr lang="en-GB" dirty="0"/>
+              </a:p>
+            </p:txBody>
+          </p:sp>
+        </mc:Choice>
+        <mc:Fallback>
+          <p:sp>
+            <p:nvSpPr>
+              <p:cNvPr id="3" name="TextBox 2"/>
+              <p:cNvSpPr txBox="1">
+                <a:spLocks noRot="1" noChangeAspect="1" noMove="1" noResize="1" noEditPoints="1" noAdjustHandles="1" noChangeArrowheads="1" noChangeShapeType="1" noTextEdit="1"/>
+              </p:cNvSpPr>
+              <p:nvPr/>
+            </p:nvSpPr>
+            <p:spPr>
+              <a:xfrm>
+                <a:off x="1115616" y="1145690"/>
+                <a:ext cx="7704856" cy="4678204"/>
+              </a:xfrm>
+              <a:prstGeom prst="rect">
+                <a:avLst/>
+              </a:prstGeom>
+              <a:blipFill rotWithShape="1">
+                <a:blip r:embed="rId3"/>
+                <a:stretch>
+                  <a:fillRect l="-633" t="-652" r="-1503"/>
+                </a:stretch>
+              </a:blipFill>
+            </p:spPr>
+            <p:txBody>
+              <a:bodyPr/>
+              <a:lstStyle/>
+              <a:p>
+                <a:r>
+                  <a:rPr lang="en-GB">
+                    <a:noFill/>
+                  </a:rPr>
+                  <a:t> </a:t>
+                </a:r>
+              </a:p>
+            </p:txBody>
+          </p:sp>
+        </mc:Fallback>
+      </mc:AlternateContent>
+    </p:spTree>
+    <p:extLst>
+      <p:ext uri="{BB962C8B-B14F-4D97-AF65-F5344CB8AC3E}">
+        <p14:creationId xmlns:p14="http://schemas.microsoft.com/office/powerpoint/2010/main" val="3816939797"/>
+      </p:ext>
+    </p:extLst>
+  </p:cSld>
+  <p:clrMapOvr>
+    <a:masterClrMapping/>
+  </p:clrMapOvr>
+  <p:timing>
+    <p:tnLst>
+      <p:par>
+        <p:cTn id="1" dur="indefinite" restart="never" nodeType="tmRoot">
+          <p:childTnLst>
+            <p:seq concurrent="1" nextAc="seek">
+              <p:cTn id="2" dur="indefinite" nodeType="mainSeq">
+                <p:childTnLst>
+                  <p:par>
+                    <p:cTn id="3" fill="hold">
+                      <p:stCondLst>
+                        <p:cond delay="indefinite"/>
+                      </p:stCondLst>
+                      <p:childTnLst>
+                        <p:par>
+                          <p:cTn id="4" fill="hold">
+                            <p:stCondLst>
+                              <p:cond delay="0"/>
+                            </p:stCondLst>
+                            <p:childTnLst>
+                              <p:par>
+                                <p:cTn id="5" presetID="1" presetClass="entr" presetSubtype="0" fill="hold" nodeType="clickEffect">
+                                  <p:stCondLst>
+                                    <p:cond delay="0"/>
+                                  </p:stCondLst>
+                                  <p:childTnLst>
+                                    <p:set>
+                                      <p:cBhvr>
+                                        <p:cTn id="6" dur="1" fill="hold">
+                                          <p:stCondLst>
+                                            <p:cond delay="0"/>
+                                          </p:stCondLst>
+                                        </p:cTn>
+                                        <p:tgtEl>
+                                          <p:spTgt spid="3">
+                                            <p:txEl>
+                                              <p:pRg st="1" end="1"/>
+                                            </p:txEl>
+                                          </p:spTgt>
+                                        </p:tgtEl>
+                                        <p:attrNameLst>
+                                          <p:attrName>style.visibility</p:attrName>
+                                        </p:attrNameLst>
+                                      </p:cBhvr>
+                                      <p:to>
+                                        <p:strVal val="visible"/>
+                                      </p:to>
+                                    </p:set>
+                                  </p:childTnLst>
+                                </p:cTn>
+                              </p:par>
+                            </p:childTnLst>
+                          </p:cTn>
+                        </p:par>
+                      </p:childTnLst>
+                    </p:cTn>
+                  </p:par>
+                  <p:par>
+                    <p:cTn id="7" fill="hold">
+                      <p:stCondLst>
+                        <p:cond delay="indefinite"/>
+                      </p:stCondLst>
+                      <p:childTnLst>
+                        <p:par>
+                          <p:cTn id="8" fill="hold">
+                            <p:stCondLst>
+                              <p:cond delay="0"/>
+                            </p:stCondLst>
+                            <p:childTnLst>
+                              <p:par>
+                                <p:cTn id="9" presetID="1" presetClass="entr" presetSubtype="0" fill="hold" nodeType="clickEffect">
+                                  <p:stCondLst>
+                                    <p:cond delay="0"/>
+                                  </p:stCondLst>
+                                  <p:childTnLst>
+                                    <p:set>
+                                      <p:cBhvr>
+                                        <p:cTn id="10" dur="1" fill="hold">
+                                          <p:stCondLst>
+                                            <p:cond delay="0"/>
+                                          </p:stCondLst>
+                                        </p:cTn>
+                                        <p:tgtEl>
+                                          <p:spTgt spid="3">
+                                            <p:txEl>
+                                              <p:pRg st="2" end="2"/>
+                                            </p:txEl>
+                                          </p:spTgt>
+                                        </p:tgtEl>
+                                        <p:attrNameLst>
+                                          <p:attrName>style.visibility</p:attrName>
+                                        </p:attrNameLst>
+                                      </p:cBhvr>
+                                      <p:to>
+                                        <p:strVal val="visible"/>
+                                      </p:to>
+                                    </p:set>
+                                  </p:childTnLst>
+                                </p:cTn>
+                              </p:par>
+                            </p:childTnLst>
+                          </p:cTn>
+                        </p:par>
+                      </p:childTnLst>
+                    </p:cTn>
+                  </p:par>
+                  <p:par>
+                    <p:cTn id="11" fill="hold">
+                      <p:stCondLst>
+                        <p:cond delay="indefinite"/>
+                      </p:stCondLst>
+                      <p:childTnLst>
+                        <p:par>
+                          <p:cTn id="12" fill="hold">
+                            <p:stCondLst>
+                              <p:cond delay="0"/>
+                            </p:stCondLst>
+                            <p:childTnLst>
+                              <p:par>
+                                <p:cTn id="13" presetID="1" presetClass="entr" presetSubtype="0" fill="hold" nodeType="clickEffect">
+                                  <p:stCondLst>
+                                    <p:cond delay="0"/>
+                                  </p:stCondLst>
+                                  <p:childTnLst>
+                                    <p:set>
+                                      <p:cBhvr>
+                                        <p:cTn id="14" dur="1" fill="hold">
+                                          <p:stCondLst>
+                                            <p:cond delay="0"/>
+                                          </p:stCondLst>
+                                        </p:cTn>
+                                        <p:tgtEl>
+                                          <p:spTgt spid="3">
+                                            <p:txEl>
+                                              <p:pRg st="3" end="3"/>
+                                            </p:txEl>
+                                          </p:spTgt>
+                                        </p:tgtEl>
+                                        <p:attrNameLst>
+                                          <p:attrName>style.visibility</p:attrName>
+                                        </p:attrNameLst>
+                                      </p:cBhvr>
+                                      <p:to>
+                                        <p:strVal val="visible"/>
+                                      </p:to>
+                                    </p:set>
+                                  </p:childTnLst>
+                                </p:cTn>
+                              </p:par>
+                            </p:childTnLst>
+                          </p:cTn>
+                        </p:par>
+                      </p:childTnLst>
+                    </p:cTn>
+                  </p:par>
+                  <p:par>
+                    <p:cTn id="15" fill="hold">
+                      <p:stCondLst>
+                        <p:cond delay="indefinite"/>
+                      </p:stCondLst>
+                      <p:childTnLst>
+                        <p:par>
+                          <p:cTn id="16" fill="hold">
+                            <p:stCondLst>
+                              <p:cond delay="0"/>
+                            </p:stCondLst>
+                            <p:childTnLst>
+                              <p:par>
+                                <p:cTn id="17" presetID="1" presetClass="entr" presetSubtype="0" fill="hold" nodeType="clickEffect">
+                                  <p:stCondLst>
+                                    <p:cond delay="0"/>
+                                  </p:stCondLst>
+                                  <p:childTnLst>
+                                    <p:set>
+                                      <p:cBhvr>
+                                        <p:cTn id="18" dur="1" fill="hold">
+                                          <p:stCondLst>
+                                            <p:cond delay="0"/>
+                                          </p:stCondLst>
+                                        </p:cTn>
+                                        <p:tgtEl>
+                                          <p:spTgt spid="3">
+                                            <p:txEl>
+                                              <p:pRg st="4" end="4"/>
+                                            </p:txEl>
+                                          </p:spTgt>
+                                        </p:tgtEl>
+                                        <p:attrNameLst>
+                                          <p:attrName>style.visibility</p:attrName>
+                                        </p:attrNameLst>
+                                      </p:cBhvr>
+                                      <p:to>
+                                        <p:strVal val="visible"/>
+                                      </p:to>
+                                    </p:set>
+                                  </p:childTnLst>
+                                </p:cTn>
+                              </p:par>
+                            </p:childTnLst>
+                          </p:cTn>
+                        </p:par>
+                      </p:childTnLst>
+                    </p:cTn>
+                  </p:par>
+                  <p:par>
+                    <p:cTn id="19" fill="hold">
+                      <p:stCondLst>
+                        <p:cond delay="indefinite"/>
+                      </p:stCondLst>
+                      <p:childTnLst>
+                        <p:par>
+                          <p:cTn id="20" fill="hold">
+                            <p:stCondLst>
+                              <p:cond delay="0"/>
+                            </p:stCondLst>
+                            <p:childTnLst>
+                              <p:par>
+                                <p:cTn id="21" presetID="1" presetClass="entr" presetSubtype="0" fill="hold" nodeType="clickEffect">
+                                  <p:stCondLst>
+                                    <p:cond delay="0"/>
+                                  </p:stCondLst>
+                                  <p:childTnLst>
+                                    <p:set>
+                                      <p:cBhvr>
+                                        <p:cTn id="22" dur="1" fill="hold">
+                                          <p:stCondLst>
+                                            <p:cond delay="0"/>
+                                          </p:stCondLst>
+                                        </p:cTn>
+                                        <p:tgtEl>
+                                          <p:spTgt spid="3">
+                                            <p:txEl>
+                                              <p:pRg st="5" end="5"/>
+                                            </p:txEl>
+                                          </p:spTgt>
+                                        </p:tgtEl>
+                                        <p:attrNameLst>
+                                          <p:attrName>style.visibility</p:attrName>
+                                        </p:attrNameLst>
+                                      </p:cBhvr>
+                                      <p:to>
+                                        <p:strVal val="visible"/>
+                                      </p:to>
+                                    </p:set>
+                                  </p:childTnLst>
+                                </p:cTn>
+                              </p:par>
+                            </p:childTnLst>
+                          </p:cTn>
+                        </p:par>
+                      </p:childTnLst>
+                    </p:cTn>
+                  </p:par>
+                </p:childTnLst>
+              </p:cTn>
+              <p:prevCondLst>
+                <p:cond evt="onPrev" delay="0">
+                  <p:tgtEl>
+                    <p:sldTgt/>
+                  </p:tgtEl>
+                </p:cond>
+              </p:prevCondLst>
+              <p:nextCondLst>
+                <p:cond evt="onNext" delay="0">
+                  <p:tgtEl>
+                    <p:sldTgt/>
+                  </p:tgtEl>
+                </p:cond>
+              </p:nextCondLst>
+            </p:seq>
+          </p:childTnLst>
+        </p:cTn>
+      </p:par>
+    </p:tnLst>
+  </p:timing>
+</p:sld>
+</file>
+
+<file path=ppt/slides/slide12.xml><?xml version="1.0" encoding="utf-8"?>
 <p:sld xmlns:a="http://schemas.openxmlformats.org/drawingml/2006/main" xmlns:r="http://schemas.openxmlformats.org/officeDocument/2006/relationships" xmlns:p="http://schemas.openxmlformats.org/presentationml/2006/main">
   <p:cSld>
     <p:spTree>
@@ -12774,7 +13457,7 @@
 </p:sld>
 </file>
 
-<file path=ppt/slides/slide12.xml><?xml version="1.0" encoding="utf-8"?>
+<file path=ppt/slides/slide13.xml><?xml version="1.0" encoding="utf-8"?>
 <p:sld xmlns:a="http://schemas.openxmlformats.org/drawingml/2006/main" xmlns:r="http://schemas.openxmlformats.org/officeDocument/2006/relationships" xmlns:p="http://schemas.openxmlformats.org/presentationml/2006/main">
   <p:cSld>
     <p:spTree>
@@ -13635,6 +14318,60 @@
                                   </p:childTnLst>
                                 </p:cTn>
                               </p:par>
+                              <p:par>
+                                <p:cTn id="13" presetID="1" presetClass="entr" presetSubtype="0" fill="hold" grpId="0" nodeType="withEffect">
+                                  <p:stCondLst>
+                                    <p:cond delay="0"/>
+                                  </p:stCondLst>
+                                  <p:childTnLst>
+                                    <p:set>
+                                      <p:cBhvr>
+                                        <p:cTn id="14" dur="1" fill="hold">
+                                          <p:stCondLst>
+                                            <p:cond delay="0"/>
+                                          </p:stCondLst>
+                                        </p:cTn>
+                                        <p:tgtEl>
+                                          <p:spTgt spid="18"/>
+                                        </p:tgtEl>
+                                        <p:attrNameLst>
+                                          <p:attrName>style.visibility</p:attrName>
+                                        </p:attrNameLst>
+                                      </p:cBhvr>
+                                      <p:to>
+                                        <p:strVal val="visible"/>
+                                      </p:to>
+                                    </p:set>
+                                  </p:childTnLst>
+                                </p:cTn>
+                              </p:par>
+                              <p:par>
+                                <p:cTn id="15" presetID="1" presetClass="entr" presetSubtype="0" fill="hold" grpId="0" nodeType="withEffect">
+                                  <p:stCondLst>
+                                    <p:cond delay="0"/>
+                                  </p:stCondLst>
+                                  <p:childTnLst>
+                                    <p:set>
+                                      <p:cBhvr>
+                                        <p:cTn id="16" dur="1" fill="hold">
+                                          <p:stCondLst>
+                                            <p:cond delay="0"/>
+                                          </p:stCondLst>
+                                        </p:cTn>
+                                        <p:tgtEl>
+                                          <p:spTgt spid="20"/>
+                                        </p:tgtEl>
+                                        <p:attrNameLst>
+                                          <p:attrName>style.visibility</p:attrName>
+                                        </p:attrNameLst>
+                                      </p:cBhvr>
+                                      <p:to>
+                                        <p:strVal val="visible"/>
+                                      </p:to>
+                                    </p:set>
+                                  </p:childTnLst>
+                                </p:cTn>
+                              </p:par>
                             </p:childTnLst>
                           </p:cTn>
                         </p:par>
@@ -13642,26 +14379,26 @@
                     </p:cTn>
                   </p:par>
                   <p:par>
-                    <p:cTn id="13" fill="hold">
+                    <p:cTn id="17" fill="hold">
                       <p:stCondLst>
                         <p:cond delay="indefinite"/>
                       </p:stCondLst>
                       <p:childTnLst>
                         <p:par>
-                          <p:cTn id="14" fill="hold">
+                          <p:cTn id="18" fill="hold">
                             <p:stCondLst>
                               <p:cond delay="0"/>
                             </p:stCondLst>
                             <p:childTnLst>
                               <p:par>
-                                <p:cTn id="15" presetID="1" presetClass="entr" presetSubtype="0" fill="hold" nodeType="clickEffect">
+                                <p:cTn id="19" presetID="1" presetClass="entr" presetSubtype="0" fill="hold" nodeType="clickEffect">
                                   <p:stCondLst>
                                     <p:cond delay="0"/>
                                   </p:stCondLst>
                                   <p:childTnLst>
                                     <p:set>
                                       <p:cBhvr>
-                                        <p:cTn id="16" dur="1" fill="hold">
+                                        <p:cTn id="20" dur="1" fill="hold">
                                           <p:stCondLst>
                                             <p:cond delay="0"/>
                                           </p:stCondLst>
@@ -13685,14 +14422,14 @@
                                 </p:cTn>
                               </p:par>
                               <p:par>
-                                <p:cTn id="17" presetID="1" presetClass="entr" presetSubtype="0" fill="hold" grpId="0" nodeType="withEffect">
+                                <p:cTn id="21" presetID="1" presetClass="entr" presetSubtype="0" fill="hold" grpId="0" nodeType="withEffect">
                                   <p:stCondLst>
                                     <p:cond delay="0"/>
                                   </p:stCondLst>
                                   <p:childTnLst>
                                     <p:set>
                                       <p:cBhvr>
-                                        <p:cTn id="18" dur="1" fill="hold">
+                                        <p:cTn id="22" dur="1" fill="hold">
                                           <p:stCondLst>
                                             <p:cond delay="0"/>
                                           </p:stCondLst>
@@ -13712,14 +14449,14 @@
                                 </p:cTn>
                               </p:par>
                               <p:par>
-                                <p:cTn id="19" presetID="1" presetClass="entr" presetSubtype="0" fill="hold" grpId="0" nodeType="withEffect">
+                                <p:cTn id="23" presetID="1" presetClass="entr" presetSubtype="0" fill="hold" grpId="0" nodeType="withEffect">
                                   <p:stCondLst>
                                     <p:cond delay="0"/>
                                   </p:stCondLst>
                                   <p:childTnLst>
                                     <p:set>
                                       <p:cBhvr>
-                                        <p:cTn id="20" dur="1" fill="hold">
+                                        <p:cTn id="24" dur="1" fill="hold">
                                           <p:stCondLst>
                                             <p:cond delay="0"/>
                                           </p:stCondLst>
@@ -13739,14 +14476,14 @@
                                 </p:cTn>
                               </p:par>
                               <p:par>
-                                <p:cTn id="21" presetID="1" presetClass="entr" presetSubtype="0" fill="hold" nodeType="withEffect">
+                                <p:cTn id="25" presetID="1" presetClass="entr" presetSubtype="0" fill="hold" nodeType="withEffect">
                                   <p:stCondLst>
                                     <p:cond delay="0"/>
                                   </p:stCondLst>
                                   <p:childTnLst>
                                     <p:set>
                                       <p:cBhvr>
-                                        <p:cTn id="22" dur="1" fill="hold">
+                                        <p:cTn id="26" dur="1" fill="hold">
                                           <p:stCondLst>
                                             <p:cond delay="0"/>
                                           </p:stCondLst>
@@ -13766,14 +14503,14 @@
                                 </p:cTn>
                               </p:par>
                               <p:par>
-                                <p:cTn id="23" presetID="1" presetClass="entr" presetSubtype="0" fill="hold" nodeType="withEffect">
+                                <p:cTn id="27" presetID="1" presetClass="entr" presetSubtype="0" fill="hold" nodeType="withEffect">
                                   <p:stCondLst>
                                     <p:cond delay="0"/>
                                   </p:stCondLst>
                                   <p:childTnLst>
                                     <p:set>
                                       <p:cBhvr>
-                                        <p:cTn id="24" dur="1" fill="hold">
+                                        <p:cTn id="28" dur="1" fill="hold">
                                           <p:stCondLst>
                                             <p:cond delay="0"/>
                                           </p:stCondLst>
@@ -13793,14 +14530,14 @@
                                 </p:cTn>
                               </p:par>
                               <p:par>
-                                <p:cTn id="25" presetID="1" presetClass="entr" presetSubtype="0" fill="hold" grpId="0" nodeType="withEffect">
+                                <p:cTn id="29" presetID="1" presetClass="entr" presetSubtype="0" fill="hold" grpId="0" nodeType="withEffect">
                                   <p:stCondLst>
                                     <p:cond delay="0"/>
                                   </p:stCondLst>
                                   <p:childTnLst>
                                     <p:set>
                                       <p:cBhvr>
-                                        <p:cTn id="26" dur="1" fill="hold">
+                                        <p:cTn id="30" dur="1" fill="hold">
                                           <p:stCondLst>
                                             <p:cond delay="0"/>
                                           </p:stCondLst>
@@ -13826,77 +14563,19 @@
                     </p:cTn>
                   </p:par>
                   <p:par>
-                    <p:cTn id="27" fill="hold">
+                    <p:cTn id="31" fill="hold">
                       <p:stCondLst>
                         <p:cond delay="indefinite"/>
                       </p:stCondLst>
                       <p:childTnLst>
                         <p:par>
-                          <p:cTn id="28" fill="hold">
+                          <p:cTn id="32" fill="hold">
                             <p:stCondLst>
                               <p:cond delay="0"/>
                             </p:stCondLst>
                             <p:childTnLst>
                               <p:par>
-                                <p:cTn id="29" presetID="1" presetClass="entr" presetSubtype="0" fill="hold" nodeType="clickEffect">
-                                  <p:stCondLst>
-                                    <p:cond delay="0"/>
-                                  </p:stCondLst>
-                                  <p:childTnLst>
-                                    <p:set>
-                                      <p:cBhvr>
-                                        <p:cTn id="30" dur="1" fill="hold">
-                                          <p:stCondLst>
-                                            <p:cond delay="0"/>
-                                          </p:stCondLst>
-                                        </p:cTn>
-                                        <p:tgtEl>
-                                          <p:spTgt spid="5">
-                                            <p:txEl>
-                                              <p:pRg st="6" end="6"/>
-                                            </p:txEl>
-                                          </p:spTgt>
-                                        </p:tgtEl>
-                                        <p:attrNameLst>
-                                          <p:attrName>style.visibility</p:attrName>
-                                        </p:attrNameLst>
-                                      </p:cBhvr>
-                                      <p:to>
-                                        <p:strVal val="visible"/>
-                                      </p:to>
-                                    </p:set>
-                                  </p:childTnLst>
-                                </p:cTn>
-                              </p:par>
-                              <p:par>
-                                <p:cTn id="31" presetID="1" presetClass="entr" presetSubtype="0" fill="hold" grpId="0" nodeType="withEffect">
-                                  <p:stCondLst>
-                                    <p:cond delay="0"/>
-                                  </p:stCondLst>
-                                  <p:childTnLst>
-                                    <p:set>
-                                      <p:cBhvr>
-                                        <p:cTn id="32" dur="1" fill="hold">
-                                          <p:stCondLst>
-                                            <p:cond delay="0"/>
-                                          </p:stCondLst>
-                                        </p:cTn>
-                                        <p:tgtEl>
-                                          <p:spTgt spid="24"/>
-                                        </p:tgtEl>
-                                        <p:attrNameLst>
-                                          <p:attrName>style.visibility</p:attrName>
-                                        </p:attrNameLst>
-                                      </p:cBhvr>
-                                      <p:to>
-                                        <p:strVal val="visible"/>
-                                      </p:to>
-                                    </p:set>
-                                  </p:childTnLst>
-                                </p:cTn>
-                              </p:par>
-                              <p:par>
-                                <p:cTn id="33" presetID="1" presetClass="entr" presetSubtype="0" fill="hold" nodeType="withEffect">
+                                <p:cTn id="33" presetID="1" presetClass="entr" presetSubtype="0" fill="hold" nodeType="clickEffect">
                                   <p:stCondLst>
                                     <p:cond delay="0"/>
                                   </p:stCondLst>
@@ -13909,7 +14588,11 @@
                                           </p:stCondLst>
                                         </p:cTn>
                                         <p:tgtEl>
-                                          <p:spTgt spid="25"/>
+                                          <p:spTgt spid="5">
+                                            <p:txEl>
+                                              <p:pRg st="6" end="6"/>
+                                            </p:txEl>
+                                          </p:spTgt>
                                         </p:tgtEl>
                                         <p:attrNameLst>
                                           <p:attrName>style.visibility</p:attrName>
@@ -13936,7 +14619,7 @@
                                           </p:stCondLst>
                                         </p:cTn>
                                         <p:tgtEl>
-                                          <p:spTgt spid="22"/>
+                                          <p:spTgt spid="24"/>
                                         </p:tgtEl>
                                         <p:attrNameLst>
                                           <p:attrName>style.visibility</p:attrName>
@@ -13950,7 +14633,7 @@
                                 </p:cTn>
                               </p:par>
                               <p:par>
-                                <p:cTn id="37" presetID="1" presetClass="entr" presetSubtype="0" fill="hold" grpId="0" nodeType="withEffect">
+                                <p:cTn id="37" presetID="1" presetClass="entr" presetSubtype="0" fill="hold" nodeType="withEffect">
                                   <p:stCondLst>
                                     <p:cond delay="0"/>
                                   </p:stCondLst>
@@ -13963,7 +14646,7 @@
                                           </p:stCondLst>
                                         </p:cTn>
                                         <p:tgtEl>
-                                          <p:spTgt spid="18"/>
+                                          <p:spTgt spid="25"/>
                                         </p:tgtEl>
                                         <p:attrNameLst>
                                           <p:attrName>style.visibility</p:attrName>
@@ -13990,7 +14673,7 @@
                                           </p:stCondLst>
                                         </p:cTn>
                                         <p:tgtEl>
-                                          <p:spTgt spid="20"/>
+                                          <p:spTgt spid="22"/>
                                         </p:tgtEl>
                                         <p:attrNameLst>
                                           <p:attrName>style.visibility</p:attrName>
@@ -14044,7 +14727,7 @@
 </p:sld>
 </file>
 
-<file path=ppt/slides/slide13.xml><?xml version="1.0" encoding="utf-8"?>
+<file path=ppt/slides/slide14.xml><?xml version="1.0" encoding="utf-8"?>
 <p:sld xmlns:a="http://schemas.openxmlformats.org/drawingml/2006/main" xmlns:r="http://schemas.openxmlformats.org/officeDocument/2006/relationships" xmlns:p="http://schemas.openxmlformats.org/presentationml/2006/main">
   <p:cSld>
     <p:spTree>
@@ -14628,150 +15311,6 @@
 </p:sld>
 </file>
 
-<file path=ppt/slides/slide14.xml><?xml version="1.0" encoding="utf-8"?>
-<p:sld xmlns:a="http://schemas.openxmlformats.org/drawingml/2006/main" xmlns:r="http://schemas.openxmlformats.org/officeDocument/2006/relationships" xmlns:p="http://schemas.openxmlformats.org/presentationml/2006/main">
-  <p:cSld>
-    <p:spTree>
-      <p:nvGrpSpPr>
-        <p:cNvPr id="1" name=""/>
-        <p:cNvGrpSpPr/>
-        <p:nvPr/>
-      </p:nvGrpSpPr>
-      <p:grpSpPr>
-        <a:xfrm>
-          <a:off x="0" y="0"/>
-          <a:ext cx="0" cy="0"/>
-          <a:chOff x="0" y="0"/>
-          <a:chExt cx="0" cy="0"/>
-        </a:xfrm>
-      </p:grpSpPr>
-      <p:sp>
-        <p:nvSpPr>
-          <p:cNvPr id="2" name="TextBox 1"/>
-          <p:cNvSpPr txBox="1"/>
-          <p:nvPr/>
-        </p:nvSpPr>
-        <p:spPr>
-          <a:xfrm>
-            <a:off x="836320" y="98490"/>
-            <a:ext cx="5463872" cy="646331"/>
-          </a:xfrm>
-          <a:prstGeom prst="rect">
-            <a:avLst/>
-          </a:prstGeom>
-          <a:noFill/>
-        </p:spPr>
-        <p:txBody>
-          <a:bodyPr wrap="square" rtlCol="0">
-            <a:spAutoFit/>
-          </a:bodyPr>
-          <a:lstStyle/>
-          <a:p>
-            <a:r>
-              <a:rPr lang="en-GB" sz="3600" dirty="0" smtClean="0"/>
-              <a:t>Solving the Model</a:t>
-            </a:r>
-            <a:endParaRPr lang="en-GB" sz="3600" dirty="0"/>
-          </a:p>
-        </p:txBody>
-      </p:sp>
-      <p:sp>
-        <p:nvSpPr>
-          <p:cNvPr id="5" name="TextBox 4"/>
-          <p:cNvSpPr txBox="1"/>
-          <p:nvPr/>
-        </p:nvSpPr>
-        <p:spPr>
-          <a:xfrm>
-            <a:off x="971600" y="1052736"/>
-            <a:ext cx="7992888" cy="4031873"/>
-          </a:xfrm>
-          <a:prstGeom prst="rect">
-            <a:avLst/>
-          </a:prstGeom>
-          <a:noFill/>
-        </p:spPr>
-        <p:txBody>
-          <a:bodyPr wrap="square" rtlCol="0">
-            <a:spAutoFit/>
-          </a:bodyPr>
-          <a:lstStyle/>
-          <a:p>
-            <a:r>
-              <a:rPr lang="en-GB" sz="3200" u="sng" dirty="0" smtClean="0"/>
-              <a:t>Two solutions of interest:</a:t>
-            </a:r>
-          </a:p>
-          <a:p>
-            <a:pPr marL="514350" indent="-514350">
-              <a:buFont typeface="+mj-lt"/>
-              <a:buAutoNum type="arabicPeriod"/>
-            </a:pPr>
-            <a:endParaRPr lang="en-GB" sz="2800" dirty="0" smtClean="0"/>
-          </a:p>
-          <a:p>
-            <a:pPr marL="514350" indent="-514350">
-              <a:buFont typeface="+mj-lt"/>
-              <a:buAutoNum type="arabicPeriod"/>
-            </a:pPr>
-            <a:r>
-              <a:rPr lang="en-GB" sz="2800" dirty="0" smtClean="0"/>
-              <a:t>Classical solution: for a given connectivity matrix, how much waste do we expect?</a:t>
-            </a:r>
-          </a:p>
-          <a:p>
-            <a:pPr marL="514350" indent="-514350">
-              <a:buFont typeface="+mj-lt"/>
-              <a:buAutoNum type="arabicPeriod"/>
-            </a:pPr>
-            <a:endParaRPr lang="en-GB" sz="2800" dirty="0"/>
-          </a:p>
-          <a:p>
-            <a:pPr marL="514350" indent="-514350">
-              <a:buFont typeface="+mj-lt"/>
-              <a:buAutoNum type="arabicPeriod"/>
-            </a:pPr>
-            <a:r>
-              <a:rPr lang="en-GB" sz="2800" dirty="0" smtClean="0"/>
-              <a:t>IIT: how much ‘integrated information’ does this system possess?</a:t>
-            </a:r>
-          </a:p>
-          <a:p>
-            <a:pPr marL="514350" indent="-514350">
-              <a:buFont typeface="+mj-lt"/>
-              <a:buAutoNum type="arabicPeriod"/>
-            </a:pPr>
-            <a:endParaRPr lang="en-GB" sz="2800" dirty="0"/>
-          </a:p>
-          <a:p>
-            <a:pPr algn="ctr"/>
-            <a:r>
-              <a:rPr lang="en-GB" sz="2800" dirty="0" smtClean="0"/>
-              <a:t>Is there a correlation between these two measures?</a:t>
-            </a:r>
-          </a:p>
-        </p:txBody>
-      </p:sp>
-    </p:spTree>
-    <p:extLst>
-      <p:ext uri="{BB962C8B-B14F-4D97-AF65-F5344CB8AC3E}">
-        <p14:creationId xmlns:p14="http://schemas.microsoft.com/office/powerpoint/2010/main" val="1104677167"/>
-      </p:ext>
-    </p:extLst>
-  </p:cSld>
-  <p:clrMapOvr>
-    <a:masterClrMapping/>
-  </p:clrMapOvr>
-  <p:timing>
-    <p:tnLst>
-      <p:par>
-        <p:cTn id="1" dur="indefinite" restart="never" nodeType="tmRoot"/>
-      </p:par>
-    </p:tnLst>
-  </p:timing>
-</p:sld>
-</file>
-
 <file path=ppt/slides/slide15.xml><?xml version="1.0" encoding="utf-8"?>
 <p:sld xmlns:a="http://schemas.openxmlformats.org/drawingml/2006/main" xmlns:r="http://schemas.openxmlformats.org/officeDocument/2006/relationships" xmlns:p="http://schemas.openxmlformats.org/presentationml/2006/main">
   <p:cSld>
@@ -14813,6 +15352,150 @@
           <a:p>
             <a:r>
               <a:rPr lang="en-GB" sz="3600" dirty="0" smtClean="0"/>
+              <a:t>Solving the Model</a:t>
+            </a:r>
+            <a:endParaRPr lang="en-GB" sz="3600" dirty="0"/>
+          </a:p>
+        </p:txBody>
+      </p:sp>
+      <p:sp>
+        <p:nvSpPr>
+          <p:cNvPr id="5" name="TextBox 4"/>
+          <p:cNvSpPr txBox="1"/>
+          <p:nvPr/>
+        </p:nvSpPr>
+        <p:spPr>
+          <a:xfrm>
+            <a:off x="971600" y="1052736"/>
+            <a:ext cx="7992888" cy="4031873"/>
+          </a:xfrm>
+          <a:prstGeom prst="rect">
+            <a:avLst/>
+          </a:prstGeom>
+          <a:noFill/>
+        </p:spPr>
+        <p:txBody>
+          <a:bodyPr wrap="square" rtlCol="0">
+            <a:spAutoFit/>
+          </a:bodyPr>
+          <a:lstStyle/>
+          <a:p>
+            <a:r>
+              <a:rPr lang="en-GB" sz="3200" u="sng" dirty="0" smtClean="0"/>
+              <a:t>Two solutions of interest:</a:t>
+            </a:r>
+          </a:p>
+          <a:p>
+            <a:pPr marL="514350" indent="-514350">
+              <a:buFont typeface="+mj-lt"/>
+              <a:buAutoNum type="arabicPeriod"/>
+            </a:pPr>
+            <a:endParaRPr lang="en-GB" sz="2800" dirty="0" smtClean="0"/>
+          </a:p>
+          <a:p>
+            <a:pPr marL="514350" indent="-514350">
+              <a:buFont typeface="+mj-lt"/>
+              <a:buAutoNum type="arabicPeriod"/>
+            </a:pPr>
+            <a:r>
+              <a:rPr lang="en-GB" sz="2800" dirty="0" smtClean="0"/>
+              <a:t>Classical solution: for a given connectivity matrix, how much waste do we expect?</a:t>
+            </a:r>
+          </a:p>
+          <a:p>
+            <a:pPr marL="514350" indent="-514350">
+              <a:buFont typeface="+mj-lt"/>
+              <a:buAutoNum type="arabicPeriod"/>
+            </a:pPr>
+            <a:endParaRPr lang="en-GB" sz="2800" dirty="0"/>
+          </a:p>
+          <a:p>
+            <a:pPr marL="514350" indent="-514350">
+              <a:buFont typeface="+mj-lt"/>
+              <a:buAutoNum type="arabicPeriod"/>
+            </a:pPr>
+            <a:r>
+              <a:rPr lang="en-GB" sz="2800" dirty="0" smtClean="0"/>
+              <a:t>IIT: how much ‘integrated information’ does this system possess?</a:t>
+            </a:r>
+          </a:p>
+          <a:p>
+            <a:pPr marL="514350" indent="-514350">
+              <a:buFont typeface="+mj-lt"/>
+              <a:buAutoNum type="arabicPeriod"/>
+            </a:pPr>
+            <a:endParaRPr lang="en-GB" sz="2800" dirty="0"/>
+          </a:p>
+          <a:p>
+            <a:pPr algn="ctr"/>
+            <a:r>
+              <a:rPr lang="en-GB" sz="2800" dirty="0" smtClean="0"/>
+              <a:t>Is there a correlation between these two measures?</a:t>
+            </a:r>
+          </a:p>
+        </p:txBody>
+      </p:sp>
+    </p:spTree>
+    <p:extLst>
+      <p:ext uri="{BB962C8B-B14F-4D97-AF65-F5344CB8AC3E}">
+        <p14:creationId xmlns:p14="http://schemas.microsoft.com/office/powerpoint/2010/main" val="1104677167"/>
+      </p:ext>
+    </p:extLst>
+  </p:cSld>
+  <p:clrMapOvr>
+    <a:masterClrMapping/>
+  </p:clrMapOvr>
+  <p:timing>
+    <p:tnLst>
+      <p:par>
+        <p:cTn id="1" dur="indefinite" restart="never" nodeType="tmRoot"/>
+      </p:par>
+    </p:tnLst>
+  </p:timing>
+</p:sld>
+</file>
+
+<file path=ppt/slides/slide16.xml><?xml version="1.0" encoding="utf-8"?>
+<p:sld xmlns:a="http://schemas.openxmlformats.org/drawingml/2006/main" xmlns:r="http://schemas.openxmlformats.org/officeDocument/2006/relationships" xmlns:p="http://schemas.openxmlformats.org/presentationml/2006/main">
+  <p:cSld>
+    <p:spTree>
+      <p:nvGrpSpPr>
+        <p:cNvPr id="1" name=""/>
+        <p:cNvGrpSpPr/>
+        <p:nvPr/>
+      </p:nvGrpSpPr>
+      <p:grpSpPr>
+        <a:xfrm>
+          <a:off x="0" y="0"/>
+          <a:ext cx="0" cy="0"/>
+          <a:chOff x="0" y="0"/>
+          <a:chExt cx="0" cy="0"/>
+        </a:xfrm>
+      </p:grpSpPr>
+      <p:sp>
+        <p:nvSpPr>
+          <p:cNvPr id="2" name="TextBox 1"/>
+          <p:cNvSpPr txBox="1"/>
+          <p:nvPr/>
+        </p:nvSpPr>
+        <p:spPr>
+          <a:xfrm>
+            <a:off x="836320" y="98490"/>
+            <a:ext cx="5463872" cy="646331"/>
+          </a:xfrm>
+          <a:prstGeom prst="rect">
+            <a:avLst/>
+          </a:prstGeom>
+          <a:noFill/>
+        </p:spPr>
+        <p:txBody>
+          <a:bodyPr wrap="square" rtlCol="0">
+            <a:spAutoFit/>
+          </a:bodyPr>
+          <a:lstStyle/>
+          <a:p>
+            <a:r>
+              <a:rPr lang="en-GB" sz="3600" dirty="0" smtClean="0"/>
               <a:t>Implementation</a:t>
             </a:r>
             <a:endParaRPr lang="en-GB" sz="3600" dirty="0"/>
@@ -14912,14 +15595,197 @@
   <p:timing>
     <p:tnLst>
       <p:par>
-        <p:cTn id="1" dur="indefinite" restart="never" nodeType="tmRoot"/>
+        <p:cTn id="1" dur="indefinite" restart="never" nodeType="tmRoot">
+          <p:childTnLst>
+            <p:seq concurrent="1" nextAc="seek">
+              <p:cTn id="2" dur="indefinite" nodeType="mainSeq">
+                <p:childTnLst>
+                  <p:par>
+                    <p:cTn id="3" fill="hold">
+                      <p:stCondLst>
+                        <p:cond delay="indefinite"/>
+                      </p:stCondLst>
+                      <p:childTnLst>
+                        <p:par>
+                          <p:cTn id="4" fill="hold">
+                            <p:stCondLst>
+                              <p:cond delay="0"/>
+                            </p:stCondLst>
+                            <p:childTnLst>
+                              <p:par>
+                                <p:cTn id="5" presetID="1" presetClass="entr" presetSubtype="0" fill="hold" nodeType="clickEffect">
+                                  <p:stCondLst>
+                                    <p:cond delay="0"/>
+                                  </p:stCondLst>
+                                  <p:childTnLst>
+                                    <p:set>
+                                      <p:cBhvr>
+                                        <p:cTn id="6" dur="1" fill="hold">
+                                          <p:stCondLst>
+                                            <p:cond delay="0"/>
+                                          </p:stCondLst>
+                                        </p:cTn>
+                                        <p:tgtEl>
+                                          <p:spTgt spid="5">
+                                            <p:txEl>
+                                              <p:pRg st="2" end="2"/>
+                                            </p:txEl>
+                                          </p:spTgt>
+                                        </p:tgtEl>
+                                        <p:attrNameLst>
+                                          <p:attrName>style.visibility</p:attrName>
+                                        </p:attrNameLst>
+                                      </p:cBhvr>
+                                      <p:to>
+                                        <p:strVal val="visible"/>
+                                      </p:to>
+                                    </p:set>
+                                  </p:childTnLst>
+                                </p:cTn>
+                              </p:par>
+                            </p:childTnLst>
+                          </p:cTn>
+                        </p:par>
+                      </p:childTnLst>
+                    </p:cTn>
+                  </p:par>
+                  <p:par>
+                    <p:cTn id="7" fill="hold">
+                      <p:stCondLst>
+                        <p:cond delay="indefinite"/>
+                      </p:stCondLst>
+                      <p:childTnLst>
+                        <p:par>
+                          <p:cTn id="8" fill="hold">
+                            <p:stCondLst>
+                              <p:cond delay="0"/>
+                            </p:stCondLst>
+                            <p:childTnLst>
+                              <p:par>
+                                <p:cTn id="9" presetID="1" presetClass="entr" presetSubtype="0" fill="hold" nodeType="clickEffect">
+                                  <p:stCondLst>
+                                    <p:cond delay="0"/>
+                                  </p:stCondLst>
+                                  <p:childTnLst>
+                                    <p:set>
+                                      <p:cBhvr>
+                                        <p:cTn id="10" dur="1" fill="hold">
+                                          <p:stCondLst>
+                                            <p:cond delay="0"/>
+                                          </p:stCondLst>
+                                        </p:cTn>
+                                        <p:tgtEl>
+                                          <p:spTgt spid="5">
+                                            <p:txEl>
+                                              <p:pRg st="3" end="3"/>
+                                            </p:txEl>
+                                          </p:spTgt>
+                                        </p:tgtEl>
+                                        <p:attrNameLst>
+                                          <p:attrName>style.visibility</p:attrName>
+                                        </p:attrNameLst>
+                                      </p:cBhvr>
+                                      <p:to>
+                                        <p:strVal val="visible"/>
+                                      </p:to>
+                                    </p:set>
+                                  </p:childTnLst>
+                                </p:cTn>
+                              </p:par>
+                              <p:par>
+                                <p:cTn id="11" presetID="1" presetClass="entr" presetSubtype="0" fill="hold" nodeType="withEffect">
+                                  <p:stCondLst>
+                                    <p:cond delay="0"/>
+                                  </p:stCondLst>
+                                  <p:childTnLst>
+                                    <p:set>
+                                      <p:cBhvr>
+                                        <p:cTn id="12" dur="1" fill="hold">
+                                          <p:stCondLst>
+                                            <p:cond delay="0"/>
+                                          </p:stCondLst>
+                                        </p:cTn>
+                                        <p:tgtEl>
+                                          <p:spTgt spid="5">
+                                            <p:txEl>
+                                              <p:pRg st="4" end="4"/>
+                                            </p:txEl>
+                                          </p:spTgt>
+                                        </p:tgtEl>
+                                        <p:attrNameLst>
+                                          <p:attrName>style.visibility</p:attrName>
+                                        </p:attrNameLst>
+                                      </p:cBhvr>
+                                      <p:to>
+                                        <p:strVal val="visible"/>
+                                      </p:to>
+                                    </p:set>
+                                  </p:childTnLst>
+                                </p:cTn>
+                              </p:par>
+                              <p:par>
+                                <p:cTn id="13" presetID="1" presetClass="entr" presetSubtype="0" fill="hold" nodeType="withEffect">
+                                  <p:stCondLst>
+                                    <p:cond delay="0"/>
+                                  </p:stCondLst>
+                                  <p:childTnLst>
+                                    <p:set>
+                                      <p:cBhvr>
+                                        <p:cTn id="14" dur="1" fill="hold">
+                                          <p:stCondLst>
+                                            <p:cond delay="0"/>
+                                          </p:stCondLst>
+                                        </p:cTn>
+                                        <p:tgtEl>
+                                          <p:spTgt spid="5">
+                                            <p:txEl>
+                                              <p:pRg st="5" end="5"/>
+                                            </p:txEl>
+                                          </p:spTgt>
+                                        </p:tgtEl>
+                                        <p:attrNameLst>
+                                          <p:attrName>style.visibility</p:attrName>
+                                        </p:attrNameLst>
+                                      </p:cBhvr>
+                                      <p:to>
+                                        <p:strVal val="visible"/>
+                                      </p:to>
+                                    </p:set>
+                                  </p:childTnLst>
+                                </p:cTn>
+                              </p:par>
+                            </p:childTnLst>
+                          </p:cTn>
+                        </p:par>
+                      </p:childTnLst>
+                    </p:cTn>
+                  </p:par>
+                </p:childTnLst>
+              </p:cTn>
+              <p:prevCondLst>
+                <p:cond evt="onPrev" delay="0">
+                  <p:tgtEl>
+                    <p:sldTgt/>
+                  </p:tgtEl>
+                </p:cond>
+              </p:prevCondLst>
+              <p:nextCondLst>
+                <p:cond evt="onNext" delay="0">
+                  <p:tgtEl>
+                    <p:sldTgt/>
+                  </p:tgtEl>
+                </p:cond>
+              </p:nextCondLst>
+            </p:seq>
+          </p:childTnLst>
+        </p:cTn>
       </p:par>
     </p:tnLst>
   </p:timing>
 </p:sld>
 </file>
 
-<file path=ppt/slides/slide16.xml><?xml version="1.0" encoding="utf-8"?>
+<file path=ppt/slides/slide17.xml><?xml version="1.0" encoding="utf-8"?>
 <p:sld xmlns:a="http://schemas.openxmlformats.org/drawingml/2006/main" xmlns:r="http://schemas.openxmlformats.org/officeDocument/2006/relationships" xmlns:p="http://schemas.openxmlformats.org/presentationml/2006/main">
   <p:cSld>
     <p:spTree>
@@ -15140,103 +16006,6 @@
 </p:sld>
 </file>
 
-<file path=ppt/slides/slide17.xml><?xml version="1.0" encoding="utf-8"?>
-<p:sld xmlns:a="http://schemas.openxmlformats.org/drawingml/2006/main" xmlns:r="http://schemas.openxmlformats.org/officeDocument/2006/relationships" xmlns:p="http://schemas.openxmlformats.org/presentationml/2006/main">
-  <p:cSld>
-    <p:spTree>
-      <p:nvGrpSpPr>
-        <p:cNvPr id="1" name=""/>
-        <p:cNvGrpSpPr/>
-        <p:nvPr/>
-      </p:nvGrpSpPr>
-      <p:grpSpPr>
-        <a:xfrm>
-          <a:off x="0" y="0"/>
-          <a:ext cx="0" cy="0"/>
-          <a:chOff x="0" y="0"/>
-          <a:chExt cx="0" cy="0"/>
-        </a:xfrm>
-      </p:grpSpPr>
-      <p:sp>
-        <p:nvSpPr>
-          <p:cNvPr id="2" name="TextBox 1"/>
-          <p:cNvSpPr txBox="1"/>
-          <p:nvPr/>
-        </p:nvSpPr>
-        <p:spPr>
-          <a:xfrm>
-            <a:off x="836320" y="98490"/>
-            <a:ext cx="5463872" cy="646331"/>
-          </a:xfrm>
-          <a:prstGeom prst="rect">
-            <a:avLst/>
-          </a:prstGeom>
-          <a:noFill/>
-        </p:spPr>
-        <p:txBody>
-          <a:bodyPr wrap="square" rtlCol="0">
-            <a:spAutoFit/>
-          </a:bodyPr>
-          <a:lstStyle/>
-          <a:p>
-            <a:r>
-              <a:rPr lang="en-GB" sz="3600" dirty="0" smtClean="0"/>
-              <a:t>Results</a:t>
-            </a:r>
-            <a:endParaRPr lang="en-GB" sz="3600" dirty="0"/>
-          </a:p>
-        </p:txBody>
-      </p:sp>
-      <p:pic>
-        <p:nvPicPr>
-          <p:cNvPr id="5" name="Picture 4"/>
-          <p:cNvPicPr>
-            <a:picLocks noChangeAspect="1"/>
-          </p:cNvPicPr>
-          <p:nvPr/>
-        </p:nvPicPr>
-        <p:blipFill>
-          <a:blip r:embed="rId2">
-            <a:extLst>
-              <a:ext uri="{28A0092B-C50C-407E-A947-70E740481C1C}">
-                <a14:useLocalDpi xmlns:a14="http://schemas.microsoft.com/office/drawing/2010/main" val="0"/>
-              </a:ext>
-            </a:extLst>
-          </a:blip>
-          <a:stretch>
-            <a:fillRect/>
-          </a:stretch>
-        </p:blipFill>
-        <p:spPr>
-          <a:xfrm>
-            <a:off x="971600" y="1052736"/>
-            <a:ext cx="7924682" cy="5276330"/>
-          </a:xfrm>
-          <a:prstGeom prst="rect">
-            <a:avLst/>
-          </a:prstGeom>
-        </p:spPr>
-      </p:pic>
-    </p:spTree>
-    <p:extLst>
-      <p:ext uri="{BB962C8B-B14F-4D97-AF65-F5344CB8AC3E}">
-        <p14:creationId xmlns:p14="http://schemas.microsoft.com/office/powerpoint/2010/main" val="3151286074"/>
-      </p:ext>
-    </p:extLst>
-  </p:cSld>
-  <p:clrMapOvr>
-    <a:masterClrMapping/>
-  </p:clrMapOvr>
-  <p:timing>
-    <p:tnLst>
-      <p:par>
-        <p:cTn id="1" dur="indefinite" restart="never" nodeType="tmRoot"/>
-      </p:par>
-    </p:tnLst>
-  </p:timing>
-</p:sld>
-</file>
-
 <file path=ppt/slides/slide18.xml><?xml version="1.0" encoding="utf-8"?>
 <p:sld xmlns:a="http://schemas.openxmlformats.org/drawingml/2006/main" xmlns:r="http://schemas.openxmlformats.org/officeDocument/2006/relationships" xmlns:p="http://schemas.openxmlformats.org/presentationml/2006/main">
   <p:cSld>
@@ -15278,60 +16047,46 @@
           <a:p>
             <a:r>
               <a:rPr lang="en-GB" sz="3600" dirty="0" smtClean="0"/>
-              <a:t>Conclusions</a:t>
+              <a:t>Results</a:t>
             </a:r>
             <a:endParaRPr lang="en-GB" sz="3600" dirty="0"/>
           </a:p>
         </p:txBody>
       </p:sp>
-      <p:sp>
-        <p:nvSpPr>
-          <p:cNvPr id="4" name="TextBox 3"/>
-          <p:cNvSpPr txBox="1"/>
+      <p:pic>
+        <p:nvPicPr>
+          <p:cNvPr id="5" name="Picture 4"/>
+          <p:cNvPicPr>
+            <a:picLocks noChangeAspect="1"/>
+          </p:cNvPicPr>
           <p:nvPr/>
-        </p:nvSpPr>
+        </p:nvPicPr>
+        <p:blipFill>
+          <a:blip r:embed="rId2">
+            <a:extLst>
+              <a:ext uri="{28A0092B-C50C-407E-A947-70E740481C1C}">
+                <a14:useLocalDpi xmlns:a14="http://schemas.microsoft.com/office/drawing/2010/main" val="0"/>
+              </a:ext>
+            </a:extLst>
+          </a:blip>
+          <a:stretch>
+            <a:fillRect/>
+          </a:stretch>
+        </p:blipFill>
         <p:spPr>
           <a:xfrm>
-            <a:off x="992595" y="1052736"/>
-            <a:ext cx="7848872" cy="1015663"/>
+            <a:off x="971600" y="1052736"/>
+            <a:ext cx="7924682" cy="5276330"/>
           </a:xfrm>
           <a:prstGeom prst="rect">
             <a:avLst/>
           </a:prstGeom>
-          <a:noFill/>
         </p:spPr>
-        <p:txBody>
-          <a:bodyPr wrap="square" rtlCol="0">
-            <a:spAutoFit/>
-          </a:bodyPr>
-          <a:lstStyle/>
-          <a:p>
-            <a:pPr marL="457200" indent="-457200">
-              <a:buFont typeface="+mj-lt"/>
-              <a:buAutoNum type="arabicPeriod"/>
-            </a:pPr>
-            <a:r>
-              <a:rPr lang="en-GB" sz="2000" dirty="0" smtClean="0"/>
-              <a:t>There does exist a relation between costs as defined and </a:t>
-            </a:r>
-            <a:r>
-              <a:rPr lang="en-GB" sz="2000" smtClean="0"/>
-              <a:t>integrated information.</a:t>
-            </a:r>
-          </a:p>
-          <a:p>
-            <a:pPr marL="457200" indent="-457200">
-              <a:buFont typeface="+mj-lt"/>
-              <a:buAutoNum type="arabicPeriod"/>
-            </a:pPr>
-            <a:endParaRPr lang="en-GB" sz="2000" dirty="0"/>
-          </a:p>
-        </p:txBody>
-      </p:sp>
+      </p:pic>
     </p:spTree>
     <p:extLst>
       <p:ext uri="{BB962C8B-B14F-4D97-AF65-F5344CB8AC3E}">
-        <p14:creationId xmlns:p14="http://schemas.microsoft.com/office/powerpoint/2010/main" val="93990616"/>
+        <p14:creationId xmlns:p14="http://schemas.microsoft.com/office/powerpoint/2010/main" val="3151286074"/>
       </p:ext>
     </p:extLst>
   </p:cSld>
@@ -16132,7 +16887,7 @@
     </p:spTree>
     <p:extLst>
       <p:ext uri="{BB962C8B-B14F-4D97-AF65-F5344CB8AC3E}">
-        <p14:creationId xmlns:p14="http://schemas.microsoft.com/office/powerpoint/2010/main" val="555648170"/>
+        <p14:creationId xmlns:p14="http://schemas.microsoft.com/office/powerpoint/2010/main" val="131219111"/>
       </p:ext>
     </p:extLst>
   </p:cSld>
@@ -16142,7 +16897,141 @@
   <p:timing>
     <p:tnLst>
       <p:par>
-        <p:cTn id="1" dur="indefinite" restart="never" nodeType="tmRoot"/>
+        <p:cTn id="1" dur="indefinite" restart="never" nodeType="tmRoot">
+          <p:childTnLst>
+            <p:seq concurrent="1" nextAc="seek">
+              <p:cTn id="2" dur="indefinite" nodeType="mainSeq">
+                <p:childTnLst>
+                  <p:par>
+                    <p:cTn id="3" fill="hold">
+                      <p:stCondLst>
+                        <p:cond delay="indefinite"/>
+                      </p:stCondLst>
+                      <p:childTnLst>
+                        <p:par>
+                          <p:cTn id="4" fill="hold">
+                            <p:stCondLst>
+                              <p:cond delay="0"/>
+                            </p:stCondLst>
+                            <p:childTnLst>
+                              <p:par>
+                                <p:cTn id="5" presetID="1" presetClass="entr" presetSubtype="0" fill="hold" nodeType="clickEffect">
+                                  <p:stCondLst>
+                                    <p:cond delay="0"/>
+                                  </p:stCondLst>
+                                  <p:childTnLst>
+                                    <p:set>
+                                      <p:cBhvr>
+                                        <p:cTn id="6" dur="1" fill="hold">
+                                          <p:stCondLst>
+                                            <p:cond delay="0"/>
+                                          </p:stCondLst>
+                                        </p:cTn>
+                                        <p:tgtEl>
+                                          <p:spTgt spid="3">
+                                            <p:txEl>
+                                              <p:pRg st="3" end="3"/>
+                                            </p:txEl>
+                                          </p:spTgt>
+                                        </p:tgtEl>
+                                        <p:attrNameLst>
+                                          <p:attrName>style.visibility</p:attrName>
+                                        </p:attrNameLst>
+                                      </p:cBhvr>
+                                      <p:to>
+                                        <p:strVal val="visible"/>
+                                      </p:to>
+                                    </p:set>
+                                  </p:childTnLst>
+                                </p:cTn>
+                              </p:par>
+                              <p:par>
+                                <p:cTn id="7" presetID="1" presetClass="entr" presetSubtype="0" fill="hold" nodeType="withEffect">
+                                  <p:stCondLst>
+                                    <p:cond delay="0"/>
+                                  </p:stCondLst>
+                                  <p:childTnLst>
+                                    <p:set>
+                                      <p:cBhvr>
+                                        <p:cTn id="8" dur="1" fill="hold">
+                                          <p:stCondLst>
+                                            <p:cond delay="0"/>
+                                          </p:stCondLst>
+                                        </p:cTn>
+                                        <p:tgtEl>
+                                          <p:spTgt spid="3">
+                                            <p:txEl>
+                                              <p:pRg st="4" end="4"/>
+                                            </p:txEl>
+                                          </p:spTgt>
+                                        </p:tgtEl>
+                                        <p:attrNameLst>
+                                          <p:attrName>style.visibility</p:attrName>
+                                        </p:attrNameLst>
+                                      </p:cBhvr>
+                                      <p:to>
+                                        <p:strVal val="visible"/>
+                                      </p:to>
+                                    </p:set>
+                                  </p:childTnLst>
+                                </p:cTn>
+                              </p:par>
+                              <p:par>
+                                <p:cTn id="9" presetID="1" presetClass="entr" presetSubtype="0" fill="hold" nodeType="withEffect">
+                                  <p:stCondLst>
+                                    <p:cond delay="0"/>
+                                  </p:stCondLst>
+                                  <p:childTnLst>
+                                    <p:set>
+                                      <p:cBhvr>
+                                        <p:cTn id="10" dur="1" fill="hold">
+                                          <p:stCondLst>
+                                            <p:cond delay="0"/>
+                                          </p:stCondLst>
+                                        </p:cTn>
+                                        <p:tgtEl>
+                                          <p:spTgt spid="3">
+                                            <p:txEl>
+                                              <p:pRg st="5" end="5"/>
+                                            </p:txEl>
+                                          </p:spTgt>
+                                        </p:tgtEl>
+                                        <p:attrNameLst>
+                                          <p:attrName>style.visibility</p:attrName>
+                                        </p:attrNameLst>
+                                      </p:cBhvr>
+                                      <p:to>
+                                        <p:strVal val="visible"/>
+                                      </p:to>
+                                    </p:set>
+                                  </p:childTnLst>
+                                </p:cTn>
+                              </p:par>
+                            </p:childTnLst>
+                          </p:cTn>
+                        </p:par>
+                      </p:childTnLst>
+                    </p:cTn>
+                  </p:par>
+                </p:childTnLst>
+              </p:cTn>
+              <p:prevCondLst>
+                <p:cond evt="onPrev" delay="0">
+                  <p:tgtEl>
+                    <p:sldTgt/>
+                  </p:tgtEl>
+                </p:cond>
+              </p:prevCondLst>
+              <p:nextCondLst>
+                <p:cond evt="onNext" delay="0">
+                  <p:tgtEl>
+                    <p:sldTgt/>
+                  </p:tgtEl>
+                </p:cond>
+              </p:nextCondLst>
+            </p:seq>
+          </p:childTnLst>
+        </p:cTn>
       </p:par>
     </p:tnLst>
   </p:timing>
@@ -17660,77 +18549,6 @@
             <a:avLst/>
           </a:prstGeom>
           <a:solidFill>
-            <a:srgbClr val="FFC000"/>
-          </a:solidFill>
-          <a:ln>
-            <a:solidFill>
-              <a:schemeClr val="tx1"/>
-            </a:solidFill>
-          </a:ln>
-        </p:spPr>
-        <p:style>
-          <a:lnRef idx="2">
-            <a:schemeClr val="accent1">
-              <a:shade val="50000"/>
-            </a:schemeClr>
-          </a:lnRef>
-          <a:fillRef idx="1">
-            <a:schemeClr val="accent1"/>
-          </a:fillRef>
-          <a:effectRef idx="0">
-            <a:schemeClr val="accent1"/>
-          </a:effectRef>
-          <a:fontRef idx="minor">
-            <a:schemeClr val="lt1"/>
-          </a:fontRef>
-        </p:style>
-        <p:txBody>
-          <a:bodyPr rtlCol="0" anchor="ctr"/>
-          <a:lstStyle/>
-          <a:p>
-            <a:pPr algn="ctr"/>
-            <a:r>
-              <a:rPr lang="en-GB" sz="1400" dirty="0" smtClean="0">
-                <a:solidFill>
-                  <a:schemeClr val="tx1"/>
-                </a:solidFill>
-              </a:rPr>
-              <a:t>A</a:t>
-            </a:r>
-          </a:p>
-          <a:p>
-            <a:pPr algn="ctr"/>
-            <a:r>
-              <a:rPr lang="en-GB" sz="1400" dirty="0" smtClean="0">
-                <a:solidFill>
-                  <a:schemeClr val="tx1"/>
-                </a:solidFill>
-              </a:rPr>
-              <a:t>Or</a:t>
-            </a:r>
-            <a:endParaRPr lang="en-GB" sz="1400" dirty="0">
-              <a:solidFill>
-                <a:schemeClr val="tx1"/>
-              </a:solidFill>
-            </a:endParaRPr>
-          </a:p>
-        </p:txBody>
-      </p:sp>
-      <p:sp>
-        <p:nvSpPr>
-          <p:cNvPr id="5" name="Oval 4"/>
-          <p:cNvSpPr/>
-          <p:nvPr/>
-        </p:nvSpPr>
-        <p:spPr>
-          <a:xfrm>
-            <a:off x="2874708" y="2120857"/>
-            <a:ext cx="687917" cy="648072"/>
-          </a:xfrm>
-          <a:prstGeom prst="ellipse">
-            <a:avLst/>
-          </a:prstGeom>
-          <a:solidFill>
             <a:schemeClr val="accent3">
               <a:lumMod val="60000"/>
               <a:lumOff val="40000"/>
@@ -17769,6 +18587,77 @@
                   <a:schemeClr val="tx1"/>
                 </a:solidFill>
               </a:rPr>
+              <a:t>A</a:t>
+            </a:r>
+          </a:p>
+          <a:p>
+            <a:pPr algn="ctr"/>
+            <a:r>
+              <a:rPr lang="en-GB" sz="1400" dirty="0" smtClean="0">
+                <a:solidFill>
+                  <a:schemeClr val="tx1"/>
+                </a:solidFill>
+              </a:rPr>
+              <a:t>Or</a:t>
+            </a:r>
+            <a:endParaRPr lang="en-GB" sz="1400" dirty="0">
+              <a:solidFill>
+                <a:schemeClr val="tx1"/>
+              </a:solidFill>
+            </a:endParaRPr>
+          </a:p>
+        </p:txBody>
+      </p:sp>
+      <p:sp>
+        <p:nvSpPr>
+          <p:cNvPr id="5" name="Oval 4"/>
+          <p:cNvSpPr/>
+          <p:nvPr/>
+        </p:nvSpPr>
+        <p:spPr>
+          <a:xfrm>
+            <a:off x="2874708" y="2120857"/>
+            <a:ext cx="687917" cy="648072"/>
+          </a:xfrm>
+          <a:prstGeom prst="ellipse">
+            <a:avLst/>
+          </a:prstGeom>
+          <a:solidFill>
+            <a:srgbClr val="FFC000"/>
+          </a:solidFill>
+          <a:ln>
+            <a:solidFill>
+              <a:schemeClr val="tx1"/>
+            </a:solidFill>
+          </a:ln>
+        </p:spPr>
+        <p:style>
+          <a:lnRef idx="2">
+            <a:schemeClr val="accent1">
+              <a:shade val="50000"/>
+            </a:schemeClr>
+          </a:lnRef>
+          <a:fillRef idx="1">
+            <a:schemeClr val="accent1"/>
+          </a:fillRef>
+          <a:effectRef idx="0">
+            <a:schemeClr val="accent1"/>
+          </a:effectRef>
+          <a:fontRef idx="minor">
+            <a:schemeClr val="lt1"/>
+          </a:fontRef>
+        </p:style>
+        <p:txBody>
+          <a:bodyPr rtlCol="0" anchor="ctr"/>
+          <a:lstStyle/>
+          <a:p>
+            <a:pPr algn="ctr"/>
+            <a:r>
+              <a:rPr lang="en-GB" sz="1400" dirty="0" smtClean="0">
+                <a:solidFill>
+                  <a:schemeClr val="tx1"/>
+                </a:solidFill>
+              </a:rPr>
               <a:t>C</a:t>
             </a:r>
           </a:p>
@@ -17805,10 +18694,7 @@
             <a:avLst/>
           </a:prstGeom>
           <a:solidFill>
-            <a:schemeClr val="accent3">
-              <a:lumMod val="60000"/>
-              <a:lumOff val="40000"/>
-            </a:schemeClr>
+            <a:srgbClr val="FFC000"/>
           </a:solidFill>
           <a:ln>
             <a:solidFill>
@@ -17982,7 +18868,7 @@
           <p:nvPr>
             <p:extLst>
               <p:ext uri="{D42A27DB-BD31-4B8C-83A1-F6EECF244321}">
-                <p14:modId xmlns:p14="http://schemas.microsoft.com/office/powerpoint/2010/main" val="4110713544"/>
+                <p14:modId xmlns:p14="http://schemas.microsoft.com/office/powerpoint/2010/main" val="487436532"/>
               </p:ext>
             </p:extLst>
           </p:nvPr>
@@ -18686,19 +19572,19 @@
                         <m:nor/>
                       </m:rPr>
                       <a:rPr lang="en-GB" dirty="0"/>
-                      <m:t> = 001)</m:t>
+                      <m:t> = 011)</m:t>
                     </m:r>
                   </m:oMath>
                 </a14:m>
                 <a:r>
                   <a:rPr lang="en-GB" dirty="0" smtClean="0"/>
-                  <a:t>= p(A=1|ABC=001)p(B=0|ABC=001)p(C=1|ABC=001) =</a:t>
+                  <a:t>= p(A=1|ABC=011)p(B=0|ABC=011)p(C=1|ABC=011) =</a:t>
                 </a:r>
               </a:p>
               <a:p>
                 <a:r>
                   <a:rPr lang="en-GB" dirty="0" smtClean="0"/>
-                  <a:t>1 x 1 x 0 = 0.</a:t>
+                  <a:t>1 x 1 x 1 = 1.</a:t>
                 </a:r>
               </a:p>
               <a:p>
@@ -18878,7 +19764,7 @@
     </p:spTree>
     <p:extLst>
       <p:ext uri="{BB962C8B-B14F-4D97-AF65-F5344CB8AC3E}">
-        <p14:creationId xmlns:p14="http://schemas.microsoft.com/office/powerpoint/2010/main" val="2895799919"/>
+        <p14:creationId xmlns:p14="http://schemas.microsoft.com/office/powerpoint/2010/main" val="2639113603"/>
       </p:ext>
     </p:extLst>
   </p:cSld>
@@ -19013,202 +19899,6 @@
 </file>
 
 <file path=ppt/slides/slide21.xml><?xml version="1.0" encoding="utf-8"?>
-<p:sld xmlns:a="http://schemas.openxmlformats.org/drawingml/2006/main" xmlns:r="http://schemas.openxmlformats.org/officeDocument/2006/relationships" xmlns:p="http://schemas.openxmlformats.org/presentationml/2006/main">
-  <p:cSld>
-    <p:spTree>
-      <p:nvGrpSpPr>
-        <p:cNvPr id="1" name=""/>
-        <p:cNvGrpSpPr/>
-        <p:nvPr/>
-      </p:nvGrpSpPr>
-      <p:grpSpPr>
-        <a:xfrm>
-          <a:off x="0" y="0"/>
-          <a:ext cx="0" cy="0"/>
-          <a:chOff x="0" y="0"/>
-          <a:chExt cx="0" cy="0"/>
-        </a:xfrm>
-      </p:grpSpPr>
-      <p:sp>
-        <p:nvSpPr>
-          <p:cNvPr id="2" name="TextBox 1"/>
-          <p:cNvSpPr txBox="1"/>
-          <p:nvPr/>
-        </p:nvSpPr>
-        <p:spPr>
-          <a:xfrm>
-            <a:off x="836320" y="98490"/>
-            <a:ext cx="5463872" cy="646331"/>
-          </a:xfrm>
-          <a:prstGeom prst="rect">
-            <a:avLst/>
-          </a:prstGeom>
-          <a:noFill/>
-        </p:spPr>
-        <p:txBody>
-          <a:bodyPr wrap="square" rtlCol="0">
-            <a:spAutoFit/>
-          </a:bodyPr>
-          <a:lstStyle/>
-          <a:p>
-            <a:r>
-              <a:rPr lang="en-GB" sz="3600" dirty="0" smtClean="0"/>
-              <a:t>Comments on IIT</a:t>
-            </a:r>
-            <a:endParaRPr lang="en-GB" sz="3600" dirty="0"/>
-          </a:p>
-        </p:txBody>
-      </p:sp>
-      <mc:AlternateContent xmlns:mc="http://schemas.openxmlformats.org/markup-compatibility/2006">
-        <mc:Choice xmlns:a14="http://schemas.microsoft.com/office/drawing/2010/main" Requires="a14">
-          <p:sp>
-            <p:nvSpPr>
-              <p:cNvPr id="3" name="TextBox 2"/>
-              <p:cNvSpPr txBox="1"/>
-              <p:nvPr/>
-            </p:nvSpPr>
-            <p:spPr>
-              <a:xfrm>
-                <a:off x="1187624" y="1052736"/>
-                <a:ext cx="7704856" cy="1938992"/>
-              </a:xfrm>
-              <a:prstGeom prst="rect">
-                <a:avLst/>
-              </a:prstGeom>
-              <a:noFill/>
-            </p:spPr>
-            <p:txBody>
-              <a:bodyPr wrap="square" rtlCol="0">
-                <a:spAutoFit/>
-              </a:bodyPr>
-              <a:lstStyle/>
-              <a:p>
-                <a:pPr marL="285750" indent="-285750">
-                  <a:buFont typeface="Arial" pitchFamily="34" charset="0"/>
-                  <a:buChar char="•"/>
-                </a:pPr>
-                <a:r>
-                  <a:rPr lang="en-GB" sz="2400" dirty="0" smtClean="0"/>
-                  <a:t>Conditional independence allows number of columns in the TPM to be reduce from </a:t>
-                </a:r>
-                <a14:m>
-                  <m:oMath xmlns:m="http://schemas.openxmlformats.org/officeDocument/2006/math">
-                    <m:sSup>
-                      <m:sSupPr>
-                        <m:ctrlPr>
-                          <a:rPr lang="en-GB" sz="2400" b="0" i="1" smtClean="0">
-                            <a:latin typeface="Cambria Math"/>
-                          </a:rPr>
-                        </m:ctrlPr>
-                      </m:sSupPr>
-                      <m:e>
-                        <m:r>
-                          <a:rPr lang="en-GB" sz="2400" b="0" i="1" smtClean="0">
-                            <a:latin typeface="Cambria Math"/>
-                          </a:rPr>
-                          <m:t>2</m:t>
-                        </m:r>
-                      </m:e>
-                      <m:sup>
-                        <m:r>
-                          <a:rPr lang="en-GB" sz="2400" b="0" i="1" smtClean="0">
-                            <a:latin typeface="Cambria Math"/>
-                          </a:rPr>
-                          <m:t>𝑛</m:t>
-                        </m:r>
-                      </m:sup>
-                    </m:sSup>
-                  </m:oMath>
-                </a14:m>
-                <a:r>
-                  <a:rPr lang="en-GB" sz="2400" dirty="0" smtClean="0"/>
-                  <a:t> to </a:t>
-                </a:r>
-                <a14:m>
-                  <m:oMath xmlns:m="http://schemas.openxmlformats.org/officeDocument/2006/math">
-                    <m:r>
-                      <a:rPr lang="en-GB" sz="2400" b="0" i="1" smtClean="0">
-                        <a:latin typeface="Cambria Math"/>
-                      </a:rPr>
-                      <m:t>𝑛</m:t>
-                    </m:r>
-                  </m:oMath>
-                </a14:m>
-                <a:r>
-                  <a:rPr lang="en-GB" sz="2400" dirty="0" smtClean="0"/>
-                  <a:t>. There should be a way to apply this to repertoires as well, reducing the memory requirement, and time for computing distances.</a:t>
-                </a:r>
-              </a:p>
-              <a:p>
-                <a:pPr marL="285750" indent="-285750">
-                  <a:buFont typeface="Arial" pitchFamily="34" charset="0"/>
-                  <a:buChar char="•"/>
-                </a:pPr>
-                <a:endParaRPr lang="en-GB" sz="2400" dirty="0"/>
-              </a:p>
-            </p:txBody>
-          </p:sp>
-        </mc:Choice>
-        <mc:Fallback>
-          <p:sp>
-            <p:nvSpPr>
-              <p:cNvPr id="3" name="TextBox 2"/>
-              <p:cNvSpPr txBox="1">
-                <a:spLocks noRot="1" noChangeAspect="1" noMove="1" noResize="1" noEditPoints="1" noAdjustHandles="1" noChangeArrowheads="1" noChangeShapeType="1" noTextEdit="1"/>
-              </p:cNvSpPr>
-              <p:nvPr/>
-            </p:nvSpPr>
-            <p:spPr>
-              <a:xfrm>
-                <a:off x="1187624" y="1052736"/>
-                <a:ext cx="7704856" cy="1938992"/>
-              </a:xfrm>
-              <a:prstGeom prst="rect">
-                <a:avLst/>
-              </a:prstGeom>
-              <a:blipFill rotWithShape="1">
-                <a:blip r:embed="rId2"/>
-                <a:stretch>
-                  <a:fillRect l="-1108" t="-2516"/>
-                </a:stretch>
-              </a:blipFill>
-            </p:spPr>
-            <p:txBody>
-              <a:bodyPr/>
-              <a:lstStyle/>
-              <a:p>
-                <a:r>
-                  <a:rPr lang="en-GB">
-                    <a:noFill/>
-                  </a:rPr>
-                  <a:t> </a:t>
-                </a:r>
-              </a:p>
-            </p:txBody>
-          </p:sp>
-        </mc:Fallback>
-      </mc:AlternateContent>
-    </p:spTree>
-    <p:extLst>
-      <p:ext uri="{BB962C8B-B14F-4D97-AF65-F5344CB8AC3E}">
-        <p14:creationId xmlns:p14="http://schemas.microsoft.com/office/powerpoint/2010/main" val="3556201153"/>
-      </p:ext>
-    </p:extLst>
-  </p:cSld>
-  <p:clrMapOvr>
-    <a:masterClrMapping/>
-  </p:clrMapOvr>
-  <p:timing>
-    <p:tnLst>
-      <p:par>
-        <p:cTn id="1" dur="indefinite" restart="never" nodeType="tmRoot"/>
-      </p:par>
-    </p:tnLst>
-  </p:timing>
-</p:sld>
-</file>
-
-<file path=ppt/slides/slide22.xml><?xml version="1.0" encoding="utf-8"?>
 <p:sld xmlns:a="http://schemas.openxmlformats.org/drawingml/2006/main" xmlns:r="http://schemas.openxmlformats.org/officeDocument/2006/relationships" xmlns:p="http://schemas.openxmlformats.org/presentationml/2006/main">
   <p:cSld>
     <p:spTree>
@@ -19975,7 +20665,7 @@
     </p:spTree>
     <p:extLst>
       <p:ext uri="{BB962C8B-B14F-4D97-AF65-F5344CB8AC3E}">
-        <p14:creationId xmlns:p14="http://schemas.microsoft.com/office/powerpoint/2010/main" val="493427727"/>
+        <p14:creationId xmlns:p14="http://schemas.microsoft.com/office/powerpoint/2010/main" val="776792516"/>
       </p:ext>
     </p:extLst>
   </p:cSld>
@@ -20260,7 +20950,815 @@
 </p:sld>
 </file>
 
+<file path=ppt/slides/slide22.xml><?xml version="1.0" encoding="utf-8"?>
+<p:sld xmlns:a="http://schemas.openxmlformats.org/drawingml/2006/main" xmlns:r="http://schemas.openxmlformats.org/officeDocument/2006/relationships" xmlns:p="http://schemas.openxmlformats.org/presentationml/2006/main">
+  <p:cSld>
+    <p:spTree>
+      <p:nvGrpSpPr>
+        <p:cNvPr id="1" name=""/>
+        <p:cNvGrpSpPr/>
+        <p:nvPr/>
+      </p:nvGrpSpPr>
+      <p:grpSpPr>
+        <a:xfrm>
+          <a:off x="0" y="0"/>
+          <a:ext cx="0" cy="0"/>
+          <a:chOff x="0" y="0"/>
+          <a:chExt cx="0" cy="0"/>
+        </a:xfrm>
+      </p:grpSpPr>
+      <p:sp>
+        <p:nvSpPr>
+          <p:cNvPr id="2" name="TextBox 1"/>
+          <p:cNvSpPr txBox="1"/>
+          <p:nvPr/>
+        </p:nvSpPr>
+        <p:spPr>
+          <a:xfrm>
+            <a:off x="836320" y="98490"/>
+            <a:ext cx="5463872" cy="646331"/>
+          </a:xfrm>
+          <a:prstGeom prst="rect">
+            <a:avLst/>
+          </a:prstGeom>
+          <a:noFill/>
+        </p:spPr>
+        <p:txBody>
+          <a:bodyPr wrap="square" rtlCol="0">
+            <a:spAutoFit/>
+          </a:bodyPr>
+          <a:lstStyle/>
+          <a:p>
+            <a:r>
+              <a:rPr lang="en-GB" sz="3600" dirty="0" smtClean="0"/>
+              <a:t>Comments on IIT</a:t>
+            </a:r>
+            <a:endParaRPr lang="en-GB" sz="3600" dirty="0"/>
+          </a:p>
+        </p:txBody>
+      </p:sp>
+      <mc:AlternateContent xmlns:mc="http://schemas.openxmlformats.org/markup-compatibility/2006">
+        <mc:Choice xmlns:a14="http://schemas.microsoft.com/office/drawing/2010/main" Requires="a14">
+          <p:sp>
+            <p:nvSpPr>
+              <p:cNvPr id="3" name="TextBox 2"/>
+              <p:cNvSpPr txBox="1"/>
+              <p:nvPr/>
+            </p:nvSpPr>
+            <p:spPr>
+              <a:xfrm>
+                <a:off x="1187624" y="1052736"/>
+                <a:ext cx="7704856" cy="4524315"/>
+              </a:xfrm>
+              <a:prstGeom prst="rect">
+                <a:avLst/>
+              </a:prstGeom>
+              <a:noFill/>
+            </p:spPr>
+            <p:txBody>
+              <a:bodyPr wrap="square" rtlCol="0">
+                <a:spAutoFit/>
+              </a:bodyPr>
+              <a:lstStyle/>
+              <a:p>
+                <a:pPr marL="285750" indent="-285750">
+                  <a:buFont typeface="Arial" pitchFamily="34" charset="0"/>
+                  <a:buChar char="•"/>
+                </a:pPr>
+                <a:r>
+                  <a:rPr lang="en-GB" sz="2400" dirty="0" smtClean="0"/>
+                  <a:t>Conditional independence allows number of columns in the TPM to be reduce from </a:t>
+                </a:r>
+                <a14:m>
+                  <m:oMath xmlns:m="http://schemas.openxmlformats.org/officeDocument/2006/math">
+                    <m:sSup>
+                      <m:sSupPr>
+                        <m:ctrlPr>
+                          <a:rPr lang="en-GB" sz="2400" b="0" i="1" smtClean="0">
+                            <a:latin typeface="Cambria Math"/>
+                          </a:rPr>
+                        </m:ctrlPr>
+                      </m:sSupPr>
+                      <m:e>
+                        <m:r>
+                          <a:rPr lang="en-GB" sz="2400" b="0" i="1" smtClean="0">
+                            <a:latin typeface="Cambria Math"/>
+                          </a:rPr>
+                          <m:t>2</m:t>
+                        </m:r>
+                      </m:e>
+                      <m:sup>
+                        <m:r>
+                          <a:rPr lang="en-GB" sz="2400" b="0" i="1" smtClean="0">
+                            <a:latin typeface="Cambria Math"/>
+                          </a:rPr>
+                          <m:t>𝑛</m:t>
+                        </m:r>
+                      </m:sup>
+                    </m:sSup>
+                  </m:oMath>
+                </a14:m>
+                <a:r>
+                  <a:rPr lang="en-GB" sz="2400" dirty="0" smtClean="0"/>
+                  <a:t> to </a:t>
+                </a:r>
+                <a14:m>
+                  <m:oMath xmlns:m="http://schemas.openxmlformats.org/officeDocument/2006/math">
+                    <m:r>
+                      <a:rPr lang="en-GB" sz="2400" b="0" i="1" smtClean="0">
+                        <a:latin typeface="Cambria Math"/>
+                      </a:rPr>
+                      <m:t>𝑛</m:t>
+                    </m:r>
+                  </m:oMath>
+                </a14:m>
+                <a:r>
+                  <a:rPr lang="en-GB" sz="2400" dirty="0" smtClean="0"/>
+                  <a:t>. There should be a way to apply this to repertoires as well, reducing the memory requirement, and time for computing distances.</a:t>
+                </a:r>
+              </a:p>
+              <a:p>
+                <a:pPr marL="285750" indent="-285750">
+                  <a:buFont typeface="Arial" pitchFamily="34" charset="0"/>
+                  <a:buChar char="•"/>
+                </a:pPr>
+                <a:endParaRPr lang="en-GB" sz="2400" dirty="0" smtClean="0"/>
+              </a:p>
+              <a:p>
+                <a:pPr marL="285750" indent="-285750">
+                  <a:buFont typeface="Arial" pitchFamily="34" charset="0"/>
+                  <a:buChar char="•"/>
+                </a:pPr>
+                <a:r>
+                  <a:rPr lang="en-GB" sz="2400" dirty="0" smtClean="0"/>
+                  <a:t>For the context of consciousness, it is important for IIT to depend on system state. For this context, this doesn’t seem to be important, and prevents approximation.</a:t>
+                </a:r>
+              </a:p>
+              <a:p>
+                <a:pPr marL="285750" indent="-285750">
+                  <a:buFont typeface="Arial" pitchFamily="34" charset="0"/>
+                  <a:buChar char="•"/>
+                </a:pPr>
+                <a:endParaRPr lang="en-GB" sz="2400" dirty="0" smtClean="0"/>
+              </a:p>
+              <a:p>
+                <a:pPr marL="285750" indent="-285750">
+                  <a:buFont typeface="Arial" pitchFamily="34" charset="0"/>
+                  <a:buChar char="•"/>
+                </a:pPr>
+                <a:r>
+                  <a:rPr lang="en-GB" sz="2400" dirty="0" smtClean="0"/>
+                  <a:t>Integrated information tends to be larger for deterministic systems. It is unclear why this should imply consciousness,  or effective communication.</a:t>
+                </a:r>
+                <a:endParaRPr lang="en-GB" sz="2400" dirty="0"/>
+              </a:p>
+            </p:txBody>
+          </p:sp>
+        </mc:Choice>
+        <mc:Fallback>
+          <p:sp>
+            <p:nvSpPr>
+              <p:cNvPr id="3" name="TextBox 2"/>
+              <p:cNvSpPr txBox="1">
+                <a:spLocks noRot="1" noChangeAspect="1" noMove="1" noResize="1" noEditPoints="1" noAdjustHandles="1" noChangeArrowheads="1" noChangeShapeType="1" noTextEdit="1"/>
+              </p:cNvSpPr>
+              <p:nvPr/>
+            </p:nvSpPr>
+            <p:spPr>
+              <a:xfrm>
+                <a:off x="1187624" y="1052736"/>
+                <a:ext cx="7704856" cy="4524315"/>
+              </a:xfrm>
+              <a:prstGeom prst="rect">
+                <a:avLst/>
+              </a:prstGeom>
+              <a:blipFill rotWithShape="1">
+                <a:blip r:embed="rId2"/>
+                <a:stretch>
+                  <a:fillRect l="-1108" t="-1078" r="-2373" b="-2156"/>
+                </a:stretch>
+              </a:blipFill>
+            </p:spPr>
+            <p:txBody>
+              <a:bodyPr/>
+              <a:lstStyle/>
+              <a:p>
+                <a:r>
+                  <a:rPr lang="en-GB">
+                    <a:noFill/>
+                  </a:rPr>
+                  <a:t> </a:t>
+                </a:r>
+              </a:p>
+            </p:txBody>
+          </p:sp>
+        </mc:Fallback>
+      </mc:AlternateContent>
+    </p:spTree>
+    <p:extLst>
+      <p:ext uri="{BB962C8B-B14F-4D97-AF65-F5344CB8AC3E}">
+        <p14:creationId xmlns:p14="http://schemas.microsoft.com/office/powerpoint/2010/main" val="211667434"/>
+      </p:ext>
+    </p:extLst>
+  </p:cSld>
+  <p:clrMapOvr>
+    <a:masterClrMapping/>
+  </p:clrMapOvr>
+  <p:timing>
+    <p:tnLst>
+      <p:par>
+        <p:cTn id="1" dur="indefinite" restart="never" nodeType="tmRoot">
+          <p:childTnLst>
+            <p:seq concurrent="1" nextAc="seek">
+              <p:cTn id="2" dur="indefinite" nodeType="mainSeq">
+                <p:childTnLst>
+                  <p:par>
+                    <p:cTn id="3" fill="hold">
+                      <p:stCondLst>
+                        <p:cond delay="indefinite"/>
+                      </p:stCondLst>
+                      <p:childTnLst>
+                        <p:par>
+                          <p:cTn id="4" fill="hold">
+                            <p:stCondLst>
+                              <p:cond delay="0"/>
+                            </p:stCondLst>
+                            <p:childTnLst>
+                              <p:par>
+                                <p:cTn id="5" presetID="1" presetClass="entr" presetSubtype="0" fill="hold" nodeType="clickEffect">
+                                  <p:stCondLst>
+                                    <p:cond delay="0"/>
+                                  </p:stCondLst>
+                                  <p:childTnLst>
+                                    <p:set>
+                                      <p:cBhvr>
+                                        <p:cTn id="6" dur="1" fill="hold">
+                                          <p:stCondLst>
+                                            <p:cond delay="0"/>
+                                          </p:stCondLst>
+                                        </p:cTn>
+                                        <p:tgtEl>
+                                          <p:spTgt spid="3">
+                                            <p:txEl>
+                                              <p:pRg st="2" end="2"/>
+                                            </p:txEl>
+                                          </p:spTgt>
+                                        </p:tgtEl>
+                                        <p:attrNameLst>
+                                          <p:attrName>style.visibility</p:attrName>
+                                        </p:attrNameLst>
+                                      </p:cBhvr>
+                                      <p:to>
+                                        <p:strVal val="visible"/>
+                                      </p:to>
+                                    </p:set>
+                                  </p:childTnLst>
+                                </p:cTn>
+                              </p:par>
+                            </p:childTnLst>
+                          </p:cTn>
+                        </p:par>
+                      </p:childTnLst>
+                    </p:cTn>
+                  </p:par>
+                  <p:par>
+                    <p:cTn id="7" fill="hold">
+                      <p:stCondLst>
+                        <p:cond delay="indefinite"/>
+                      </p:stCondLst>
+                      <p:childTnLst>
+                        <p:par>
+                          <p:cTn id="8" fill="hold">
+                            <p:stCondLst>
+                              <p:cond delay="0"/>
+                            </p:stCondLst>
+                            <p:childTnLst>
+                              <p:par>
+                                <p:cTn id="9" presetID="1" presetClass="entr" presetSubtype="0" fill="hold" nodeType="clickEffect">
+                                  <p:stCondLst>
+                                    <p:cond delay="0"/>
+                                  </p:stCondLst>
+                                  <p:childTnLst>
+                                    <p:set>
+                                      <p:cBhvr>
+                                        <p:cTn id="10" dur="1" fill="hold">
+                                          <p:stCondLst>
+                                            <p:cond delay="0"/>
+                                          </p:stCondLst>
+                                        </p:cTn>
+                                        <p:tgtEl>
+                                          <p:spTgt spid="3">
+                                            <p:txEl>
+                                              <p:pRg st="4" end="4"/>
+                                            </p:txEl>
+                                          </p:spTgt>
+                                        </p:tgtEl>
+                                        <p:attrNameLst>
+                                          <p:attrName>style.visibility</p:attrName>
+                                        </p:attrNameLst>
+                                      </p:cBhvr>
+                                      <p:to>
+                                        <p:strVal val="visible"/>
+                                      </p:to>
+                                    </p:set>
+                                  </p:childTnLst>
+                                </p:cTn>
+                              </p:par>
+                            </p:childTnLst>
+                          </p:cTn>
+                        </p:par>
+                      </p:childTnLst>
+                    </p:cTn>
+                  </p:par>
+                </p:childTnLst>
+              </p:cTn>
+              <p:prevCondLst>
+                <p:cond evt="onPrev" delay="0">
+                  <p:tgtEl>
+                    <p:sldTgt/>
+                  </p:tgtEl>
+                </p:cond>
+              </p:prevCondLst>
+              <p:nextCondLst>
+                <p:cond evt="onNext" delay="0">
+                  <p:tgtEl>
+                    <p:sldTgt/>
+                  </p:tgtEl>
+                </p:cond>
+              </p:nextCondLst>
+            </p:seq>
+          </p:childTnLst>
+        </p:cTn>
+      </p:par>
+    </p:tnLst>
+  </p:timing>
+</p:sld>
+</file>
+
 <file path=ppt/slides/slide23.xml><?xml version="1.0" encoding="utf-8"?>
+<p:sld xmlns:a="http://schemas.openxmlformats.org/drawingml/2006/main" xmlns:r="http://schemas.openxmlformats.org/officeDocument/2006/relationships" xmlns:p="http://schemas.openxmlformats.org/presentationml/2006/main">
+  <p:cSld>
+    <p:spTree>
+      <p:nvGrpSpPr>
+        <p:cNvPr id="1" name=""/>
+        <p:cNvGrpSpPr/>
+        <p:nvPr/>
+      </p:nvGrpSpPr>
+      <p:grpSpPr>
+        <a:xfrm>
+          <a:off x="0" y="0"/>
+          <a:ext cx="0" cy="0"/>
+          <a:chOff x="0" y="0"/>
+          <a:chExt cx="0" cy="0"/>
+        </a:xfrm>
+      </p:grpSpPr>
+      <p:sp>
+        <p:nvSpPr>
+          <p:cNvPr id="2" name="TextBox 1"/>
+          <p:cNvSpPr txBox="1"/>
+          <p:nvPr/>
+        </p:nvSpPr>
+        <p:spPr>
+          <a:xfrm>
+            <a:off x="836320" y="98490"/>
+            <a:ext cx="5463872" cy="646331"/>
+          </a:xfrm>
+          <a:prstGeom prst="rect">
+            <a:avLst/>
+          </a:prstGeom>
+          <a:noFill/>
+        </p:spPr>
+        <p:txBody>
+          <a:bodyPr wrap="square" rtlCol="0">
+            <a:spAutoFit/>
+          </a:bodyPr>
+          <a:lstStyle/>
+          <a:p>
+            <a:r>
+              <a:rPr lang="en-GB" sz="3600" dirty="0" smtClean="0"/>
+              <a:t>Conclusions</a:t>
+            </a:r>
+            <a:endParaRPr lang="en-GB" sz="3600" dirty="0"/>
+          </a:p>
+        </p:txBody>
+      </p:sp>
+      <mc:AlternateContent xmlns:mc="http://schemas.openxmlformats.org/markup-compatibility/2006">
+        <mc:Choice xmlns:a14="http://schemas.microsoft.com/office/drawing/2010/main" Requires="a14">
+          <p:sp>
+            <p:nvSpPr>
+              <p:cNvPr id="4" name="TextBox 3"/>
+              <p:cNvSpPr txBox="1"/>
+              <p:nvPr/>
+            </p:nvSpPr>
+            <p:spPr>
+              <a:xfrm>
+                <a:off x="992595" y="1052736"/>
+                <a:ext cx="7848872" cy="7294305"/>
+              </a:xfrm>
+              <a:prstGeom prst="rect">
+                <a:avLst/>
+              </a:prstGeom>
+              <a:noFill/>
+            </p:spPr>
+            <p:txBody>
+              <a:bodyPr wrap="square" rtlCol="0">
+                <a:spAutoFit/>
+              </a:bodyPr>
+              <a:lstStyle/>
+              <a:p>
+                <a:pPr marL="457200" indent="-457200">
+                  <a:buFont typeface="+mj-lt"/>
+                  <a:buAutoNum type="arabicPeriod"/>
+                </a:pPr>
+                <a:r>
+                  <a:rPr lang="en-GB" sz="2400" dirty="0" smtClean="0"/>
+                  <a:t>Integrated information is negatively correlated with the cost of waste. Thus it does have a tangible meaning.</a:t>
+                </a:r>
+                <a:endParaRPr lang="en-GB" sz="2400" dirty="0"/>
+              </a:p>
+              <a:p>
+                <a:pPr marL="457200" indent="-457200">
+                  <a:buFont typeface="+mj-lt"/>
+                  <a:buAutoNum type="arabicPeriod"/>
+                </a:pPr>
+                <a:endParaRPr lang="en-GB" sz="2400" dirty="0" smtClean="0"/>
+              </a:p>
+              <a:p>
+                <a:pPr marL="457200" indent="-457200">
+                  <a:buFont typeface="+mj-lt"/>
+                  <a:buAutoNum type="arabicPeriod"/>
+                </a:pPr>
+                <a:r>
+                  <a:rPr lang="en-GB" sz="2400" dirty="0" smtClean="0"/>
+                  <a:t>IIT has 2 main problems which restrict its applicability:</a:t>
+                </a:r>
+              </a:p>
+              <a:p>
+                <a:pPr marL="914400" lvl="1" indent="-457200">
+                  <a:buFont typeface="+mj-lt"/>
+                  <a:buAutoNum type="arabicPeriod"/>
+                </a:pPr>
+                <a:r>
+                  <a:rPr lang="en-GB" sz="2400" dirty="0" smtClean="0"/>
+                  <a:t>Computation of integrated information scales at a rate which make it infeasible to calculate on large scales.</a:t>
+                </a:r>
+              </a:p>
+              <a:p>
+                <a:pPr marL="914400" lvl="1" indent="-457200">
+                  <a:buFont typeface="+mj-lt"/>
+                  <a:buAutoNum type="arabicPeriod"/>
+                </a:pPr>
+                <a:r>
+                  <a:rPr lang="en-GB" sz="2400" dirty="0" smtClean="0"/>
+                  <a:t>IIT requires knowledge of all possible states of the system, which in practice may not be available.</a:t>
+                </a:r>
+              </a:p>
+              <a:p>
+                <a:pPr marL="914400" lvl="1" indent="-457200">
+                  <a:buFont typeface="+mj-lt"/>
+                  <a:buAutoNum type="arabicPeriod"/>
+                </a:pPr>
+                <a:endParaRPr lang="en-GB" sz="2400" dirty="0"/>
+              </a:p>
+              <a:p>
+                <a:pPr marL="457200" indent="-457200">
+                  <a:buFont typeface="+mj-lt"/>
+                  <a:buAutoNum type="arabicPeriod"/>
+                </a:pPr>
+                <a:r>
+                  <a:rPr lang="en-GB" sz="2400" dirty="0" smtClean="0"/>
+                  <a:t>For computing </a:t>
+                </a:r>
+                <a14:m>
+                  <m:oMath xmlns:m="http://schemas.openxmlformats.org/officeDocument/2006/math">
+                    <m:r>
+                      <m:rPr>
+                        <m:sty m:val="p"/>
+                      </m:rPr>
+                      <a:rPr lang="en-GB" sz="2400" b="0" i="0" smtClean="0">
+                        <a:latin typeface="Cambria Math"/>
+                      </a:rPr>
+                      <m:t>Φ</m:t>
+                    </m:r>
+                  </m:oMath>
+                </a14:m>
+                <a:r>
+                  <a:rPr lang="en-GB" sz="2400" dirty="0" smtClean="0"/>
+                  <a:t> actually beneficial we would either need it to be faster to compute than cost, or we would need to understand its inner workings so to construct networks of large </a:t>
+                </a:r>
+                <a14:m>
+                  <m:oMath xmlns:m="http://schemas.openxmlformats.org/officeDocument/2006/math">
+                    <m:r>
+                      <m:rPr>
+                        <m:sty m:val="p"/>
+                      </m:rPr>
+                      <a:rPr lang="en-GB" sz="2400" b="0" i="0" smtClean="0">
+                        <a:latin typeface="Cambria Math"/>
+                      </a:rPr>
+                      <m:t>Φ</m:t>
+                    </m:r>
+                  </m:oMath>
+                </a14:m>
+                <a:r>
+                  <a:rPr lang="en-GB" sz="2400" dirty="0" smtClean="0"/>
+                  <a:t> directly.</a:t>
+                </a:r>
+              </a:p>
+              <a:p>
+                <a:pPr marL="457200" indent="-457200">
+                  <a:buFont typeface="+mj-lt"/>
+                  <a:buAutoNum type="arabicPeriod"/>
+                </a:pPr>
+                <a:endParaRPr lang="en-GB" sz="2400" dirty="0" smtClean="0"/>
+              </a:p>
+              <a:p>
+                <a:pPr marL="457200" indent="-457200">
+                  <a:buFont typeface="+mj-lt"/>
+                  <a:buAutoNum type="arabicPeriod"/>
+                </a:pPr>
+                <a:endParaRPr lang="en-GB" sz="2400" dirty="0" smtClean="0"/>
+              </a:p>
+              <a:p>
+                <a:pPr marL="457200" indent="-457200">
+                  <a:buFont typeface="+mj-lt"/>
+                  <a:buAutoNum type="arabicPeriod"/>
+                </a:pPr>
+                <a:endParaRPr lang="en-GB" sz="2400" dirty="0"/>
+              </a:p>
+              <a:p>
+                <a:pPr marL="457200" indent="-457200">
+                  <a:buFont typeface="+mj-lt"/>
+                  <a:buAutoNum type="arabicPeriod"/>
+                </a:pPr>
+                <a:endParaRPr lang="en-GB" sz="2400" dirty="0" smtClean="0"/>
+              </a:p>
+              <a:p>
+                <a:pPr marL="457200" indent="-457200">
+                  <a:buFont typeface="+mj-lt"/>
+                  <a:buAutoNum type="arabicPeriod"/>
+                </a:pPr>
+                <a:endParaRPr lang="en-GB" sz="2000" dirty="0"/>
+              </a:p>
+              <a:p>
+                <a:pPr marL="457200" indent="-457200">
+                  <a:buFont typeface="+mj-lt"/>
+                  <a:buAutoNum type="arabicPeriod"/>
+                </a:pPr>
+                <a:endParaRPr lang="en-GB" sz="2000" dirty="0" smtClean="0"/>
+              </a:p>
+              <a:p>
+                <a:pPr marL="457200" indent="-457200">
+                  <a:buFont typeface="+mj-lt"/>
+                  <a:buAutoNum type="arabicPeriod"/>
+                </a:pPr>
+                <a:endParaRPr lang="en-GB" sz="2000" dirty="0"/>
+              </a:p>
+            </p:txBody>
+          </p:sp>
+        </mc:Choice>
+        <mc:Fallback>
+          <p:sp>
+            <p:nvSpPr>
+              <p:cNvPr id="4" name="TextBox 3"/>
+              <p:cNvSpPr txBox="1">
+                <a:spLocks noRot="1" noChangeAspect="1" noMove="1" noResize="1" noEditPoints="1" noAdjustHandles="1" noChangeArrowheads="1" noChangeShapeType="1" noTextEdit="1"/>
+              </p:cNvSpPr>
+              <p:nvPr/>
+            </p:nvSpPr>
+            <p:spPr>
+              <a:xfrm>
+                <a:off x="992595" y="1052736"/>
+                <a:ext cx="7848872" cy="7294305"/>
+              </a:xfrm>
+              <a:prstGeom prst="rect">
+                <a:avLst/>
+              </a:prstGeom>
+              <a:blipFill rotWithShape="1">
+                <a:blip r:embed="rId2"/>
+                <a:stretch>
+                  <a:fillRect l="-1243" t="-753" r="-1632"/>
+                </a:stretch>
+              </a:blipFill>
+            </p:spPr>
+            <p:txBody>
+              <a:bodyPr/>
+              <a:lstStyle/>
+              <a:p>
+                <a:r>
+                  <a:rPr lang="en-GB">
+                    <a:noFill/>
+                  </a:rPr>
+                  <a:t> </a:t>
+                </a:r>
+              </a:p>
+            </p:txBody>
+          </p:sp>
+        </mc:Fallback>
+      </mc:AlternateContent>
+    </p:spTree>
+    <p:extLst>
+      <p:ext uri="{BB962C8B-B14F-4D97-AF65-F5344CB8AC3E}">
+        <p14:creationId xmlns:p14="http://schemas.microsoft.com/office/powerpoint/2010/main" val="838905715"/>
+      </p:ext>
+    </p:extLst>
+  </p:cSld>
+  <p:clrMapOvr>
+    <a:masterClrMapping/>
+  </p:clrMapOvr>
+  <p:timing>
+    <p:tnLst>
+      <p:par>
+        <p:cTn id="1" dur="indefinite" restart="never" nodeType="tmRoot">
+          <p:childTnLst>
+            <p:seq concurrent="1" nextAc="seek">
+              <p:cTn id="2" dur="indefinite" nodeType="mainSeq">
+                <p:childTnLst>
+                  <p:par>
+                    <p:cTn id="3" fill="hold">
+                      <p:stCondLst>
+                        <p:cond delay="indefinite"/>
+                      </p:stCondLst>
+                      <p:childTnLst>
+                        <p:par>
+                          <p:cTn id="4" fill="hold">
+                            <p:stCondLst>
+                              <p:cond delay="0"/>
+                            </p:stCondLst>
+                            <p:childTnLst>
+                              <p:par>
+                                <p:cTn id="5" presetID="1" presetClass="entr" presetSubtype="0" fill="hold" nodeType="clickEffect">
+                                  <p:stCondLst>
+                                    <p:cond delay="0"/>
+                                  </p:stCondLst>
+                                  <p:childTnLst>
+                                    <p:set>
+                                      <p:cBhvr>
+                                        <p:cTn id="6" dur="1" fill="hold">
+                                          <p:stCondLst>
+                                            <p:cond delay="0"/>
+                                          </p:stCondLst>
+                                        </p:cTn>
+                                        <p:tgtEl>
+                                          <p:spTgt spid="4">
+                                            <p:txEl>
+                                              <p:pRg st="2" end="2"/>
+                                            </p:txEl>
+                                          </p:spTgt>
+                                        </p:tgtEl>
+                                        <p:attrNameLst>
+                                          <p:attrName>style.visibility</p:attrName>
+                                        </p:attrNameLst>
+                                      </p:cBhvr>
+                                      <p:to>
+                                        <p:strVal val="visible"/>
+                                      </p:to>
+                                    </p:set>
+                                  </p:childTnLst>
+                                </p:cTn>
+                              </p:par>
+                              <p:par>
+                                <p:cTn id="7" presetID="1" presetClass="entr" presetSubtype="0" fill="hold" nodeType="withEffect">
+                                  <p:stCondLst>
+                                    <p:cond delay="0"/>
+                                  </p:stCondLst>
+                                  <p:childTnLst>
+                                    <p:set>
+                                      <p:cBhvr>
+                                        <p:cTn id="8" dur="1" fill="hold">
+                                          <p:stCondLst>
+                                            <p:cond delay="0"/>
+                                          </p:stCondLst>
+                                        </p:cTn>
+                                        <p:tgtEl>
+                                          <p:spTgt spid="4">
+                                            <p:txEl>
+                                              <p:pRg st="3" end="3"/>
+                                            </p:txEl>
+                                          </p:spTgt>
+                                        </p:tgtEl>
+                                        <p:attrNameLst>
+                                          <p:attrName>style.visibility</p:attrName>
+                                        </p:attrNameLst>
+                                      </p:cBhvr>
+                                      <p:to>
+                                        <p:strVal val="visible"/>
+                                      </p:to>
+                                    </p:set>
+                                  </p:childTnLst>
+                                </p:cTn>
+                              </p:par>
+                              <p:par>
+                                <p:cTn id="9" presetID="1" presetClass="entr" presetSubtype="0" fill="hold" nodeType="withEffect">
+                                  <p:stCondLst>
+                                    <p:cond delay="0"/>
+                                  </p:stCondLst>
+                                  <p:childTnLst>
+                                    <p:set>
+                                      <p:cBhvr>
+                                        <p:cTn id="10" dur="1" fill="hold">
+                                          <p:stCondLst>
+                                            <p:cond delay="0"/>
+                                          </p:stCondLst>
+                                        </p:cTn>
+                                        <p:tgtEl>
+                                          <p:spTgt spid="4">
+                                            <p:txEl>
+                                              <p:pRg st="4" end="4"/>
+                                            </p:txEl>
+                                          </p:spTgt>
+                                        </p:tgtEl>
+                                        <p:attrNameLst>
+                                          <p:attrName>style.visibility</p:attrName>
+                                        </p:attrNameLst>
+                                      </p:cBhvr>
+                                      <p:to>
+                                        <p:strVal val="visible"/>
+                                      </p:to>
+                                    </p:set>
+                                  </p:childTnLst>
+                                </p:cTn>
+                              </p:par>
+                            </p:childTnLst>
+                          </p:cTn>
+                        </p:par>
+                      </p:childTnLst>
+                    </p:cTn>
+                  </p:par>
+                  <p:par>
+                    <p:cTn id="11" fill="hold">
+                      <p:stCondLst>
+                        <p:cond delay="indefinite"/>
+                      </p:stCondLst>
+                      <p:childTnLst>
+                        <p:par>
+                          <p:cTn id="12" fill="hold">
+                            <p:stCondLst>
+                              <p:cond delay="0"/>
+                            </p:stCondLst>
+                            <p:childTnLst>
+                              <p:par>
+                                <p:cTn id="13" presetID="1" presetClass="entr" presetSubtype="0" fill="hold" nodeType="clickEffect">
+                                  <p:stCondLst>
+                                    <p:cond delay="0"/>
+                                  </p:stCondLst>
+                                  <p:childTnLst>
+                                    <p:set>
+                                      <p:cBhvr>
+                                        <p:cTn id="14" dur="1" fill="hold">
+                                          <p:stCondLst>
+                                            <p:cond delay="0"/>
+                                          </p:stCondLst>
+                                        </p:cTn>
+                                        <p:tgtEl>
+                                          <p:spTgt spid="4">
+                                            <p:txEl>
+                                              <p:pRg st="6" end="6"/>
+                                            </p:txEl>
+                                          </p:spTgt>
+                                        </p:tgtEl>
+                                        <p:attrNameLst>
+                                          <p:attrName>style.visibility</p:attrName>
+                                        </p:attrNameLst>
+                                      </p:cBhvr>
+                                      <p:to>
+                                        <p:strVal val="visible"/>
+                                      </p:to>
+                                    </p:set>
+                                  </p:childTnLst>
+                                </p:cTn>
+                              </p:par>
+                            </p:childTnLst>
+                          </p:cTn>
+                        </p:par>
+                      </p:childTnLst>
+                    </p:cTn>
+                  </p:par>
+                </p:childTnLst>
+              </p:cTn>
+              <p:prevCondLst>
+                <p:cond evt="onPrev" delay="0">
+                  <p:tgtEl>
+                    <p:sldTgt/>
+                  </p:tgtEl>
+                </p:cond>
+              </p:prevCondLst>
+              <p:nextCondLst>
+                <p:cond evt="onNext" delay="0">
+                  <p:tgtEl>
+                    <p:sldTgt/>
+                  </p:tgtEl>
+                </p:cond>
+              </p:nextCondLst>
+            </p:seq>
+          </p:childTnLst>
+        </p:cTn>
+      </p:par>
+    </p:tnLst>
+  </p:timing>
+</p:sld>
+</file>
+
+<file path=ppt/slides/slide24.xml><?xml version="1.0" encoding="utf-8"?>
 <p:sld xmlns:a="http://schemas.openxmlformats.org/drawingml/2006/main" xmlns:r="http://schemas.openxmlformats.org/officeDocument/2006/relationships" xmlns:p="http://schemas.openxmlformats.org/presentationml/2006/main">
   <p:cSld>
     <p:spTree>
@@ -28723,8 +30221,8 @@
           </a:p>
         </p:txBody>
       </p:sp>
-      <mc:AlternateContent xmlns:mc="http://schemas.openxmlformats.org/markup-compatibility/2006" xmlns:a14="http://schemas.microsoft.com/office/drawing/2010/main">
-        <mc:Choice Requires="a14">
+      <mc:AlternateContent xmlns:mc="http://schemas.openxmlformats.org/markup-compatibility/2006">
+        <mc:Choice xmlns:a14="http://schemas.microsoft.com/office/drawing/2010/main" Requires="a14">
           <p:sp>
             <p:nvSpPr>
               <p:cNvPr id="8" name="TextBox 7"/>
@@ -28733,8 +30231,8 @@
             </p:nvSpPr>
             <p:spPr>
               <a:xfrm>
-                <a:off x="971600" y="4797152"/>
-                <a:ext cx="7549060" cy="625171"/>
+                <a:off x="971599" y="4797152"/>
+                <a:ext cx="8064897" cy="625171"/>
               </a:xfrm>
               <a:prstGeom prst="rect">
                 <a:avLst/>
@@ -28822,10 +30320,10 @@
                           </m:sSubPr>
                           <m:e>
                             <m:r>
-                              <a:rPr lang="en-GB" sz="2800" i="1">
+                              <a:rPr lang="en-GB" sz="2800" b="0" i="1" smtClean="0">
                                 <a:latin typeface="Cambria Math"/>
                               </a:rPr>
-                              <m:t>𝑍</m:t>
+                              <m:t>𝐴𝐵</m:t>
                             </m:r>
                           </m:e>
                           <m:sub>
@@ -28844,16 +30342,22 @@
                           <m:t>=</m:t>
                         </m:r>
                         <m:r>
-                          <a:rPr lang="en-GB" sz="2800" i="1">
+                          <a:rPr lang="en-GB" sz="2800" b="0" i="1" smtClean="0">
                             <a:latin typeface="Cambria Math"/>
                           </a:rPr>
-                          <m:t>𝑋</m:t>
+                          <m:t>01</m:t>
                         </m:r>
                         <m:r>
                           <a:rPr lang="en-GB" sz="2800" i="1">
                             <a:latin typeface="Cambria Math"/>
                           </a:rPr>
-                          <m:t>, </m:t>
+                          <m:t>,</m:t>
+                        </m:r>
+                        <m:r>
+                          <a:rPr lang="en-GB" sz="2800" b="0" i="1" smtClean="0">
+                            <a:latin typeface="Cambria Math"/>
+                          </a:rPr>
+                          <m:t> </m:t>
                         </m:r>
                         <m:r>
                           <a:rPr lang="en-GB" sz="2800" b="0" i="1" smtClean="0">
@@ -28914,7 +30418,7 @@
             </p:txBody>
           </p:sp>
         </mc:Choice>
-        <mc:Fallback xmlns="">
+        <mc:Fallback>
           <p:sp>
             <p:nvSpPr>
               <p:cNvPr id="8" name="TextBox 7"/>
@@ -28925,8 +30429,8 @@
             </p:nvSpPr>
             <p:spPr>
               <a:xfrm>
-                <a:off x="971600" y="4797152"/>
-                <a:ext cx="7549060" cy="625171"/>
+                <a:off x="971599" y="4797152"/>
+                <a:ext cx="8064897" cy="625171"/>
               </a:xfrm>
               <a:prstGeom prst="rect">
                 <a:avLst/>
@@ -28934,7 +30438,7 @@
               <a:blipFill rotWithShape="1">
                 <a:blip r:embed="rId3"/>
                 <a:stretch>
-                  <a:fillRect l="-1614" t="-6863" b="-13725"/>
+                  <a:fillRect l="-1512" t="-6863" b="-13725"/>
                 </a:stretch>
               </a:blipFill>
             </p:spPr>
@@ -28953,8 +30457,8 @@
           </p:sp>
         </mc:Fallback>
       </mc:AlternateContent>
-      <mc:AlternateContent xmlns:mc="http://schemas.openxmlformats.org/markup-compatibility/2006" xmlns:a14="http://schemas.microsoft.com/office/drawing/2010/main">
-        <mc:Choice Requires="a14">
+      <mc:AlternateContent xmlns:mc="http://schemas.openxmlformats.org/markup-compatibility/2006">
+        <mc:Choice xmlns:a14="http://schemas.microsoft.com/office/drawing/2010/main" Requires="a14">
           <p:sp>
             <p:nvSpPr>
               <p:cNvPr id="9" name="TextBox 8"/>
@@ -29052,10 +30556,10 @@
                           </m:sSubPr>
                           <m:e>
                             <m:r>
-                              <a:rPr lang="en-GB" sz="2800" i="1">
+                              <a:rPr lang="en-GB" sz="2800" b="0" i="1" smtClean="0">
                                 <a:latin typeface="Cambria Math"/>
                               </a:rPr>
-                              <m:t>𝑍</m:t>
+                              <m:t>𝐴𝐵</m:t>
                             </m:r>
                           </m:e>
                           <m:sub>
@@ -29074,10 +30578,10 @@
                           <m:t>=</m:t>
                         </m:r>
                         <m:r>
-                          <a:rPr lang="en-GB" sz="2800" i="1">
+                          <a:rPr lang="en-GB" sz="2800" b="0" i="1" smtClean="0">
                             <a:latin typeface="Cambria Math"/>
                           </a:rPr>
-                          <m:t>𝑋</m:t>
+                          <m:t>01</m:t>
                         </m:r>
                       </m:e>
                     </m:d>
@@ -29091,7 +30595,7 @@
             </p:txBody>
           </p:sp>
         </mc:Choice>
-        <mc:Fallback xmlns="">
+        <mc:Fallback>
           <p:sp>
             <p:nvSpPr>
               <p:cNvPr id="9" name="TextBox 8"/>
@@ -29574,8 +31078,8 @@
           </a:p>
         </p:txBody>
       </p:sp>
-      <mc:AlternateContent xmlns:mc="http://schemas.openxmlformats.org/markup-compatibility/2006" xmlns:a14="http://schemas.microsoft.com/office/drawing/2010/main">
-        <mc:Choice Requires="a14">
+      <mc:AlternateContent xmlns:mc="http://schemas.openxmlformats.org/markup-compatibility/2006">
+        <mc:Choice xmlns:a14="http://schemas.microsoft.com/office/drawing/2010/main" Requires="a14">
           <p:sp>
             <p:nvSpPr>
               <p:cNvPr id="9" name="TextBox 8"/>
@@ -29584,8 +31088,8 @@
             </p:nvSpPr>
             <p:spPr>
               <a:xfrm>
-                <a:off x="1102935" y="1124744"/>
-                <a:ext cx="7704856" cy="4834400"/>
+                <a:off x="1102935" y="1412776"/>
+                <a:ext cx="7704856" cy="3540585"/>
               </a:xfrm>
               <a:prstGeom prst="rect">
                 <a:avLst/>
@@ -29793,41 +31297,10 @@
               <a:p>
                 <a:endParaRPr lang="en-GB" sz="2800" dirty="0"/>
               </a:p>
-              <a:p>
-                <a:r>
-                  <a:rPr lang="en-GB" sz="2800" dirty="0" smtClean="0"/>
-                  <a:t>The </a:t>
-                </a:r>
-                <a:r>
-                  <a:rPr lang="en-GB" sz="2800" i="1" dirty="0" smtClean="0"/>
-                  <a:t>Conceptual Information </a:t>
-                </a:r>
-                <a:r>
-                  <a:rPr lang="en-GB" sz="2800" dirty="0" smtClean="0"/>
-                  <a:t>of a system, is the Distance between its </a:t>
-                </a:r>
-                <a:r>
-                  <a:rPr lang="en-GB" sz="2800" i="1" dirty="0" smtClean="0"/>
-                  <a:t>constellation</a:t>
-                </a:r>
-                <a:r>
-                  <a:rPr lang="en-GB" sz="2800" dirty="0" smtClean="0"/>
-                  <a:t>, and the unconstrained </a:t>
-                </a:r>
-                <a:r>
-                  <a:rPr lang="en-GB" sz="2800" i="1" dirty="0" smtClean="0"/>
-                  <a:t>constellation</a:t>
-                </a:r>
-                <a:r>
-                  <a:rPr lang="en-GB" sz="2800" dirty="0" smtClean="0"/>
-                  <a:t>.</a:t>
-                </a:r>
-                <a:endParaRPr lang="en-GB" sz="2800" dirty="0"/>
-              </a:p>
             </p:txBody>
           </p:sp>
         </mc:Choice>
-        <mc:Fallback xmlns="">
+        <mc:Fallback>
           <p:sp>
             <p:nvSpPr>
               <p:cNvPr id="9" name="TextBox 8"/>
@@ -29838,8 +31311,8 @@
             </p:nvSpPr>
             <p:spPr>
               <a:xfrm>
-                <a:off x="1102935" y="1124744"/>
-                <a:ext cx="7704856" cy="4834400"/>
+                <a:off x="1102935" y="1412776"/>
+                <a:ext cx="7704856" cy="3540585"/>
               </a:xfrm>
               <a:prstGeom prst="rect">
                 <a:avLst/>
@@ -29847,7 +31320,7 @@
               <a:blipFill rotWithShape="1">
                 <a:blip r:embed="rId2"/>
                 <a:stretch>
-                  <a:fillRect l="-1661" t="-1135" b="-2648"/>
+                  <a:fillRect l="-1661" t="-1549"/>
                 </a:stretch>
               </a:blipFill>
             </p:spPr>

</xml_diff>